<commit_message>
Changed Icons and views.
</commit_message>
<xml_diff>
--- a/FluxSol-CAE/Icons/Icons.pptx
+++ b/FluxSol-CAE/Icons/Icons.pptx
@@ -6,6 +6,7 @@
   </p:sldMasterIdLst>
   <p:sldIdLst>
     <p:sldId id="256" r:id="rId2"/>
+    <p:sldId id="257" r:id="rId3"/>
   </p:sldIdLst>
   <p:sldSz cx="12192000" cy="6858000"/>
   <p:notesSz cx="6858000" cy="9144000"/>
@@ -243,7 +244,7 @@
           <a:p>
             <a:fld id="{E2FC7F11-C3C3-4E1B-A1FC-A59F8DFB27EA}" type="datetimeFigureOut">
               <a:rPr lang="es-AR" smtClean="0"/>
-              <a:t>08/01/2015</a:t>
+              <a:t>09/01/2015</a:t>
             </a:fld>
             <a:endParaRPr lang="es-AR"/>
           </a:p>
@@ -413,7 +414,7 @@
           <a:p>
             <a:fld id="{E2FC7F11-C3C3-4E1B-A1FC-A59F8DFB27EA}" type="datetimeFigureOut">
               <a:rPr lang="es-AR" smtClean="0"/>
-              <a:t>08/01/2015</a:t>
+              <a:t>09/01/2015</a:t>
             </a:fld>
             <a:endParaRPr lang="es-AR"/>
           </a:p>
@@ -593,7 +594,7 @@
           <a:p>
             <a:fld id="{E2FC7F11-C3C3-4E1B-A1FC-A59F8DFB27EA}" type="datetimeFigureOut">
               <a:rPr lang="es-AR" smtClean="0"/>
-              <a:t>08/01/2015</a:t>
+              <a:t>09/01/2015</a:t>
             </a:fld>
             <a:endParaRPr lang="es-AR"/>
           </a:p>
@@ -763,7 +764,7 @@
           <a:p>
             <a:fld id="{E2FC7F11-C3C3-4E1B-A1FC-A59F8DFB27EA}" type="datetimeFigureOut">
               <a:rPr lang="es-AR" smtClean="0"/>
-              <a:t>08/01/2015</a:t>
+              <a:t>09/01/2015</a:t>
             </a:fld>
             <a:endParaRPr lang="es-AR"/>
           </a:p>
@@ -1009,7 +1010,7 @@
           <a:p>
             <a:fld id="{E2FC7F11-C3C3-4E1B-A1FC-A59F8DFB27EA}" type="datetimeFigureOut">
               <a:rPr lang="es-AR" smtClean="0"/>
-              <a:t>08/01/2015</a:t>
+              <a:t>09/01/2015</a:t>
             </a:fld>
             <a:endParaRPr lang="es-AR"/>
           </a:p>
@@ -1241,7 +1242,7 @@
           <a:p>
             <a:fld id="{E2FC7F11-C3C3-4E1B-A1FC-A59F8DFB27EA}" type="datetimeFigureOut">
               <a:rPr lang="es-AR" smtClean="0"/>
-              <a:t>08/01/2015</a:t>
+              <a:t>09/01/2015</a:t>
             </a:fld>
             <a:endParaRPr lang="es-AR"/>
           </a:p>
@@ -1608,7 +1609,7 @@
           <a:p>
             <a:fld id="{E2FC7F11-C3C3-4E1B-A1FC-A59F8DFB27EA}" type="datetimeFigureOut">
               <a:rPr lang="es-AR" smtClean="0"/>
-              <a:t>08/01/2015</a:t>
+              <a:t>09/01/2015</a:t>
             </a:fld>
             <a:endParaRPr lang="es-AR"/>
           </a:p>
@@ -1726,7 +1727,7 @@
           <a:p>
             <a:fld id="{E2FC7F11-C3C3-4E1B-A1FC-A59F8DFB27EA}" type="datetimeFigureOut">
               <a:rPr lang="es-AR" smtClean="0"/>
-              <a:t>08/01/2015</a:t>
+              <a:t>09/01/2015</a:t>
             </a:fld>
             <a:endParaRPr lang="es-AR"/>
           </a:p>
@@ -1821,7 +1822,7 @@
           <a:p>
             <a:fld id="{E2FC7F11-C3C3-4E1B-A1FC-A59F8DFB27EA}" type="datetimeFigureOut">
               <a:rPr lang="es-AR" smtClean="0"/>
-              <a:t>08/01/2015</a:t>
+              <a:t>09/01/2015</a:t>
             </a:fld>
             <a:endParaRPr lang="es-AR"/>
           </a:p>
@@ -2098,7 +2099,7 @@
           <a:p>
             <a:fld id="{E2FC7F11-C3C3-4E1B-A1FC-A59F8DFB27EA}" type="datetimeFigureOut">
               <a:rPr lang="es-AR" smtClean="0"/>
-              <a:t>08/01/2015</a:t>
+              <a:t>09/01/2015</a:t>
             </a:fld>
             <a:endParaRPr lang="es-AR"/>
           </a:p>
@@ -2351,7 +2352,7 @@
           <a:p>
             <a:fld id="{E2FC7F11-C3C3-4E1B-A1FC-A59F8DFB27EA}" type="datetimeFigureOut">
               <a:rPr lang="es-AR" smtClean="0"/>
-              <a:t>08/01/2015</a:t>
+              <a:t>09/01/2015</a:t>
             </a:fld>
             <a:endParaRPr lang="es-AR"/>
           </a:p>
@@ -2564,7 +2565,7 @@
           <a:p>
             <a:fld id="{E2FC7F11-C3C3-4E1B-A1FC-A59F8DFB27EA}" type="datetimeFigureOut">
               <a:rPr lang="es-AR" smtClean="0"/>
-              <a:t>08/01/2015</a:t>
+              <a:t>09/01/2015</a:t>
             </a:fld>
             <a:endParaRPr lang="es-AR"/>
           </a:p>
@@ -5079,6 +5080,290 @@
 </p:sld>
 </file>
 
+<file path=ppt/slides/slide2.xml><?xml version="1.0" encoding="utf-8"?>
+<p:sld xmlns:a="http://schemas.openxmlformats.org/drawingml/2006/main" xmlns:r="http://schemas.openxmlformats.org/officeDocument/2006/relationships" xmlns:p="http://schemas.openxmlformats.org/presentationml/2006/main">
+  <p:cSld>
+    <p:spTree>
+      <p:nvGrpSpPr>
+        <p:cNvPr id="1" name=""/>
+        <p:cNvGrpSpPr/>
+        <p:nvPr/>
+      </p:nvGrpSpPr>
+      <p:grpSpPr>
+        <a:xfrm>
+          <a:off x="0" y="0"/>
+          <a:ext cx="0" cy="0"/>
+          <a:chOff x="0" y="0"/>
+          <a:chExt cx="0" cy="0"/>
+        </a:xfrm>
+      </p:grpSpPr>
+      <p:sp>
+        <p:nvSpPr>
+          <p:cNvPr id="4" name="Rectangle 3"/>
+          <p:cNvSpPr/>
+          <p:nvPr/>
+        </p:nvSpPr>
+        <p:spPr>
+          <a:xfrm>
+            <a:off x="627018" y="1323702"/>
+            <a:ext cx="461554" cy="731521"/>
+          </a:xfrm>
+          <a:prstGeom prst="rect">
+            <a:avLst/>
+          </a:prstGeom>
+          <a:solidFill>
+            <a:schemeClr val="accent1">
+              <a:lumMod val="60000"/>
+              <a:lumOff val="40000"/>
+            </a:schemeClr>
+          </a:solidFill>
+          <a:ln w="76200"/>
+        </p:spPr>
+        <p:style>
+          <a:lnRef idx="2">
+            <a:schemeClr val="accent1">
+              <a:shade val="50000"/>
+            </a:schemeClr>
+          </a:lnRef>
+          <a:fillRef idx="1">
+            <a:schemeClr val="accent1"/>
+          </a:fillRef>
+          <a:effectRef idx="0">
+            <a:schemeClr val="accent1"/>
+          </a:effectRef>
+          <a:fontRef idx="minor">
+            <a:schemeClr val="lt1"/>
+          </a:fontRef>
+        </p:style>
+        <p:txBody>
+          <a:bodyPr rtlCol="0" anchor="ctr"/>
+          <a:lstStyle/>
+          <a:p>
+            <a:pPr algn="ctr"/>
+            <a:endParaRPr lang="es-AR"/>
+          </a:p>
+        </p:txBody>
+      </p:sp>
+      <p:sp>
+        <p:nvSpPr>
+          <p:cNvPr id="5" name="Rectangle 4"/>
+          <p:cNvSpPr/>
+          <p:nvPr/>
+        </p:nvSpPr>
+        <p:spPr>
+          <a:xfrm rot="5400000">
+            <a:off x="727165" y="1955075"/>
+            <a:ext cx="888275" cy="1088573"/>
+          </a:xfrm>
+          <a:prstGeom prst="rect">
+            <a:avLst/>
+          </a:prstGeom>
+          <a:solidFill>
+            <a:schemeClr val="accent1">
+              <a:lumMod val="60000"/>
+              <a:lumOff val="40000"/>
+            </a:schemeClr>
+          </a:solidFill>
+          <a:ln w="76200"/>
+        </p:spPr>
+        <p:style>
+          <a:lnRef idx="2">
+            <a:schemeClr val="accent1">
+              <a:shade val="50000"/>
+            </a:schemeClr>
+          </a:lnRef>
+          <a:fillRef idx="1">
+            <a:schemeClr val="accent1"/>
+          </a:fillRef>
+          <a:effectRef idx="0">
+            <a:schemeClr val="accent1"/>
+          </a:effectRef>
+          <a:fontRef idx="minor">
+            <a:schemeClr val="lt1"/>
+          </a:fontRef>
+        </p:style>
+        <p:txBody>
+          <a:bodyPr rtlCol="0" anchor="ctr"/>
+          <a:lstStyle/>
+          <a:p>
+            <a:pPr algn="ctr"/>
+            <a:endParaRPr lang="es-AR"/>
+          </a:p>
+        </p:txBody>
+      </p:sp>
+      <p:sp>
+        <p:nvSpPr>
+          <p:cNvPr id="6" name="Rectangle 5"/>
+          <p:cNvSpPr/>
+          <p:nvPr/>
+        </p:nvSpPr>
+        <p:spPr>
+          <a:xfrm rot="10800000">
+            <a:off x="1854926" y="1323704"/>
+            <a:ext cx="683620" cy="1619794"/>
+          </a:xfrm>
+          <a:prstGeom prst="rect">
+            <a:avLst/>
+          </a:prstGeom>
+          <a:solidFill>
+            <a:schemeClr val="accent2">
+              <a:lumMod val="60000"/>
+              <a:lumOff val="40000"/>
+            </a:schemeClr>
+          </a:solidFill>
+          <a:ln w="76200">
+            <a:solidFill>
+              <a:schemeClr val="accent2">
+                <a:lumMod val="50000"/>
+              </a:schemeClr>
+            </a:solidFill>
+          </a:ln>
+        </p:spPr>
+        <p:style>
+          <a:lnRef idx="2">
+            <a:schemeClr val="accent1">
+              <a:shade val="50000"/>
+            </a:schemeClr>
+          </a:lnRef>
+          <a:fillRef idx="1">
+            <a:schemeClr val="accent1"/>
+          </a:fillRef>
+          <a:effectRef idx="0">
+            <a:schemeClr val="accent1"/>
+          </a:effectRef>
+          <a:fontRef idx="minor">
+            <a:schemeClr val="lt1"/>
+          </a:fontRef>
+        </p:style>
+        <p:txBody>
+          <a:bodyPr rtlCol="0" anchor="ctr"/>
+          <a:lstStyle/>
+          <a:p>
+            <a:pPr algn="ctr"/>
+            <a:endParaRPr lang="es-AR"/>
+          </a:p>
+        </p:txBody>
+      </p:sp>
+      <p:sp>
+        <p:nvSpPr>
+          <p:cNvPr id="7" name="Rectangle 6"/>
+          <p:cNvSpPr/>
+          <p:nvPr/>
+        </p:nvSpPr>
+        <p:spPr>
+          <a:xfrm rot="16200000">
+            <a:off x="1262744" y="1349826"/>
+            <a:ext cx="592183" cy="539934"/>
+          </a:xfrm>
+          <a:prstGeom prst="rect">
+            <a:avLst/>
+          </a:prstGeom>
+          <a:solidFill>
+            <a:schemeClr val="accent2">
+              <a:lumMod val="60000"/>
+              <a:lumOff val="40000"/>
+            </a:schemeClr>
+          </a:solidFill>
+          <a:ln w="76200">
+            <a:solidFill>
+              <a:schemeClr val="accent2">
+                <a:lumMod val="50000"/>
+              </a:schemeClr>
+            </a:solidFill>
+          </a:ln>
+        </p:spPr>
+        <p:style>
+          <a:lnRef idx="2">
+            <a:schemeClr val="accent1">
+              <a:shade val="50000"/>
+            </a:schemeClr>
+          </a:lnRef>
+          <a:fillRef idx="1">
+            <a:schemeClr val="accent1"/>
+          </a:fillRef>
+          <a:effectRef idx="0">
+            <a:schemeClr val="accent1"/>
+          </a:effectRef>
+          <a:fontRef idx="minor">
+            <a:schemeClr val="lt1"/>
+          </a:fontRef>
+        </p:style>
+        <p:txBody>
+          <a:bodyPr rtlCol="0" anchor="ctr"/>
+          <a:lstStyle/>
+          <a:p>
+            <a:pPr algn="ctr"/>
+            <a:endParaRPr lang="es-AR"/>
+          </a:p>
+        </p:txBody>
+      </p:sp>
+      <p:sp>
+        <p:nvSpPr>
+          <p:cNvPr id="8" name="Rectangle 7"/>
+          <p:cNvSpPr/>
+          <p:nvPr/>
+        </p:nvSpPr>
+        <p:spPr>
+          <a:xfrm>
+            <a:off x="1558835" y="1367243"/>
+            <a:ext cx="679269" cy="505099"/>
+          </a:xfrm>
+          <a:prstGeom prst="rect">
+            <a:avLst/>
+          </a:prstGeom>
+          <a:solidFill>
+            <a:schemeClr val="accent2">
+              <a:lumMod val="60000"/>
+              <a:lumOff val="40000"/>
+            </a:schemeClr>
+          </a:solidFill>
+          <a:ln>
+            <a:solidFill>
+              <a:schemeClr val="accent2">
+                <a:lumMod val="60000"/>
+                <a:lumOff val="40000"/>
+              </a:schemeClr>
+            </a:solidFill>
+          </a:ln>
+        </p:spPr>
+        <p:style>
+          <a:lnRef idx="2">
+            <a:schemeClr val="accent1">
+              <a:shade val="50000"/>
+            </a:schemeClr>
+          </a:lnRef>
+          <a:fillRef idx="1">
+            <a:schemeClr val="accent1"/>
+          </a:fillRef>
+          <a:effectRef idx="0">
+            <a:schemeClr val="accent1"/>
+          </a:effectRef>
+          <a:fontRef idx="minor">
+            <a:schemeClr val="lt1"/>
+          </a:fontRef>
+        </p:style>
+        <p:txBody>
+          <a:bodyPr rtlCol="0" anchor="ctr"/>
+          <a:lstStyle/>
+          <a:p>
+            <a:pPr algn="ctr"/>
+            <a:endParaRPr lang="es-AR"/>
+          </a:p>
+        </p:txBody>
+      </p:sp>
+    </p:spTree>
+    <p:extLst>
+      <p:ext uri="{BB962C8B-B14F-4D97-AF65-F5344CB8AC3E}">
+        <p14:creationId xmlns:p14="http://schemas.microsoft.com/office/powerpoint/2010/main" val="3280923473"/>
+      </p:ext>
+    </p:extLst>
+  </p:cSld>
+  <p:clrMapOvr>
+    <a:masterClrMapping/>
+  </p:clrMapOvr>
+</p:sld>
+</file>
+
 <file path=ppt/theme/theme1.xml><?xml version="1.0" encoding="utf-8"?>
 <a:theme xmlns:a="http://schemas.openxmlformats.org/drawingml/2006/main" name="Office Theme">
   <a:themeElements>

</xml_diff>

<commit_message>
Added several CAE features, buttons. Fixed FluxSol Legend. Begining to work on import mesh.
</commit_message>
<xml_diff>
--- a/FluxSol-CAE/Icons/Icons.pptx
+++ b/FluxSol-CAE/Icons/Icons.pptx
@@ -8,6 +8,7 @@
     <p:sldId id="256" r:id="rId2"/>
     <p:sldId id="257" r:id="rId3"/>
     <p:sldId id="258" r:id="rId4"/>
+    <p:sldId id="259" r:id="rId5"/>
   </p:sldIdLst>
   <p:sldSz cx="12192000" cy="6858000"/>
   <p:notesSz cx="6858000" cy="9144000"/>
@@ -245,7 +246,7 @@
           <a:p>
             <a:fld id="{E2FC7F11-C3C3-4E1B-A1FC-A59F8DFB27EA}" type="datetimeFigureOut">
               <a:rPr lang="es-AR" smtClean="0"/>
-              <a:t>20/02/2015</a:t>
+              <a:t>25/02/2015</a:t>
             </a:fld>
             <a:endParaRPr lang="es-AR"/>
           </a:p>
@@ -415,7 +416,7 @@
           <a:p>
             <a:fld id="{E2FC7F11-C3C3-4E1B-A1FC-A59F8DFB27EA}" type="datetimeFigureOut">
               <a:rPr lang="es-AR" smtClean="0"/>
-              <a:t>20/02/2015</a:t>
+              <a:t>25/02/2015</a:t>
             </a:fld>
             <a:endParaRPr lang="es-AR"/>
           </a:p>
@@ -595,7 +596,7 @@
           <a:p>
             <a:fld id="{E2FC7F11-C3C3-4E1B-A1FC-A59F8DFB27EA}" type="datetimeFigureOut">
               <a:rPr lang="es-AR" smtClean="0"/>
-              <a:t>20/02/2015</a:t>
+              <a:t>25/02/2015</a:t>
             </a:fld>
             <a:endParaRPr lang="es-AR"/>
           </a:p>
@@ -765,7 +766,7 @@
           <a:p>
             <a:fld id="{E2FC7F11-C3C3-4E1B-A1FC-A59F8DFB27EA}" type="datetimeFigureOut">
               <a:rPr lang="es-AR" smtClean="0"/>
-              <a:t>20/02/2015</a:t>
+              <a:t>25/02/2015</a:t>
             </a:fld>
             <a:endParaRPr lang="es-AR"/>
           </a:p>
@@ -1011,7 +1012,7 @@
           <a:p>
             <a:fld id="{E2FC7F11-C3C3-4E1B-A1FC-A59F8DFB27EA}" type="datetimeFigureOut">
               <a:rPr lang="es-AR" smtClean="0"/>
-              <a:t>20/02/2015</a:t>
+              <a:t>25/02/2015</a:t>
             </a:fld>
             <a:endParaRPr lang="es-AR"/>
           </a:p>
@@ -1243,7 +1244,7 @@
           <a:p>
             <a:fld id="{E2FC7F11-C3C3-4E1B-A1FC-A59F8DFB27EA}" type="datetimeFigureOut">
               <a:rPr lang="es-AR" smtClean="0"/>
-              <a:t>20/02/2015</a:t>
+              <a:t>25/02/2015</a:t>
             </a:fld>
             <a:endParaRPr lang="es-AR"/>
           </a:p>
@@ -1610,7 +1611,7 @@
           <a:p>
             <a:fld id="{E2FC7F11-C3C3-4E1B-A1FC-A59F8DFB27EA}" type="datetimeFigureOut">
               <a:rPr lang="es-AR" smtClean="0"/>
-              <a:t>20/02/2015</a:t>
+              <a:t>25/02/2015</a:t>
             </a:fld>
             <a:endParaRPr lang="es-AR"/>
           </a:p>
@@ -1728,7 +1729,7 @@
           <a:p>
             <a:fld id="{E2FC7F11-C3C3-4E1B-A1FC-A59F8DFB27EA}" type="datetimeFigureOut">
               <a:rPr lang="es-AR" smtClean="0"/>
-              <a:t>20/02/2015</a:t>
+              <a:t>25/02/2015</a:t>
             </a:fld>
             <a:endParaRPr lang="es-AR"/>
           </a:p>
@@ -1823,7 +1824,7 @@
           <a:p>
             <a:fld id="{E2FC7F11-C3C3-4E1B-A1FC-A59F8DFB27EA}" type="datetimeFigureOut">
               <a:rPr lang="es-AR" smtClean="0"/>
-              <a:t>20/02/2015</a:t>
+              <a:t>25/02/2015</a:t>
             </a:fld>
             <a:endParaRPr lang="es-AR"/>
           </a:p>
@@ -2100,7 +2101,7 @@
           <a:p>
             <a:fld id="{E2FC7F11-C3C3-4E1B-A1FC-A59F8DFB27EA}" type="datetimeFigureOut">
               <a:rPr lang="es-AR" smtClean="0"/>
-              <a:t>20/02/2015</a:t>
+              <a:t>25/02/2015</a:t>
             </a:fld>
             <a:endParaRPr lang="es-AR"/>
           </a:p>
@@ -2353,7 +2354,7 @@
           <a:p>
             <a:fld id="{E2FC7F11-C3C3-4E1B-A1FC-A59F8DFB27EA}" type="datetimeFigureOut">
               <a:rPr lang="es-AR" smtClean="0"/>
-              <a:t>20/02/2015</a:t>
+              <a:t>25/02/2015</a:t>
             </a:fld>
             <a:endParaRPr lang="es-AR"/>
           </a:p>
@@ -2566,7 +2567,7 @@
           <a:p>
             <a:fld id="{E2FC7F11-C3C3-4E1B-A1FC-A59F8DFB27EA}" type="datetimeFigureOut">
               <a:rPr lang="es-AR" smtClean="0"/>
-              <a:t>20/02/2015</a:t>
+              <a:t>25/02/2015</a:t>
             </a:fld>
             <a:endParaRPr lang="es-AR"/>
           </a:p>
@@ -8097,246 +8098,261 @@
           </a:p>
         </p:txBody>
       </p:sp>
-      <p:sp>
-        <p:nvSpPr>
-          <p:cNvPr id="10" name="Rounded Rectangle 9"/>
-          <p:cNvSpPr/>
-          <p:nvPr/>
-        </p:nvSpPr>
-        <p:spPr>
-          <a:xfrm>
-            <a:off x="3851031" y="327862"/>
-            <a:ext cx="1978269" cy="1154864"/>
-          </a:xfrm>
-          <a:prstGeom prst="roundRect">
-            <a:avLst>
-              <a:gd name="adj" fmla="val 0"/>
-            </a:avLst>
-          </a:prstGeom>
-          <a:solidFill>
-            <a:schemeClr val="accent1">
-              <a:lumMod val="60000"/>
-              <a:lumOff val="40000"/>
-            </a:schemeClr>
-          </a:solidFill>
-          <a:ln w="127000">
-            <a:solidFill>
-              <a:schemeClr val="tx1">
+      <p:grpSp>
+        <p:nvGrpSpPr>
+          <p:cNvPr id="9" name="Group 8"/>
+          <p:cNvGrpSpPr/>
+          <p:nvPr/>
+        </p:nvGrpSpPr>
+        <p:grpSpPr>
+          <a:xfrm>
+            <a:off x="3824655" y="327862"/>
+            <a:ext cx="2013438" cy="2053388"/>
+            <a:chOff x="3824655" y="327862"/>
+            <a:chExt cx="2013438" cy="2053388"/>
+          </a:xfrm>
+        </p:grpSpPr>
+        <p:sp>
+          <p:nvSpPr>
+            <p:cNvPr id="10" name="Rounded Rectangle 9"/>
+            <p:cNvSpPr/>
+            <p:nvPr/>
+          </p:nvSpPr>
+          <p:spPr>
+            <a:xfrm>
+              <a:off x="3851031" y="327862"/>
+              <a:ext cx="1978269" cy="1154864"/>
+            </a:xfrm>
+            <a:prstGeom prst="roundRect">
+              <a:avLst>
+                <a:gd name="adj" fmla="val 0"/>
+              </a:avLst>
+            </a:prstGeom>
+            <a:solidFill>
+              <a:schemeClr val="accent1">
+                <a:lumMod val="60000"/>
+                <a:lumOff val="40000"/>
+              </a:schemeClr>
+            </a:solidFill>
+            <a:ln w="127000">
+              <a:solidFill>
+                <a:schemeClr val="tx1">
+                  <a:lumMod val="85000"/>
+                  <a:lumOff val="15000"/>
+                </a:schemeClr>
+              </a:solidFill>
+            </a:ln>
+          </p:spPr>
+          <p:style>
+            <a:lnRef idx="2">
+              <a:schemeClr val="accent1">
+                <a:shade val="50000"/>
+              </a:schemeClr>
+            </a:lnRef>
+            <a:fillRef idx="1">
+              <a:schemeClr val="accent1"/>
+            </a:fillRef>
+            <a:effectRef idx="0">
+              <a:schemeClr val="accent1"/>
+            </a:effectRef>
+            <a:fontRef idx="minor">
+              <a:schemeClr val="lt1"/>
+            </a:fontRef>
+          </p:style>
+          <p:txBody>
+            <a:bodyPr rtlCol="0" anchor="ctr"/>
+            <a:lstStyle/>
+            <a:p>
+              <a:pPr algn="ctr"/>
+              <a:endParaRPr lang="es-AR"/>
+            </a:p>
+          </p:txBody>
+        </p:sp>
+        <p:sp>
+          <p:nvSpPr>
+            <p:cNvPr id="2" name="Rectangle 1"/>
+            <p:cNvSpPr/>
+            <p:nvPr/>
+          </p:nvSpPr>
+          <p:spPr>
+            <a:xfrm>
+              <a:off x="3824655" y="1797294"/>
+              <a:ext cx="2013438" cy="583956"/>
+            </a:xfrm>
+            <a:prstGeom prst="rect">
+              <a:avLst/>
+            </a:prstGeom>
+            <a:solidFill>
+              <a:schemeClr val="bg1">
                 <a:lumMod val="85000"/>
-                <a:lumOff val="15000"/>
               </a:schemeClr>
             </a:solidFill>
-          </a:ln>
-        </p:spPr>
-        <p:style>
-          <a:lnRef idx="2">
-            <a:schemeClr val="accent1">
-              <a:shade val="50000"/>
-            </a:schemeClr>
-          </a:lnRef>
-          <a:fillRef idx="1">
-            <a:schemeClr val="accent1"/>
-          </a:fillRef>
-          <a:effectRef idx="0">
-            <a:schemeClr val="accent1"/>
-          </a:effectRef>
-          <a:fontRef idx="minor">
-            <a:schemeClr val="lt1"/>
-          </a:fontRef>
-        </p:style>
-        <p:txBody>
-          <a:bodyPr rtlCol="0" anchor="ctr"/>
-          <a:lstStyle/>
-          <a:p>
-            <a:pPr algn="ctr"/>
-            <a:endParaRPr lang="es-AR"/>
-          </a:p>
-        </p:txBody>
-      </p:sp>
-      <p:sp>
-        <p:nvSpPr>
-          <p:cNvPr id="2" name="Rectangle 1"/>
-          <p:cNvSpPr/>
-          <p:nvPr/>
-        </p:nvSpPr>
-        <p:spPr>
-          <a:xfrm>
-            <a:off x="3824655" y="1797294"/>
-            <a:ext cx="2013438" cy="583956"/>
-          </a:xfrm>
-          <a:prstGeom prst="rect">
-            <a:avLst/>
-          </a:prstGeom>
-          <a:solidFill>
-            <a:schemeClr val="bg1">
-              <a:lumMod val="85000"/>
-            </a:schemeClr>
-          </a:solidFill>
-          <a:ln w="76200">
+            <a:ln w="76200">
+              <a:solidFill>
+                <a:srgbClr val="292929"/>
+              </a:solidFill>
+            </a:ln>
+          </p:spPr>
+          <p:style>
+            <a:lnRef idx="2">
+              <a:schemeClr val="accent1">
+                <a:shade val="50000"/>
+              </a:schemeClr>
+            </a:lnRef>
+            <a:fillRef idx="1">
+              <a:schemeClr val="accent1"/>
+            </a:fillRef>
+            <a:effectRef idx="0">
+              <a:schemeClr val="accent1"/>
+            </a:effectRef>
+            <a:fontRef idx="minor">
+              <a:schemeClr val="lt1"/>
+            </a:fontRef>
+          </p:style>
+          <p:txBody>
+            <a:bodyPr rtlCol="0" anchor="ctr"/>
+            <a:lstStyle/>
+            <a:p>
+              <a:pPr algn="ctr"/>
+              <a:endParaRPr lang="es-AR"/>
+            </a:p>
+          </p:txBody>
+        </p:sp>
+        <p:sp>
+          <p:nvSpPr>
+            <p:cNvPr id="16" name="Rectangle 15"/>
+            <p:cNvSpPr/>
+            <p:nvPr/>
+          </p:nvSpPr>
+          <p:spPr>
+            <a:xfrm>
+              <a:off x="4018085" y="1965814"/>
+              <a:ext cx="190500" cy="209550"/>
+            </a:xfrm>
+            <a:prstGeom prst="rect">
+              <a:avLst/>
+            </a:prstGeom>
+            <a:solidFill>
+              <a:srgbClr val="92D050"/>
+            </a:solidFill>
+            <a:ln w="76200">
+              <a:solidFill>
+                <a:schemeClr val="tx1"/>
+              </a:solidFill>
+            </a:ln>
+          </p:spPr>
+          <p:style>
+            <a:lnRef idx="2">
+              <a:schemeClr val="accent1">
+                <a:shade val="50000"/>
+              </a:schemeClr>
+            </a:lnRef>
+            <a:fillRef idx="1">
+              <a:schemeClr val="accent1"/>
+            </a:fillRef>
+            <a:effectRef idx="0">
+              <a:schemeClr val="accent1"/>
+            </a:effectRef>
+            <a:fontRef idx="minor">
+              <a:schemeClr val="lt1"/>
+            </a:fontRef>
+          </p:style>
+          <p:txBody>
+            <a:bodyPr rtlCol="0" anchor="ctr"/>
+            <a:lstStyle/>
+            <a:p>
+              <a:pPr algn="ctr"/>
+              <a:endParaRPr lang="es-AR"/>
+            </a:p>
+          </p:txBody>
+        </p:sp>
+        <p:cxnSp>
+          <p:nvCxnSpPr>
+            <p:cNvPr id="17" name="Straight Connector 16"/>
+            <p:cNvCxnSpPr/>
+            <p:nvPr/>
+          </p:nvCxnSpPr>
+          <p:spPr>
+            <a:xfrm>
+              <a:off x="4924943" y="2068139"/>
+              <a:ext cx="692608" cy="0"/>
+            </a:xfrm>
+            <a:prstGeom prst="line">
+              <a:avLst/>
+            </a:prstGeom>
+            <a:ln w="127000">
+              <a:solidFill>
+                <a:schemeClr val="tx1">
+                  <a:lumMod val="75000"/>
+                  <a:lumOff val="25000"/>
+                </a:schemeClr>
+              </a:solidFill>
+            </a:ln>
+          </p:spPr>
+          <p:style>
+            <a:lnRef idx="1">
+              <a:schemeClr val="accent1"/>
+            </a:lnRef>
+            <a:fillRef idx="0">
+              <a:schemeClr val="accent1"/>
+            </a:fillRef>
+            <a:effectRef idx="0">
+              <a:schemeClr val="accent1"/>
+            </a:effectRef>
+            <a:fontRef idx="minor">
+              <a:schemeClr val="tx1"/>
+            </a:fontRef>
+          </p:style>
+        </p:cxnSp>
+        <p:sp>
+          <p:nvSpPr>
+            <p:cNvPr id="3" name="Rectangle 2"/>
+            <p:cNvSpPr/>
+            <p:nvPr/>
+          </p:nvSpPr>
+          <p:spPr>
+            <a:xfrm>
+              <a:off x="4485786" y="1479550"/>
+              <a:ext cx="667239" cy="330200"/>
+            </a:xfrm>
+            <a:prstGeom prst="rect">
+              <a:avLst/>
+            </a:prstGeom>
             <a:solidFill>
               <a:srgbClr val="292929"/>
             </a:solidFill>
-          </a:ln>
-        </p:spPr>
-        <p:style>
-          <a:lnRef idx="2">
-            <a:schemeClr val="accent1">
-              <a:shade val="50000"/>
-            </a:schemeClr>
-          </a:lnRef>
-          <a:fillRef idx="1">
-            <a:schemeClr val="accent1"/>
-          </a:fillRef>
-          <a:effectRef idx="0">
-            <a:schemeClr val="accent1"/>
-          </a:effectRef>
-          <a:fontRef idx="minor">
-            <a:schemeClr val="lt1"/>
-          </a:fontRef>
-        </p:style>
-        <p:txBody>
-          <a:bodyPr rtlCol="0" anchor="ctr"/>
-          <a:lstStyle/>
-          <a:p>
-            <a:pPr algn="ctr"/>
-            <a:endParaRPr lang="es-AR"/>
-          </a:p>
-        </p:txBody>
-      </p:sp>
-      <p:sp>
-        <p:nvSpPr>
-          <p:cNvPr id="16" name="Rectangle 15"/>
-          <p:cNvSpPr/>
-          <p:nvPr/>
-        </p:nvSpPr>
-        <p:spPr>
-          <a:xfrm>
-            <a:off x="4018085" y="1965814"/>
-            <a:ext cx="190500" cy="209550"/>
-          </a:xfrm>
-          <a:prstGeom prst="rect">
-            <a:avLst/>
-          </a:prstGeom>
-          <a:solidFill>
-            <a:srgbClr val="92D050"/>
-          </a:solidFill>
-          <a:ln w="76200">
-            <a:solidFill>
-              <a:schemeClr val="tx1"/>
-            </a:solidFill>
-          </a:ln>
-        </p:spPr>
-        <p:style>
-          <a:lnRef idx="2">
-            <a:schemeClr val="accent1">
-              <a:shade val="50000"/>
-            </a:schemeClr>
-          </a:lnRef>
-          <a:fillRef idx="1">
-            <a:schemeClr val="accent1"/>
-          </a:fillRef>
-          <a:effectRef idx="0">
-            <a:schemeClr val="accent1"/>
-          </a:effectRef>
-          <a:fontRef idx="minor">
-            <a:schemeClr val="lt1"/>
-          </a:fontRef>
-        </p:style>
-        <p:txBody>
-          <a:bodyPr rtlCol="0" anchor="ctr"/>
-          <a:lstStyle/>
-          <a:p>
-            <a:pPr algn="ctr"/>
-            <a:endParaRPr lang="es-AR"/>
-          </a:p>
-        </p:txBody>
-      </p:sp>
-      <p:cxnSp>
-        <p:nvCxnSpPr>
-          <p:cNvPr id="17" name="Straight Connector 16"/>
-          <p:cNvCxnSpPr/>
-          <p:nvPr/>
-        </p:nvCxnSpPr>
-        <p:spPr>
-          <a:xfrm>
-            <a:off x="4924943" y="2068139"/>
-            <a:ext cx="692608" cy="0"/>
-          </a:xfrm>
-          <a:prstGeom prst="line">
-            <a:avLst/>
-          </a:prstGeom>
-          <a:ln w="127000">
-            <a:solidFill>
-              <a:schemeClr val="tx1">
-                <a:lumMod val="75000"/>
-                <a:lumOff val="25000"/>
+            <a:ln>
+              <a:solidFill>
+                <a:srgbClr val="292929"/>
+              </a:solidFill>
+            </a:ln>
+          </p:spPr>
+          <p:style>
+            <a:lnRef idx="2">
+              <a:schemeClr val="accent1">
+                <a:shade val="50000"/>
               </a:schemeClr>
-            </a:solidFill>
-          </a:ln>
-        </p:spPr>
-        <p:style>
-          <a:lnRef idx="1">
-            <a:schemeClr val="accent1"/>
-          </a:lnRef>
-          <a:fillRef idx="0">
-            <a:schemeClr val="accent1"/>
-          </a:fillRef>
-          <a:effectRef idx="0">
-            <a:schemeClr val="accent1"/>
-          </a:effectRef>
-          <a:fontRef idx="minor">
-            <a:schemeClr val="tx1"/>
-          </a:fontRef>
-        </p:style>
-      </p:cxnSp>
-      <p:sp>
-        <p:nvSpPr>
-          <p:cNvPr id="3" name="Rectangle 2"/>
-          <p:cNvSpPr/>
-          <p:nvPr/>
-        </p:nvSpPr>
-        <p:spPr>
-          <a:xfrm>
-            <a:off x="4485786" y="1479550"/>
-            <a:ext cx="667239" cy="330200"/>
-          </a:xfrm>
-          <a:prstGeom prst="rect">
-            <a:avLst/>
-          </a:prstGeom>
-          <a:solidFill>
-            <a:srgbClr val="292929"/>
-          </a:solidFill>
-          <a:ln>
-            <a:solidFill>
-              <a:srgbClr val="292929"/>
-            </a:solidFill>
-          </a:ln>
-        </p:spPr>
-        <p:style>
-          <a:lnRef idx="2">
-            <a:schemeClr val="accent1">
-              <a:shade val="50000"/>
-            </a:schemeClr>
-          </a:lnRef>
-          <a:fillRef idx="1">
-            <a:schemeClr val="accent1"/>
-          </a:fillRef>
-          <a:effectRef idx="0">
-            <a:schemeClr val="accent1"/>
-          </a:effectRef>
-          <a:fontRef idx="minor">
-            <a:schemeClr val="lt1"/>
-          </a:fontRef>
-        </p:style>
-        <p:txBody>
-          <a:bodyPr rtlCol="0" anchor="ctr"/>
-          <a:lstStyle/>
-          <a:p>
-            <a:pPr algn="ctr"/>
-            <a:endParaRPr lang="es-AR"/>
-          </a:p>
-        </p:txBody>
-      </p:sp>
+            </a:lnRef>
+            <a:fillRef idx="1">
+              <a:schemeClr val="accent1"/>
+            </a:fillRef>
+            <a:effectRef idx="0">
+              <a:schemeClr val="accent1"/>
+            </a:effectRef>
+            <a:fontRef idx="minor">
+              <a:schemeClr val="lt1"/>
+            </a:fontRef>
+          </p:style>
+          <p:txBody>
+            <a:bodyPr rtlCol="0" anchor="ctr"/>
+            <a:lstStyle/>
+            <a:p>
+              <a:pPr algn="ctr"/>
+              <a:endParaRPr lang="es-AR"/>
+            </a:p>
+          </p:txBody>
+        </p:sp>
+      </p:grpSp>
       <p:sp>
         <p:nvSpPr>
           <p:cNvPr id="18" name="Rectangle 17"/>
@@ -9463,10 +9479,2529 @@
           </a:p>
         </p:txBody>
       </p:sp>
+      <p:grpSp>
+        <p:nvGrpSpPr>
+          <p:cNvPr id="45" name="Group 44"/>
+          <p:cNvGrpSpPr/>
+          <p:nvPr/>
+        </p:nvGrpSpPr>
+        <p:grpSpPr>
+          <a:xfrm>
+            <a:off x="5864225" y="4093900"/>
+            <a:ext cx="2013438" cy="2053388"/>
+            <a:chOff x="3824655" y="327862"/>
+            <a:chExt cx="2013438" cy="2053388"/>
+          </a:xfrm>
+        </p:grpSpPr>
+        <p:sp>
+          <p:nvSpPr>
+            <p:cNvPr id="46" name="Rounded Rectangle 45"/>
+            <p:cNvSpPr/>
+            <p:nvPr/>
+          </p:nvSpPr>
+          <p:spPr>
+            <a:xfrm>
+              <a:off x="3851031" y="327862"/>
+              <a:ext cx="1978269" cy="1154864"/>
+            </a:xfrm>
+            <a:prstGeom prst="roundRect">
+              <a:avLst>
+                <a:gd name="adj" fmla="val 0"/>
+              </a:avLst>
+            </a:prstGeom>
+            <a:solidFill>
+              <a:schemeClr val="accent1">
+                <a:lumMod val="60000"/>
+                <a:lumOff val="40000"/>
+              </a:schemeClr>
+            </a:solidFill>
+            <a:ln w="127000">
+              <a:solidFill>
+                <a:schemeClr val="tx1">
+                  <a:lumMod val="85000"/>
+                  <a:lumOff val="15000"/>
+                </a:schemeClr>
+              </a:solidFill>
+            </a:ln>
+          </p:spPr>
+          <p:style>
+            <a:lnRef idx="2">
+              <a:schemeClr val="accent1">
+                <a:shade val="50000"/>
+              </a:schemeClr>
+            </a:lnRef>
+            <a:fillRef idx="1">
+              <a:schemeClr val="accent1"/>
+            </a:fillRef>
+            <a:effectRef idx="0">
+              <a:schemeClr val="accent1"/>
+            </a:effectRef>
+            <a:fontRef idx="minor">
+              <a:schemeClr val="lt1"/>
+            </a:fontRef>
+          </p:style>
+          <p:txBody>
+            <a:bodyPr rtlCol="0" anchor="ctr"/>
+            <a:lstStyle/>
+            <a:p>
+              <a:pPr algn="ctr"/>
+              <a:endParaRPr lang="es-AR"/>
+            </a:p>
+          </p:txBody>
+        </p:sp>
+        <p:sp>
+          <p:nvSpPr>
+            <p:cNvPr id="47" name="Rectangle 46"/>
+            <p:cNvSpPr/>
+            <p:nvPr/>
+          </p:nvSpPr>
+          <p:spPr>
+            <a:xfrm>
+              <a:off x="3824655" y="1797294"/>
+              <a:ext cx="2013438" cy="583956"/>
+            </a:xfrm>
+            <a:prstGeom prst="rect">
+              <a:avLst/>
+            </a:prstGeom>
+            <a:solidFill>
+              <a:schemeClr val="bg1">
+                <a:lumMod val="85000"/>
+              </a:schemeClr>
+            </a:solidFill>
+            <a:ln w="127000">
+              <a:solidFill>
+                <a:srgbClr val="292929"/>
+              </a:solidFill>
+            </a:ln>
+          </p:spPr>
+          <p:style>
+            <a:lnRef idx="2">
+              <a:schemeClr val="accent1">
+                <a:shade val="50000"/>
+              </a:schemeClr>
+            </a:lnRef>
+            <a:fillRef idx="1">
+              <a:schemeClr val="accent1"/>
+            </a:fillRef>
+            <a:effectRef idx="0">
+              <a:schemeClr val="accent1"/>
+            </a:effectRef>
+            <a:fontRef idx="minor">
+              <a:schemeClr val="lt1"/>
+            </a:fontRef>
+          </p:style>
+          <p:txBody>
+            <a:bodyPr rtlCol="0" anchor="ctr"/>
+            <a:lstStyle/>
+            <a:p>
+              <a:pPr algn="ctr"/>
+              <a:endParaRPr lang="es-AR"/>
+            </a:p>
+          </p:txBody>
+        </p:sp>
+        <p:sp>
+          <p:nvSpPr>
+            <p:cNvPr id="49" name="Rectangle 48"/>
+            <p:cNvSpPr/>
+            <p:nvPr/>
+          </p:nvSpPr>
+          <p:spPr>
+            <a:xfrm>
+              <a:off x="4018085" y="1965814"/>
+              <a:ext cx="190500" cy="209550"/>
+            </a:xfrm>
+            <a:prstGeom prst="rect">
+              <a:avLst/>
+            </a:prstGeom>
+            <a:solidFill>
+              <a:srgbClr val="92D050"/>
+            </a:solidFill>
+            <a:ln w="76200">
+              <a:solidFill>
+                <a:schemeClr val="tx1"/>
+              </a:solidFill>
+            </a:ln>
+          </p:spPr>
+          <p:style>
+            <a:lnRef idx="2">
+              <a:schemeClr val="accent1">
+                <a:shade val="50000"/>
+              </a:schemeClr>
+            </a:lnRef>
+            <a:fillRef idx="1">
+              <a:schemeClr val="accent1"/>
+            </a:fillRef>
+            <a:effectRef idx="0">
+              <a:schemeClr val="accent1"/>
+            </a:effectRef>
+            <a:fontRef idx="minor">
+              <a:schemeClr val="lt1"/>
+            </a:fontRef>
+          </p:style>
+          <p:txBody>
+            <a:bodyPr rtlCol="0" anchor="ctr"/>
+            <a:lstStyle/>
+            <a:p>
+              <a:pPr algn="ctr"/>
+              <a:endParaRPr lang="es-AR"/>
+            </a:p>
+          </p:txBody>
+        </p:sp>
+        <p:cxnSp>
+          <p:nvCxnSpPr>
+            <p:cNvPr id="50" name="Straight Connector 49"/>
+            <p:cNvCxnSpPr/>
+            <p:nvPr/>
+          </p:nvCxnSpPr>
+          <p:spPr>
+            <a:xfrm>
+              <a:off x="4924943" y="2068139"/>
+              <a:ext cx="692608" cy="0"/>
+            </a:xfrm>
+            <a:prstGeom prst="line">
+              <a:avLst/>
+            </a:prstGeom>
+            <a:ln w="127000">
+              <a:solidFill>
+                <a:schemeClr val="tx1">
+                  <a:lumMod val="75000"/>
+                  <a:lumOff val="25000"/>
+                </a:schemeClr>
+              </a:solidFill>
+            </a:ln>
+          </p:spPr>
+          <p:style>
+            <a:lnRef idx="1">
+              <a:schemeClr val="accent1"/>
+            </a:lnRef>
+            <a:fillRef idx="0">
+              <a:schemeClr val="accent1"/>
+            </a:fillRef>
+            <a:effectRef idx="0">
+              <a:schemeClr val="accent1"/>
+            </a:effectRef>
+            <a:fontRef idx="minor">
+              <a:schemeClr val="tx1"/>
+            </a:fontRef>
+          </p:style>
+        </p:cxnSp>
+        <p:sp>
+          <p:nvSpPr>
+            <p:cNvPr id="51" name="Rectangle 50"/>
+            <p:cNvSpPr/>
+            <p:nvPr/>
+          </p:nvSpPr>
+          <p:spPr>
+            <a:xfrm>
+              <a:off x="4485786" y="1479550"/>
+              <a:ext cx="667239" cy="330200"/>
+            </a:xfrm>
+            <a:prstGeom prst="rect">
+              <a:avLst/>
+            </a:prstGeom>
+            <a:solidFill>
+              <a:srgbClr val="292929"/>
+            </a:solidFill>
+            <a:ln>
+              <a:solidFill>
+                <a:srgbClr val="292929"/>
+              </a:solidFill>
+            </a:ln>
+          </p:spPr>
+          <p:style>
+            <a:lnRef idx="2">
+              <a:schemeClr val="accent1">
+                <a:shade val="50000"/>
+              </a:schemeClr>
+            </a:lnRef>
+            <a:fillRef idx="1">
+              <a:schemeClr val="accent1"/>
+            </a:fillRef>
+            <a:effectRef idx="0">
+              <a:schemeClr val="accent1"/>
+            </a:effectRef>
+            <a:fontRef idx="minor">
+              <a:schemeClr val="lt1"/>
+            </a:fontRef>
+          </p:style>
+          <p:txBody>
+            <a:bodyPr rtlCol="0" anchor="ctr"/>
+            <a:lstStyle/>
+            <a:p>
+              <a:pPr algn="ctr"/>
+              <a:endParaRPr lang="es-AR"/>
+            </a:p>
+          </p:txBody>
+        </p:sp>
+      </p:grpSp>
+      <p:sp>
+        <p:nvSpPr>
+          <p:cNvPr id="58" name="Up Arrow 57"/>
+          <p:cNvSpPr/>
+          <p:nvPr/>
+        </p:nvSpPr>
+        <p:spPr>
+          <a:xfrm>
+            <a:off x="8917828" y="4432358"/>
+            <a:ext cx="338043" cy="443642"/>
+          </a:xfrm>
+          <a:prstGeom prst="upArrow">
+            <a:avLst/>
+          </a:prstGeom>
+          <a:solidFill>
+            <a:srgbClr val="FF0000"/>
+          </a:solidFill>
+          <a:ln>
+            <a:solidFill>
+              <a:srgbClr val="FF0000"/>
+            </a:solidFill>
+          </a:ln>
+        </p:spPr>
+        <p:style>
+          <a:lnRef idx="2">
+            <a:schemeClr val="accent1">
+              <a:shade val="50000"/>
+            </a:schemeClr>
+          </a:lnRef>
+          <a:fillRef idx="1">
+            <a:schemeClr val="accent1"/>
+          </a:fillRef>
+          <a:effectRef idx="0">
+            <a:schemeClr val="accent1"/>
+          </a:effectRef>
+          <a:fontRef idx="minor">
+            <a:schemeClr val="lt1"/>
+          </a:fontRef>
+        </p:style>
+        <p:txBody>
+          <a:bodyPr rtlCol="0" anchor="ctr"/>
+          <a:lstStyle/>
+          <a:p>
+            <a:pPr algn="ctr"/>
+            <a:endParaRPr lang="es-AR"/>
+          </a:p>
+        </p:txBody>
+      </p:sp>
+      <p:grpSp>
+        <p:nvGrpSpPr>
+          <p:cNvPr id="59" name="Group 58"/>
+          <p:cNvGrpSpPr/>
+          <p:nvPr/>
+        </p:nvGrpSpPr>
+        <p:grpSpPr>
+          <a:xfrm>
+            <a:off x="9497686" y="4425710"/>
+            <a:ext cx="570971" cy="1137867"/>
+            <a:chOff x="6433078" y="2113333"/>
+            <a:chExt cx="817467" cy="990085"/>
+          </a:xfrm>
+        </p:grpSpPr>
+        <p:grpSp>
+          <p:nvGrpSpPr>
+            <p:cNvPr id="60" name="Group 59"/>
+            <p:cNvGrpSpPr/>
+            <p:nvPr/>
+          </p:nvGrpSpPr>
+          <p:grpSpPr>
+            <a:xfrm>
+              <a:off x="6433078" y="2113333"/>
+              <a:ext cx="817467" cy="990085"/>
+              <a:chOff x="9522642" y="4343916"/>
+              <a:chExt cx="879566" cy="541593"/>
+            </a:xfrm>
+          </p:grpSpPr>
+          <p:sp>
+            <p:nvSpPr>
+              <p:cNvPr id="62" name="Rounded Rectangle 61"/>
+              <p:cNvSpPr/>
+              <p:nvPr/>
+            </p:nvSpPr>
+            <p:spPr>
+              <a:xfrm>
+                <a:off x="9522642" y="4343916"/>
+                <a:ext cx="879566" cy="541593"/>
+              </a:xfrm>
+              <a:prstGeom prst="roundRect">
+                <a:avLst>
+                  <a:gd name="adj" fmla="val 7756"/>
+                </a:avLst>
+              </a:prstGeom>
+              <a:solidFill>
+                <a:schemeClr val="bg1"/>
+              </a:solidFill>
+              <a:ln w="98425">
+                <a:solidFill>
+                  <a:schemeClr val="tx1">
+                    <a:lumMod val="75000"/>
+                    <a:lumOff val="25000"/>
+                  </a:schemeClr>
+                </a:solidFill>
+              </a:ln>
+            </p:spPr>
+            <p:style>
+              <a:lnRef idx="2">
+                <a:schemeClr val="accent1">
+                  <a:shade val="50000"/>
+                </a:schemeClr>
+              </a:lnRef>
+              <a:fillRef idx="1">
+                <a:schemeClr val="accent1"/>
+              </a:fillRef>
+              <a:effectRef idx="0">
+                <a:schemeClr val="accent1"/>
+              </a:effectRef>
+              <a:fontRef idx="minor">
+                <a:schemeClr val="lt1"/>
+              </a:fontRef>
+            </p:style>
+            <p:txBody>
+              <a:bodyPr rtlCol="0" anchor="ctr"/>
+              <a:lstStyle/>
+              <a:p>
+                <a:pPr algn="ctr"/>
+                <a:endParaRPr lang="es-AR"/>
+              </a:p>
+            </p:txBody>
+          </p:sp>
+          <p:cxnSp>
+            <p:nvCxnSpPr>
+              <p:cNvPr id="63" name="Straight Connector 62"/>
+              <p:cNvCxnSpPr/>
+              <p:nvPr/>
+            </p:nvCxnSpPr>
+            <p:spPr>
+              <a:xfrm>
+                <a:off x="9640389" y="4456327"/>
+                <a:ext cx="566057" cy="0"/>
+              </a:xfrm>
+              <a:prstGeom prst="line">
+                <a:avLst/>
+              </a:prstGeom>
+              <a:ln w="76200">
+                <a:solidFill>
+                  <a:schemeClr val="tx1">
+                    <a:lumMod val="75000"/>
+                    <a:lumOff val="25000"/>
+                  </a:schemeClr>
+                </a:solidFill>
+              </a:ln>
+            </p:spPr>
+            <p:style>
+              <a:lnRef idx="1">
+                <a:schemeClr val="accent1"/>
+              </a:lnRef>
+              <a:fillRef idx="0">
+                <a:schemeClr val="accent1"/>
+              </a:fillRef>
+              <a:effectRef idx="0">
+                <a:schemeClr val="accent1"/>
+              </a:effectRef>
+              <a:fontRef idx="minor">
+                <a:schemeClr val="tx1"/>
+              </a:fontRef>
+            </p:style>
+          </p:cxnSp>
+          <p:cxnSp>
+            <p:nvCxnSpPr>
+              <p:cNvPr id="64" name="Straight Connector 63"/>
+              <p:cNvCxnSpPr/>
+              <p:nvPr/>
+            </p:nvCxnSpPr>
+            <p:spPr>
+              <a:xfrm>
+                <a:off x="9645271" y="4545831"/>
+                <a:ext cx="560911" cy="0"/>
+              </a:xfrm>
+              <a:prstGeom prst="line">
+                <a:avLst/>
+              </a:prstGeom>
+              <a:ln w="76200">
+                <a:solidFill>
+                  <a:schemeClr val="tx1">
+                    <a:lumMod val="75000"/>
+                    <a:lumOff val="25000"/>
+                  </a:schemeClr>
+                </a:solidFill>
+              </a:ln>
+            </p:spPr>
+            <p:style>
+              <a:lnRef idx="1">
+                <a:schemeClr val="accent1"/>
+              </a:lnRef>
+              <a:fillRef idx="0">
+                <a:schemeClr val="accent1"/>
+              </a:fillRef>
+              <a:effectRef idx="0">
+                <a:schemeClr val="accent1"/>
+              </a:effectRef>
+              <a:fontRef idx="minor">
+                <a:schemeClr val="tx1"/>
+              </a:fontRef>
+            </p:style>
+          </p:cxnSp>
+        </p:grpSp>
+        <p:cxnSp>
+          <p:nvCxnSpPr>
+            <p:cNvPr id="61" name="Straight Connector 60"/>
+            <p:cNvCxnSpPr/>
+            <p:nvPr/>
+          </p:nvCxnSpPr>
+          <p:spPr>
+            <a:xfrm>
+              <a:off x="6544116" y="2641398"/>
+              <a:ext cx="521701" cy="0"/>
+            </a:xfrm>
+            <a:prstGeom prst="line">
+              <a:avLst/>
+            </a:prstGeom>
+            <a:ln w="76200">
+              <a:solidFill>
+                <a:schemeClr val="tx1">
+                  <a:lumMod val="75000"/>
+                  <a:lumOff val="25000"/>
+                </a:schemeClr>
+              </a:solidFill>
+            </a:ln>
+          </p:spPr>
+          <p:style>
+            <a:lnRef idx="1">
+              <a:schemeClr val="accent1"/>
+            </a:lnRef>
+            <a:fillRef idx="0">
+              <a:schemeClr val="accent1"/>
+            </a:fillRef>
+            <a:effectRef idx="0">
+              <a:schemeClr val="accent1"/>
+            </a:effectRef>
+            <a:fontRef idx="minor">
+              <a:schemeClr val="tx1"/>
+            </a:fontRef>
+          </p:style>
+        </p:cxnSp>
+      </p:grpSp>
+      <p:pic>
+        <p:nvPicPr>
+          <p:cNvPr id="21" name="Picture 20"/>
+          <p:cNvPicPr>
+            <a:picLocks noChangeAspect="1"/>
+          </p:cNvPicPr>
+          <p:nvPr/>
+        </p:nvPicPr>
+        <p:blipFill>
+          <a:blip r:embed="rId2"/>
+          <a:stretch>
+            <a:fillRect/>
+          </a:stretch>
+        </p:blipFill>
+        <p:spPr>
+          <a:xfrm>
+            <a:off x="8801100" y="5013382"/>
+            <a:ext cx="571500" cy="586808"/>
+          </a:xfrm>
+          <a:prstGeom prst="rect">
+            <a:avLst/>
+          </a:prstGeom>
+        </p:spPr>
+      </p:pic>
     </p:spTree>
     <p:extLst>
       <p:ext uri="{BB962C8B-B14F-4D97-AF65-F5344CB8AC3E}">
         <p14:creationId xmlns:p14="http://schemas.microsoft.com/office/powerpoint/2010/main" val="3968463729"/>
+      </p:ext>
+    </p:extLst>
+  </p:cSld>
+  <p:clrMapOvr>
+    <a:masterClrMapping/>
+  </p:clrMapOvr>
+</p:sld>
+</file>
+
+<file path=ppt/slides/slide4.xml><?xml version="1.0" encoding="utf-8"?>
+<p:sld xmlns:a="http://schemas.openxmlformats.org/drawingml/2006/main" xmlns:r="http://schemas.openxmlformats.org/officeDocument/2006/relationships" xmlns:p="http://schemas.openxmlformats.org/presentationml/2006/main">
+  <p:cSld>
+    <p:spTree>
+      <p:nvGrpSpPr>
+        <p:cNvPr id="1" name=""/>
+        <p:cNvGrpSpPr/>
+        <p:nvPr/>
+      </p:nvGrpSpPr>
+      <p:grpSpPr>
+        <a:xfrm>
+          <a:off x="0" y="0"/>
+          <a:ext cx="0" cy="0"/>
+          <a:chOff x="0" y="0"/>
+          <a:chExt cx="0" cy="0"/>
+        </a:xfrm>
+      </p:grpSpPr>
+      <p:sp>
+        <p:nvSpPr>
+          <p:cNvPr id="58" name="Rectangle 57"/>
+          <p:cNvSpPr/>
+          <p:nvPr/>
+        </p:nvSpPr>
+        <p:spPr>
+          <a:xfrm>
+            <a:off x="10300853" y="1011985"/>
+            <a:ext cx="1089891" cy="1432162"/>
+          </a:xfrm>
+          <a:prstGeom prst="rect">
+            <a:avLst/>
+          </a:prstGeom>
+          <a:noFill/>
+          <a:ln w="127000">
+            <a:solidFill>
+              <a:schemeClr val="tx1">
+                <a:lumMod val="65000"/>
+                <a:lumOff val="35000"/>
+              </a:schemeClr>
+            </a:solidFill>
+          </a:ln>
+        </p:spPr>
+        <p:style>
+          <a:lnRef idx="2">
+            <a:schemeClr val="accent1">
+              <a:shade val="50000"/>
+            </a:schemeClr>
+          </a:lnRef>
+          <a:fillRef idx="1">
+            <a:schemeClr val="accent1"/>
+          </a:fillRef>
+          <a:effectRef idx="0">
+            <a:schemeClr val="accent1"/>
+          </a:effectRef>
+          <a:fontRef idx="minor">
+            <a:schemeClr val="lt1"/>
+          </a:fontRef>
+        </p:style>
+        <p:txBody>
+          <a:bodyPr rtlCol="0" anchor="ctr"/>
+          <a:lstStyle/>
+          <a:p>
+            <a:pPr algn="ctr"/>
+            <a:endParaRPr lang="es-AR"/>
+          </a:p>
+        </p:txBody>
+      </p:sp>
+      <p:sp>
+        <p:nvSpPr>
+          <p:cNvPr id="82" name="Parallelogram 81"/>
+          <p:cNvSpPr/>
+          <p:nvPr/>
+        </p:nvSpPr>
+        <p:spPr>
+          <a:xfrm rot="16200000">
+            <a:off x="9721141" y="1114292"/>
+            <a:ext cx="861553" cy="250540"/>
+          </a:xfrm>
+          <a:prstGeom prst="parallelogram">
+            <a:avLst>
+              <a:gd name="adj" fmla="val 110455"/>
+            </a:avLst>
+          </a:prstGeom>
+          <a:solidFill>
+            <a:srgbClr val="01FD07"/>
+          </a:solidFill>
+        </p:spPr>
+        <p:style>
+          <a:lnRef idx="2">
+            <a:schemeClr val="accent1">
+              <a:shade val="50000"/>
+            </a:schemeClr>
+          </a:lnRef>
+          <a:fillRef idx="1">
+            <a:schemeClr val="accent1"/>
+          </a:fillRef>
+          <a:effectRef idx="0">
+            <a:schemeClr val="accent1"/>
+          </a:effectRef>
+          <a:fontRef idx="minor">
+            <a:schemeClr val="lt1"/>
+          </a:fontRef>
+        </p:style>
+        <p:txBody>
+          <a:bodyPr rtlCol="0" anchor="ctr"/>
+          <a:lstStyle/>
+          <a:p>
+            <a:pPr algn="ctr"/>
+            <a:endParaRPr lang="es-AR"/>
+          </a:p>
+        </p:txBody>
+      </p:sp>
+      <p:sp>
+        <p:nvSpPr>
+          <p:cNvPr id="83" name="Parallelogram 82"/>
+          <p:cNvSpPr/>
+          <p:nvPr/>
+        </p:nvSpPr>
+        <p:spPr>
+          <a:xfrm rot="10800000" flipH="1">
+            <a:off x="10085225" y="849742"/>
+            <a:ext cx="677516" cy="184781"/>
+          </a:xfrm>
+          <a:prstGeom prst="parallelogram">
+            <a:avLst>
+              <a:gd name="adj" fmla="val 99395"/>
+            </a:avLst>
+          </a:prstGeom>
+          <a:solidFill>
+            <a:srgbClr val="01FD07"/>
+          </a:solidFill>
+        </p:spPr>
+        <p:style>
+          <a:lnRef idx="2">
+            <a:schemeClr val="accent1">
+              <a:shade val="50000"/>
+            </a:schemeClr>
+          </a:lnRef>
+          <a:fillRef idx="1">
+            <a:schemeClr val="accent1"/>
+          </a:fillRef>
+          <a:effectRef idx="0">
+            <a:schemeClr val="accent1"/>
+          </a:effectRef>
+          <a:fontRef idx="minor">
+            <a:schemeClr val="lt1"/>
+          </a:fontRef>
+        </p:style>
+        <p:txBody>
+          <a:bodyPr rtlCol="0" anchor="ctr"/>
+          <a:lstStyle/>
+          <a:p>
+            <a:pPr algn="ctr"/>
+            <a:endParaRPr lang="es-AR"/>
+          </a:p>
+        </p:txBody>
+      </p:sp>
+      <p:sp>
+        <p:nvSpPr>
+          <p:cNvPr id="5" name="Rectangle 4"/>
+          <p:cNvSpPr/>
+          <p:nvPr/>
+        </p:nvSpPr>
+        <p:spPr>
+          <a:xfrm>
+            <a:off x="5876636" y="808785"/>
+            <a:ext cx="1089891" cy="1432162"/>
+          </a:xfrm>
+          <a:prstGeom prst="rect">
+            <a:avLst/>
+          </a:prstGeom>
+          <a:noFill/>
+          <a:ln w="127000">
+            <a:solidFill>
+              <a:schemeClr val="tx1">
+                <a:lumMod val="65000"/>
+                <a:lumOff val="35000"/>
+              </a:schemeClr>
+            </a:solidFill>
+          </a:ln>
+        </p:spPr>
+        <p:style>
+          <a:lnRef idx="2">
+            <a:schemeClr val="accent1">
+              <a:shade val="50000"/>
+            </a:schemeClr>
+          </a:lnRef>
+          <a:fillRef idx="1">
+            <a:schemeClr val="accent1"/>
+          </a:fillRef>
+          <a:effectRef idx="0">
+            <a:schemeClr val="accent1"/>
+          </a:effectRef>
+          <a:fontRef idx="minor">
+            <a:schemeClr val="lt1"/>
+          </a:fontRef>
+        </p:style>
+        <p:txBody>
+          <a:bodyPr rtlCol="0" anchor="ctr"/>
+          <a:lstStyle/>
+          <a:p>
+            <a:pPr algn="ctr"/>
+            <a:endParaRPr lang="es-AR"/>
+          </a:p>
+        </p:txBody>
+      </p:sp>
+      <p:cxnSp>
+        <p:nvCxnSpPr>
+          <p:cNvPr id="6" name="Straight Connector 5"/>
+          <p:cNvCxnSpPr>
+            <a:stCxn id="5" idx="0"/>
+            <a:endCxn id="5" idx="2"/>
+          </p:cNvCxnSpPr>
+          <p:nvPr/>
+        </p:nvCxnSpPr>
+        <p:spPr>
+          <a:xfrm>
+            <a:off x="6421582" y="808785"/>
+            <a:ext cx="0" cy="1432162"/>
+          </a:xfrm>
+          <a:prstGeom prst="line">
+            <a:avLst/>
+          </a:prstGeom>
+          <a:ln w="57150">
+            <a:solidFill>
+              <a:schemeClr val="tx1">
+                <a:lumMod val="65000"/>
+                <a:lumOff val="35000"/>
+              </a:schemeClr>
+            </a:solidFill>
+          </a:ln>
+        </p:spPr>
+        <p:style>
+          <a:lnRef idx="1">
+            <a:schemeClr val="accent1"/>
+          </a:lnRef>
+          <a:fillRef idx="0">
+            <a:schemeClr val="accent1"/>
+          </a:fillRef>
+          <a:effectRef idx="0">
+            <a:schemeClr val="accent1"/>
+          </a:effectRef>
+          <a:fontRef idx="minor">
+            <a:schemeClr val="tx1"/>
+          </a:fontRef>
+        </p:style>
+      </p:cxnSp>
+      <p:cxnSp>
+        <p:nvCxnSpPr>
+          <p:cNvPr id="7" name="Straight Connector 6"/>
+          <p:cNvCxnSpPr>
+            <a:stCxn id="5" idx="3"/>
+            <a:endCxn id="5" idx="1"/>
+          </p:cNvCxnSpPr>
+          <p:nvPr/>
+        </p:nvCxnSpPr>
+        <p:spPr>
+          <a:xfrm flipH="1">
+            <a:off x="5876636" y="1524866"/>
+            <a:ext cx="1089891" cy="0"/>
+          </a:xfrm>
+          <a:prstGeom prst="line">
+            <a:avLst/>
+          </a:prstGeom>
+          <a:ln w="57150">
+            <a:solidFill>
+              <a:schemeClr val="tx1">
+                <a:lumMod val="65000"/>
+                <a:lumOff val="35000"/>
+              </a:schemeClr>
+            </a:solidFill>
+          </a:ln>
+        </p:spPr>
+        <p:style>
+          <a:lnRef idx="1">
+            <a:schemeClr val="accent1"/>
+          </a:lnRef>
+          <a:fillRef idx="0">
+            <a:schemeClr val="accent1"/>
+          </a:fillRef>
+          <a:effectRef idx="0">
+            <a:schemeClr val="accent1"/>
+          </a:effectRef>
+          <a:fontRef idx="minor">
+            <a:schemeClr val="tx1"/>
+          </a:fontRef>
+        </p:style>
+      </p:cxnSp>
+      <p:sp>
+        <p:nvSpPr>
+          <p:cNvPr id="8" name="Rectangle 7"/>
+          <p:cNvSpPr/>
+          <p:nvPr/>
+        </p:nvSpPr>
+        <p:spPr>
+          <a:xfrm>
+            <a:off x="3166052" y="1173358"/>
+            <a:ext cx="1089891" cy="1432162"/>
+          </a:xfrm>
+          <a:prstGeom prst="rect">
+            <a:avLst/>
+          </a:prstGeom>
+          <a:noFill/>
+          <a:ln w="127000">
+            <a:solidFill>
+              <a:schemeClr val="tx1">
+                <a:lumMod val="65000"/>
+                <a:lumOff val="35000"/>
+              </a:schemeClr>
+            </a:solidFill>
+          </a:ln>
+        </p:spPr>
+        <p:style>
+          <a:lnRef idx="2">
+            <a:schemeClr val="accent1">
+              <a:shade val="50000"/>
+            </a:schemeClr>
+          </a:lnRef>
+          <a:fillRef idx="1">
+            <a:schemeClr val="accent1"/>
+          </a:fillRef>
+          <a:effectRef idx="0">
+            <a:schemeClr val="accent1"/>
+          </a:effectRef>
+          <a:fontRef idx="minor">
+            <a:schemeClr val="lt1"/>
+          </a:fontRef>
+        </p:style>
+        <p:txBody>
+          <a:bodyPr rtlCol="0" anchor="ctr"/>
+          <a:lstStyle/>
+          <a:p>
+            <a:pPr algn="ctr"/>
+            <a:endParaRPr lang="es-AR"/>
+          </a:p>
+        </p:txBody>
+      </p:sp>
+      <p:cxnSp>
+        <p:nvCxnSpPr>
+          <p:cNvPr id="9" name="Straight Connector 8"/>
+          <p:cNvCxnSpPr>
+            <a:stCxn id="8" idx="0"/>
+            <a:endCxn id="8" idx="2"/>
+          </p:cNvCxnSpPr>
+          <p:nvPr/>
+        </p:nvCxnSpPr>
+        <p:spPr>
+          <a:xfrm>
+            <a:off x="3710998" y="1173358"/>
+            <a:ext cx="0" cy="1432162"/>
+          </a:xfrm>
+          <a:prstGeom prst="line">
+            <a:avLst/>
+          </a:prstGeom>
+          <a:ln w="127000">
+            <a:solidFill>
+              <a:schemeClr val="tx1">
+                <a:lumMod val="65000"/>
+                <a:lumOff val="35000"/>
+              </a:schemeClr>
+            </a:solidFill>
+          </a:ln>
+        </p:spPr>
+        <p:style>
+          <a:lnRef idx="1">
+            <a:schemeClr val="accent1"/>
+          </a:lnRef>
+          <a:fillRef idx="0">
+            <a:schemeClr val="accent1"/>
+          </a:fillRef>
+          <a:effectRef idx="0">
+            <a:schemeClr val="accent1"/>
+          </a:effectRef>
+          <a:fontRef idx="minor">
+            <a:schemeClr val="tx1"/>
+          </a:fontRef>
+        </p:style>
+      </p:cxnSp>
+      <p:cxnSp>
+        <p:nvCxnSpPr>
+          <p:cNvPr id="10" name="Straight Connector 9"/>
+          <p:cNvCxnSpPr>
+            <a:stCxn id="8" idx="3"/>
+            <a:endCxn id="8" idx="1"/>
+          </p:cNvCxnSpPr>
+          <p:nvPr/>
+        </p:nvCxnSpPr>
+        <p:spPr>
+          <a:xfrm flipH="1">
+            <a:off x="3166052" y="1889439"/>
+            <a:ext cx="1089891" cy="0"/>
+          </a:xfrm>
+          <a:prstGeom prst="line">
+            <a:avLst/>
+          </a:prstGeom>
+          <a:ln w="127000">
+            <a:solidFill>
+              <a:schemeClr val="tx1">
+                <a:lumMod val="65000"/>
+                <a:lumOff val="35000"/>
+              </a:schemeClr>
+            </a:solidFill>
+          </a:ln>
+        </p:spPr>
+        <p:style>
+          <a:lnRef idx="1">
+            <a:schemeClr val="accent1"/>
+          </a:lnRef>
+          <a:fillRef idx="0">
+            <a:schemeClr val="accent1"/>
+          </a:fillRef>
+          <a:effectRef idx="0">
+            <a:schemeClr val="accent1"/>
+          </a:effectRef>
+          <a:fontRef idx="minor">
+            <a:schemeClr val="tx1"/>
+          </a:fontRef>
+        </p:style>
+      </p:cxnSp>
+      <p:cxnSp>
+        <p:nvCxnSpPr>
+          <p:cNvPr id="11" name="Straight Connector 10"/>
+          <p:cNvCxnSpPr/>
+          <p:nvPr/>
+        </p:nvCxnSpPr>
+        <p:spPr>
+          <a:xfrm>
+            <a:off x="5387109" y="529071"/>
+            <a:ext cx="495300" cy="314325"/>
+          </a:xfrm>
+          <a:prstGeom prst="line">
+            <a:avLst/>
+          </a:prstGeom>
+          <a:ln w="127000">
+            <a:solidFill>
+              <a:schemeClr val="tx1">
+                <a:lumMod val="65000"/>
+                <a:lumOff val="35000"/>
+              </a:schemeClr>
+            </a:solidFill>
+          </a:ln>
+        </p:spPr>
+        <p:style>
+          <a:lnRef idx="1">
+            <a:schemeClr val="accent1"/>
+          </a:lnRef>
+          <a:fillRef idx="0">
+            <a:schemeClr val="accent1"/>
+          </a:fillRef>
+          <a:effectRef idx="0">
+            <a:schemeClr val="accent1"/>
+          </a:effectRef>
+          <a:fontRef idx="minor">
+            <a:schemeClr val="tx1"/>
+          </a:fontRef>
+        </p:style>
+      </p:cxnSp>
+      <p:cxnSp>
+        <p:nvCxnSpPr>
+          <p:cNvPr id="16" name="Straight Connector 15"/>
+          <p:cNvCxnSpPr/>
+          <p:nvPr/>
+        </p:nvCxnSpPr>
+        <p:spPr>
+          <a:xfrm>
+            <a:off x="5388842" y="452871"/>
+            <a:ext cx="0" cy="1019175"/>
+          </a:xfrm>
+          <a:prstGeom prst="line">
+            <a:avLst/>
+          </a:prstGeom>
+          <a:ln w="127000">
+            <a:solidFill>
+              <a:schemeClr val="tx1">
+                <a:lumMod val="65000"/>
+                <a:lumOff val="35000"/>
+              </a:schemeClr>
+            </a:solidFill>
+          </a:ln>
+        </p:spPr>
+        <p:style>
+          <a:lnRef idx="1">
+            <a:schemeClr val="accent1"/>
+          </a:lnRef>
+          <a:fillRef idx="0">
+            <a:schemeClr val="accent1"/>
+          </a:fillRef>
+          <a:effectRef idx="0">
+            <a:schemeClr val="accent1"/>
+          </a:effectRef>
+          <a:fontRef idx="minor">
+            <a:schemeClr val="tx1"/>
+          </a:fontRef>
+        </p:style>
+      </p:cxnSp>
+      <p:cxnSp>
+        <p:nvCxnSpPr>
+          <p:cNvPr id="18" name="Straight Connector 17"/>
+          <p:cNvCxnSpPr/>
+          <p:nvPr/>
+        </p:nvCxnSpPr>
+        <p:spPr>
+          <a:xfrm>
+            <a:off x="5381625" y="1438275"/>
+            <a:ext cx="485775" cy="831850"/>
+          </a:xfrm>
+          <a:prstGeom prst="line">
+            <a:avLst/>
+          </a:prstGeom>
+          <a:ln w="127000">
+            <a:solidFill>
+              <a:schemeClr val="tx1">
+                <a:lumMod val="65000"/>
+                <a:lumOff val="35000"/>
+              </a:schemeClr>
+            </a:solidFill>
+          </a:ln>
+        </p:spPr>
+        <p:style>
+          <a:lnRef idx="1">
+            <a:schemeClr val="accent1"/>
+          </a:lnRef>
+          <a:fillRef idx="0">
+            <a:schemeClr val="accent1"/>
+          </a:fillRef>
+          <a:effectRef idx="0">
+            <a:schemeClr val="accent1"/>
+          </a:effectRef>
+          <a:fontRef idx="minor">
+            <a:schemeClr val="tx1"/>
+          </a:fontRef>
+        </p:style>
+      </p:cxnSp>
+      <p:cxnSp>
+        <p:nvCxnSpPr>
+          <p:cNvPr id="23" name="Straight Connector 22"/>
+          <p:cNvCxnSpPr/>
+          <p:nvPr/>
+        </p:nvCxnSpPr>
+        <p:spPr>
+          <a:xfrm flipV="1">
+            <a:off x="5349009" y="511363"/>
+            <a:ext cx="885825" cy="8186"/>
+          </a:xfrm>
+          <a:prstGeom prst="line">
+            <a:avLst/>
+          </a:prstGeom>
+          <a:ln w="127000">
+            <a:solidFill>
+              <a:schemeClr val="tx1">
+                <a:lumMod val="65000"/>
+                <a:lumOff val="35000"/>
+              </a:schemeClr>
+            </a:solidFill>
+          </a:ln>
+        </p:spPr>
+        <p:style>
+          <a:lnRef idx="1">
+            <a:schemeClr val="accent1"/>
+          </a:lnRef>
+          <a:fillRef idx="0">
+            <a:schemeClr val="accent1"/>
+          </a:fillRef>
+          <a:effectRef idx="0">
+            <a:schemeClr val="accent1"/>
+          </a:effectRef>
+          <a:fontRef idx="minor">
+            <a:schemeClr val="tx1"/>
+          </a:fontRef>
+        </p:style>
+      </p:cxnSp>
+      <p:cxnSp>
+        <p:nvCxnSpPr>
+          <p:cNvPr id="27" name="Straight Connector 26"/>
+          <p:cNvCxnSpPr/>
+          <p:nvPr/>
+        </p:nvCxnSpPr>
+        <p:spPr>
+          <a:xfrm>
+            <a:off x="6207125" y="504825"/>
+            <a:ext cx="803275" cy="301625"/>
+          </a:xfrm>
+          <a:prstGeom prst="line">
+            <a:avLst/>
+          </a:prstGeom>
+          <a:ln w="127000">
+            <a:solidFill>
+              <a:schemeClr val="tx1">
+                <a:lumMod val="65000"/>
+                <a:lumOff val="35000"/>
+              </a:schemeClr>
+            </a:solidFill>
+          </a:ln>
+        </p:spPr>
+        <p:style>
+          <a:lnRef idx="1">
+            <a:schemeClr val="accent1"/>
+          </a:lnRef>
+          <a:fillRef idx="0">
+            <a:schemeClr val="accent1"/>
+          </a:fillRef>
+          <a:effectRef idx="0">
+            <a:schemeClr val="accent1"/>
+          </a:effectRef>
+          <a:fontRef idx="minor">
+            <a:schemeClr val="tx1"/>
+          </a:fontRef>
+        </p:style>
+      </p:cxnSp>
+      <p:cxnSp>
+        <p:nvCxnSpPr>
+          <p:cNvPr id="31" name="Straight Connector 30"/>
+          <p:cNvCxnSpPr/>
+          <p:nvPr/>
+        </p:nvCxnSpPr>
+        <p:spPr>
+          <a:xfrm>
+            <a:off x="5602432" y="671946"/>
+            <a:ext cx="0" cy="1092751"/>
+          </a:xfrm>
+          <a:prstGeom prst="line">
+            <a:avLst/>
+          </a:prstGeom>
+          <a:ln w="57150">
+            <a:solidFill>
+              <a:schemeClr val="tx1">
+                <a:lumMod val="65000"/>
+                <a:lumOff val="35000"/>
+              </a:schemeClr>
+            </a:solidFill>
+          </a:ln>
+        </p:spPr>
+        <p:style>
+          <a:lnRef idx="1">
+            <a:schemeClr val="accent1"/>
+          </a:lnRef>
+          <a:fillRef idx="0">
+            <a:schemeClr val="accent1"/>
+          </a:fillRef>
+          <a:effectRef idx="0">
+            <a:schemeClr val="accent1"/>
+          </a:effectRef>
+          <a:fontRef idx="minor">
+            <a:schemeClr val="tx1"/>
+          </a:fontRef>
+        </p:style>
+      </p:cxnSp>
+      <p:cxnSp>
+        <p:nvCxnSpPr>
+          <p:cNvPr id="33" name="Straight Connector 32"/>
+          <p:cNvCxnSpPr/>
+          <p:nvPr/>
+        </p:nvCxnSpPr>
+        <p:spPr>
+          <a:xfrm>
+            <a:off x="5368059" y="971983"/>
+            <a:ext cx="514350" cy="547688"/>
+          </a:xfrm>
+          <a:prstGeom prst="line">
+            <a:avLst/>
+          </a:prstGeom>
+          <a:ln w="57150">
+            <a:solidFill>
+              <a:schemeClr val="tx1">
+                <a:lumMod val="65000"/>
+                <a:lumOff val="35000"/>
+              </a:schemeClr>
+            </a:solidFill>
+          </a:ln>
+        </p:spPr>
+        <p:style>
+          <a:lnRef idx="1">
+            <a:schemeClr val="accent1"/>
+          </a:lnRef>
+          <a:fillRef idx="0">
+            <a:schemeClr val="accent1"/>
+          </a:fillRef>
+          <a:effectRef idx="0">
+            <a:schemeClr val="accent1"/>
+          </a:effectRef>
+          <a:fontRef idx="minor">
+            <a:schemeClr val="tx1"/>
+          </a:fontRef>
+        </p:style>
+      </p:cxnSp>
+      <p:cxnSp>
+        <p:nvCxnSpPr>
+          <p:cNvPr id="37" name="Straight Connector 36"/>
+          <p:cNvCxnSpPr>
+            <a:endCxn id="5" idx="0"/>
+          </p:cNvCxnSpPr>
+          <p:nvPr/>
+        </p:nvCxnSpPr>
+        <p:spPr>
+          <a:xfrm>
+            <a:off x="5863360" y="519549"/>
+            <a:ext cx="558222" cy="289236"/>
+          </a:xfrm>
+          <a:prstGeom prst="line">
+            <a:avLst/>
+          </a:prstGeom>
+          <a:ln w="57150">
+            <a:solidFill>
+              <a:schemeClr val="tx1">
+                <a:lumMod val="65000"/>
+                <a:lumOff val="35000"/>
+              </a:schemeClr>
+            </a:solidFill>
+          </a:ln>
+        </p:spPr>
+        <p:style>
+          <a:lnRef idx="1">
+            <a:schemeClr val="accent1"/>
+          </a:lnRef>
+          <a:fillRef idx="0">
+            <a:schemeClr val="accent1"/>
+          </a:fillRef>
+          <a:effectRef idx="0">
+            <a:schemeClr val="accent1"/>
+          </a:effectRef>
+          <a:fontRef idx="minor">
+            <a:schemeClr val="tx1"/>
+          </a:fontRef>
+        </p:style>
+      </p:cxnSp>
+      <p:cxnSp>
+        <p:nvCxnSpPr>
+          <p:cNvPr id="40" name="Straight Connector 39"/>
+          <p:cNvCxnSpPr/>
+          <p:nvPr/>
+        </p:nvCxnSpPr>
+        <p:spPr>
+          <a:xfrm>
+            <a:off x="5621481" y="666111"/>
+            <a:ext cx="908628" cy="3691"/>
+          </a:xfrm>
+          <a:prstGeom prst="line">
+            <a:avLst/>
+          </a:prstGeom>
+          <a:ln w="57150">
+            <a:solidFill>
+              <a:schemeClr val="tx1">
+                <a:lumMod val="65000"/>
+                <a:lumOff val="35000"/>
+              </a:schemeClr>
+            </a:solidFill>
+          </a:ln>
+        </p:spPr>
+        <p:style>
+          <a:lnRef idx="1">
+            <a:schemeClr val="accent1"/>
+          </a:lnRef>
+          <a:fillRef idx="0">
+            <a:schemeClr val="accent1"/>
+          </a:fillRef>
+          <a:effectRef idx="0">
+            <a:schemeClr val="accent1"/>
+          </a:effectRef>
+          <a:fontRef idx="minor">
+            <a:schemeClr val="tx1"/>
+          </a:fontRef>
+        </p:style>
+      </p:cxnSp>
+      <p:sp>
+        <p:nvSpPr>
+          <p:cNvPr id="44" name="Rectangle 43"/>
+          <p:cNvSpPr/>
+          <p:nvPr/>
+        </p:nvSpPr>
+        <p:spPr>
+          <a:xfrm>
+            <a:off x="7885544" y="859585"/>
+            <a:ext cx="1089891" cy="1432162"/>
+          </a:xfrm>
+          <a:prstGeom prst="rect">
+            <a:avLst/>
+          </a:prstGeom>
+          <a:noFill/>
+          <a:ln w="127000">
+            <a:solidFill>
+              <a:schemeClr val="tx1">
+                <a:lumMod val="65000"/>
+                <a:lumOff val="35000"/>
+              </a:schemeClr>
+            </a:solidFill>
+          </a:ln>
+        </p:spPr>
+        <p:style>
+          <a:lnRef idx="2">
+            <a:schemeClr val="accent1">
+              <a:shade val="50000"/>
+            </a:schemeClr>
+          </a:lnRef>
+          <a:fillRef idx="1">
+            <a:schemeClr val="accent1"/>
+          </a:fillRef>
+          <a:effectRef idx="0">
+            <a:schemeClr val="accent1"/>
+          </a:effectRef>
+          <a:fontRef idx="minor">
+            <a:schemeClr val="lt1"/>
+          </a:fontRef>
+        </p:style>
+        <p:txBody>
+          <a:bodyPr rtlCol="0" anchor="ctr"/>
+          <a:lstStyle/>
+          <a:p>
+            <a:pPr algn="ctr"/>
+            <a:endParaRPr lang="es-AR"/>
+          </a:p>
+        </p:txBody>
+      </p:sp>
+      <p:cxnSp>
+        <p:nvCxnSpPr>
+          <p:cNvPr id="45" name="Straight Connector 44"/>
+          <p:cNvCxnSpPr>
+            <a:stCxn id="44" idx="0"/>
+            <a:endCxn id="44" idx="2"/>
+          </p:cNvCxnSpPr>
+          <p:nvPr/>
+        </p:nvCxnSpPr>
+        <p:spPr>
+          <a:xfrm>
+            <a:off x="8430490" y="859585"/>
+            <a:ext cx="0" cy="1432162"/>
+          </a:xfrm>
+          <a:prstGeom prst="line">
+            <a:avLst/>
+          </a:prstGeom>
+          <a:ln w="57150">
+            <a:solidFill>
+              <a:schemeClr val="tx1">
+                <a:lumMod val="65000"/>
+                <a:lumOff val="35000"/>
+              </a:schemeClr>
+            </a:solidFill>
+          </a:ln>
+        </p:spPr>
+        <p:style>
+          <a:lnRef idx="1">
+            <a:schemeClr val="accent1"/>
+          </a:lnRef>
+          <a:fillRef idx="0">
+            <a:schemeClr val="accent1"/>
+          </a:fillRef>
+          <a:effectRef idx="0">
+            <a:schemeClr val="accent1"/>
+          </a:effectRef>
+          <a:fontRef idx="minor">
+            <a:schemeClr val="tx1"/>
+          </a:fontRef>
+        </p:style>
+      </p:cxnSp>
+      <p:cxnSp>
+        <p:nvCxnSpPr>
+          <p:cNvPr id="46" name="Straight Connector 45"/>
+          <p:cNvCxnSpPr>
+            <a:stCxn id="44" idx="3"/>
+            <a:endCxn id="44" idx="1"/>
+          </p:cNvCxnSpPr>
+          <p:nvPr/>
+        </p:nvCxnSpPr>
+        <p:spPr>
+          <a:xfrm flipH="1">
+            <a:off x="7885544" y="1575666"/>
+            <a:ext cx="1089891" cy="0"/>
+          </a:xfrm>
+          <a:prstGeom prst="line">
+            <a:avLst/>
+          </a:prstGeom>
+          <a:ln w="57150">
+            <a:solidFill>
+              <a:schemeClr val="tx1">
+                <a:lumMod val="65000"/>
+                <a:lumOff val="35000"/>
+              </a:schemeClr>
+            </a:solidFill>
+          </a:ln>
+        </p:spPr>
+        <p:style>
+          <a:lnRef idx="1">
+            <a:schemeClr val="accent1"/>
+          </a:lnRef>
+          <a:fillRef idx="0">
+            <a:schemeClr val="accent1"/>
+          </a:fillRef>
+          <a:effectRef idx="0">
+            <a:schemeClr val="accent1"/>
+          </a:effectRef>
+          <a:fontRef idx="minor">
+            <a:schemeClr val="tx1"/>
+          </a:fontRef>
+        </p:style>
+      </p:cxnSp>
+      <p:cxnSp>
+        <p:nvCxnSpPr>
+          <p:cNvPr id="47" name="Straight Connector 46"/>
+          <p:cNvCxnSpPr/>
+          <p:nvPr/>
+        </p:nvCxnSpPr>
+        <p:spPr>
+          <a:xfrm>
+            <a:off x="7396017" y="579871"/>
+            <a:ext cx="495300" cy="314325"/>
+          </a:xfrm>
+          <a:prstGeom prst="line">
+            <a:avLst/>
+          </a:prstGeom>
+          <a:ln w="127000">
+            <a:solidFill>
+              <a:schemeClr val="tx1">
+                <a:lumMod val="65000"/>
+                <a:lumOff val="35000"/>
+              </a:schemeClr>
+            </a:solidFill>
+          </a:ln>
+        </p:spPr>
+        <p:style>
+          <a:lnRef idx="1">
+            <a:schemeClr val="accent1"/>
+          </a:lnRef>
+          <a:fillRef idx="0">
+            <a:schemeClr val="accent1"/>
+          </a:fillRef>
+          <a:effectRef idx="0">
+            <a:schemeClr val="accent1"/>
+          </a:effectRef>
+          <a:fontRef idx="minor">
+            <a:schemeClr val="tx1"/>
+          </a:fontRef>
+        </p:style>
+      </p:cxnSp>
+      <p:cxnSp>
+        <p:nvCxnSpPr>
+          <p:cNvPr id="48" name="Straight Connector 47"/>
+          <p:cNvCxnSpPr/>
+          <p:nvPr/>
+        </p:nvCxnSpPr>
+        <p:spPr>
+          <a:xfrm>
+            <a:off x="7419975" y="513196"/>
+            <a:ext cx="0" cy="1019175"/>
+          </a:xfrm>
+          <a:prstGeom prst="line">
+            <a:avLst/>
+          </a:prstGeom>
+          <a:ln w="127000">
+            <a:solidFill>
+              <a:schemeClr val="tx1">
+                <a:lumMod val="65000"/>
+                <a:lumOff val="35000"/>
+              </a:schemeClr>
+            </a:solidFill>
+          </a:ln>
+        </p:spPr>
+        <p:style>
+          <a:lnRef idx="1">
+            <a:schemeClr val="accent1"/>
+          </a:lnRef>
+          <a:fillRef idx="0">
+            <a:schemeClr val="accent1"/>
+          </a:fillRef>
+          <a:effectRef idx="0">
+            <a:schemeClr val="accent1"/>
+          </a:effectRef>
+          <a:fontRef idx="minor">
+            <a:schemeClr val="tx1"/>
+          </a:fontRef>
+        </p:style>
+      </p:cxnSp>
+      <p:cxnSp>
+        <p:nvCxnSpPr>
+          <p:cNvPr id="49" name="Straight Connector 48"/>
+          <p:cNvCxnSpPr/>
+          <p:nvPr/>
+        </p:nvCxnSpPr>
+        <p:spPr>
+          <a:xfrm>
+            <a:off x="7416800" y="1498600"/>
+            <a:ext cx="466725" cy="831850"/>
+          </a:xfrm>
+          <a:prstGeom prst="line">
+            <a:avLst/>
+          </a:prstGeom>
+          <a:ln w="127000">
+            <a:solidFill>
+              <a:schemeClr val="tx1">
+                <a:lumMod val="65000"/>
+                <a:lumOff val="35000"/>
+              </a:schemeClr>
+            </a:solidFill>
+          </a:ln>
+        </p:spPr>
+        <p:style>
+          <a:lnRef idx="1">
+            <a:schemeClr val="accent1"/>
+          </a:lnRef>
+          <a:fillRef idx="0">
+            <a:schemeClr val="accent1"/>
+          </a:fillRef>
+          <a:effectRef idx="0">
+            <a:schemeClr val="accent1"/>
+          </a:effectRef>
+          <a:fontRef idx="minor">
+            <a:schemeClr val="tx1"/>
+          </a:fontRef>
+        </p:style>
+      </p:cxnSp>
+      <p:cxnSp>
+        <p:nvCxnSpPr>
+          <p:cNvPr id="50" name="Straight Connector 49"/>
+          <p:cNvCxnSpPr/>
+          <p:nvPr/>
+        </p:nvCxnSpPr>
+        <p:spPr>
+          <a:xfrm flipV="1">
+            <a:off x="7357917" y="562163"/>
+            <a:ext cx="885825" cy="8186"/>
+          </a:xfrm>
+          <a:prstGeom prst="line">
+            <a:avLst/>
+          </a:prstGeom>
+          <a:ln w="127000">
+            <a:solidFill>
+              <a:schemeClr val="tx1">
+                <a:lumMod val="65000"/>
+                <a:lumOff val="35000"/>
+              </a:schemeClr>
+            </a:solidFill>
+          </a:ln>
+        </p:spPr>
+        <p:style>
+          <a:lnRef idx="1">
+            <a:schemeClr val="accent1"/>
+          </a:lnRef>
+          <a:fillRef idx="0">
+            <a:schemeClr val="accent1"/>
+          </a:fillRef>
+          <a:effectRef idx="0">
+            <a:schemeClr val="accent1"/>
+          </a:effectRef>
+          <a:fontRef idx="minor">
+            <a:schemeClr val="tx1"/>
+          </a:fontRef>
+        </p:style>
+      </p:cxnSp>
+      <p:cxnSp>
+        <p:nvCxnSpPr>
+          <p:cNvPr id="51" name="Straight Connector 50"/>
+          <p:cNvCxnSpPr/>
+          <p:nvPr/>
+        </p:nvCxnSpPr>
+        <p:spPr>
+          <a:xfrm>
+            <a:off x="8216900" y="558800"/>
+            <a:ext cx="796925" cy="298450"/>
+          </a:xfrm>
+          <a:prstGeom prst="line">
+            <a:avLst/>
+          </a:prstGeom>
+          <a:ln w="127000">
+            <a:solidFill>
+              <a:schemeClr val="tx1">
+                <a:lumMod val="65000"/>
+                <a:lumOff val="35000"/>
+              </a:schemeClr>
+            </a:solidFill>
+          </a:ln>
+        </p:spPr>
+        <p:style>
+          <a:lnRef idx="1">
+            <a:schemeClr val="accent1"/>
+          </a:lnRef>
+          <a:fillRef idx="0">
+            <a:schemeClr val="accent1"/>
+          </a:fillRef>
+          <a:effectRef idx="0">
+            <a:schemeClr val="accent1"/>
+          </a:effectRef>
+          <a:fontRef idx="minor">
+            <a:schemeClr val="tx1"/>
+          </a:fontRef>
+        </p:style>
+      </p:cxnSp>
+      <p:cxnSp>
+        <p:nvCxnSpPr>
+          <p:cNvPr id="52" name="Straight Connector 51"/>
+          <p:cNvCxnSpPr/>
+          <p:nvPr/>
+        </p:nvCxnSpPr>
+        <p:spPr>
+          <a:xfrm>
+            <a:off x="7611340" y="722746"/>
+            <a:ext cx="0" cy="1092751"/>
+          </a:xfrm>
+          <a:prstGeom prst="line">
+            <a:avLst/>
+          </a:prstGeom>
+          <a:ln w="57150">
+            <a:solidFill>
+              <a:schemeClr val="tx1">
+                <a:lumMod val="65000"/>
+                <a:lumOff val="35000"/>
+              </a:schemeClr>
+            </a:solidFill>
+          </a:ln>
+        </p:spPr>
+        <p:style>
+          <a:lnRef idx="1">
+            <a:schemeClr val="accent1"/>
+          </a:lnRef>
+          <a:fillRef idx="0">
+            <a:schemeClr val="accent1"/>
+          </a:fillRef>
+          <a:effectRef idx="0">
+            <a:schemeClr val="accent1"/>
+          </a:effectRef>
+          <a:fontRef idx="minor">
+            <a:schemeClr val="tx1"/>
+          </a:fontRef>
+        </p:style>
+      </p:cxnSp>
+      <p:cxnSp>
+        <p:nvCxnSpPr>
+          <p:cNvPr id="53" name="Straight Connector 52"/>
+          <p:cNvCxnSpPr/>
+          <p:nvPr/>
+        </p:nvCxnSpPr>
+        <p:spPr>
+          <a:xfrm>
+            <a:off x="7376967" y="1022783"/>
+            <a:ext cx="514350" cy="547688"/>
+          </a:xfrm>
+          <a:prstGeom prst="line">
+            <a:avLst/>
+          </a:prstGeom>
+          <a:ln w="57150">
+            <a:solidFill>
+              <a:schemeClr val="tx1">
+                <a:lumMod val="65000"/>
+                <a:lumOff val="35000"/>
+              </a:schemeClr>
+            </a:solidFill>
+          </a:ln>
+        </p:spPr>
+        <p:style>
+          <a:lnRef idx="1">
+            <a:schemeClr val="accent1"/>
+          </a:lnRef>
+          <a:fillRef idx="0">
+            <a:schemeClr val="accent1"/>
+          </a:fillRef>
+          <a:effectRef idx="0">
+            <a:schemeClr val="accent1"/>
+          </a:effectRef>
+          <a:fontRef idx="minor">
+            <a:schemeClr val="tx1"/>
+          </a:fontRef>
+        </p:style>
+      </p:cxnSp>
+      <p:cxnSp>
+        <p:nvCxnSpPr>
+          <p:cNvPr id="54" name="Straight Connector 53"/>
+          <p:cNvCxnSpPr>
+            <a:endCxn id="44" idx="0"/>
+          </p:cNvCxnSpPr>
+          <p:nvPr/>
+        </p:nvCxnSpPr>
+        <p:spPr>
+          <a:xfrm>
+            <a:off x="7872268" y="570349"/>
+            <a:ext cx="558222" cy="289236"/>
+          </a:xfrm>
+          <a:prstGeom prst="line">
+            <a:avLst/>
+          </a:prstGeom>
+          <a:ln w="57150">
+            <a:solidFill>
+              <a:schemeClr val="tx1">
+                <a:lumMod val="65000"/>
+                <a:lumOff val="35000"/>
+              </a:schemeClr>
+            </a:solidFill>
+          </a:ln>
+        </p:spPr>
+        <p:style>
+          <a:lnRef idx="1">
+            <a:schemeClr val="accent1"/>
+          </a:lnRef>
+          <a:fillRef idx="0">
+            <a:schemeClr val="accent1"/>
+          </a:fillRef>
+          <a:effectRef idx="0">
+            <a:schemeClr val="accent1"/>
+          </a:effectRef>
+          <a:fontRef idx="minor">
+            <a:schemeClr val="tx1"/>
+          </a:fontRef>
+        </p:style>
+      </p:cxnSp>
+      <p:cxnSp>
+        <p:nvCxnSpPr>
+          <p:cNvPr id="55" name="Straight Connector 54"/>
+          <p:cNvCxnSpPr/>
+          <p:nvPr/>
+        </p:nvCxnSpPr>
+        <p:spPr>
+          <a:xfrm>
+            <a:off x="7630389" y="716911"/>
+            <a:ext cx="908628" cy="3691"/>
+          </a:xfrm>
+          <a:prstGeom prst="line">
+            <a:avLst/>
+          </a:prstGeom>
+          <a:ln w="57150">
+            <a:solidFill>
+              <a:schemeClr val="tx1">
+                <a:lumMod val="65000"/>
+                <a:lumOff val="35000"/>
+              </a:schemeClr>
+            </a:solidFill>
+          </a:ln>
+        </p:spPr>
+        <p:style>
+          <a:lnRef idx="1">
+            <a:schemeClr val="accent1"/>
+          </a:lnRef>
+          <a:fillRef idx="0">
+            <a:schemeClr val="accent1"/>
+          </a:fillRef>
+          <a:effectRef idx="0">
+            <a:schemeClr val="accent1"/>
+          </a:effectRef>
+          <a:fontRef idx="minor">
+            <a:schemeClr val="tx1"/>
+          </a:fontRef>
+        </p:style>
+      </p:cxnSp>
+      <p:sp>
+        <p:nvSpPr>
+          <p:cNvPr id="56" name="Rectangle 55"/>
+          <p:cNvSpPr/>
+          <p:nvPr/>
+        </p:nvSpPr>
+        <p:spPr>
+          <a:xfrm>
+            <a:off x="6283613" y="1394403"/>
+            <a:ext cx="275936" cy="275936"/>
+          </a:xfrm>
+          <a:prstGeom prst="rect">
+            <a:avLst/>
+          </a:prstGeom>
+          <a:solidFill>
+            <a:srgbClr val="01FD07"/>
+          </a:solidFill>
+          <a:ln w="92075">
+            <a:solidFill>
+              <a:schemeClr val="tx1"/>
+            </a:solidFill>
+          </a:ln>
+        </p:spPr>
+        <p:style>
+          <a:lnRef idx="2">
+            <a:schemeClr val="accent1">
+              <a:shade val="50000"/>
+            </a:schemeClr>
+          </a:lnRef>
+          <a:fillRef idx="1">
+            <a:schemeClr val="accent1"/>
+          </a:fillRef>
+          <a:effectRef idx="0">
+            <a:schemeClr val="accent1"/>
+          </a:effectRef>
+          <a:fontRef idx="minor">
+            <a:schemeClr val="lt1"/>
+          </a:fontRef>
+        </p:style>
+        <p:txBody>
+          <a:bodyPr rtlCol="0" anchor="ctr"/>
+          <a:lstStyle/>
+          <a:p>
+            <a:pPr algn="ctr"/>
+            <a:endParaRPr lang="es-AR"/>
+          </a:p>
+        </p:txBody>
+      </p:sp>
+      <p:sp>
+        <p:nvSpPr>
+          <p:cNvPr id="57" name="Rectangle 56"/>
+          <p:cNvSpPr/>
+          <p:nvPr/>
+        </p:nvSpPr>
+        <p:spPr>
+          <a:xfrm>
+            <a:off x="7876885" y="900257"/>
+            <a:ext cx="537442" cy="651451"/>
+          </a:xfrm>
+          <a:prstGeom prst="rect">
+            <a:avLst/>
+          </a:prstGeom>
+          <a:solidFill>
+            <a:srgbClr val="01FD07"/>
+          </a:solidFill>
+          <a:ln w="127000">
+            <a:solidFill>
+              <a:schemeClr val="tx1"/>
+            </a:solidFill>
+          </a:ln>
+        </p:spPr>
+        <p:style>
+          <a:lnRef idx="2">
+            <a:schemeClr val="accent1">
+              <a:shade val="50000"/>
+            </a:schemeClr>
+          </a:lnRef>
+          <a:fillRef idx="1">
+            <a:schemeClr val="accent1"/>
+          </a:fillRef>
+          <a:effectRef idx="0">
+            <a:schemeClr val="accent1"/>
+          </a:effectRef>
+          <a:fontRef idx="minor">
+            <a:schemeClr val="lt1"/>
+          </a:fontRef>
+        </p:style>
+        <p:txBody>
+          <a:bodyPr rtlCol="0" anchor="ctr"/>
+          <a:lstStyle/>
+          <a:p>
+            <a:pPr algn="ctr"/>
+            <a:endParaRPr lang="es-AR"/>
+          </a:p>
+        </p:txBody>
+      </p:sp>
+      <p:cxnSp>
+        <p:nvCxnSpPr>
+          <p:cNvPr id="59" name="Straight Connector 58"/>
+          <p:cNvCxnSpPr>
+            <a:stCxn id="58" idx="0"/>
+            <a:endCxn id="58" idx="2"/>
+          </p:cNvCxnSpPr>
+          <p:nvPr/>
+        </p:nvCxnSpPr>
+        <p:spPr>
+          <a:xfrm>
+            <a:off x="10845799" y="1011985"/>
+            <a:ext cx="0" cy="1432162"/>
+          </a:xfrm>
+          <a:prstGeom prst="line">
+            <a:avLst/>
+          </a:prstGeom>
+          <a:ln w="57150">
+            <a:solidFill>
+              <a:schemeClr val="tx1">
+                <a:lumMod val="65000"/>
+                <a:lumOff val="35000"/>
+              </a:schemeClr>
+            </a:solidFill>
+          </a:ln>
+        </p:spPr>
+        <p:style>
+          <a:lnRef idx="1">
+            <a:schemeClr val="accent1"/>
+          </a:lnRef>
+          <a:fillRef idx="0">
+            <a:schemeClr val="accent1"/>
+          </a:fillRef>
+          <a:effectRef idx="0">
+            <a:schemeClr val="accent1"/>
+          </a:effectRef>
+          <a:fontRef idx="minor">
+            <a:schemeClr val="tx1"/>
+          </a:fontRef>
+        </p:style>
+      </p:cxnSp>
+      <p:cxnSp>
+        <p:nvCxnSpPr>
+          <p:cNvPr id="60" name="Straight Connector 59"/>
+          <p:cNvCxnSpPr>
+            <a:stCxn id="58" idx="3"/>
+            <a:endCxn id="58" idx="1"/>
+          </p:cNvCxnSpPr>
+          <p:nvPr/>
+        </p:nvCxnSpPr>
+        <p:spPr>
+          <a:xfrm flipH="1">
+            <a:off x="10300853" y="1728066"/>
+            <a:ext cx="1089891" cy="0"/>
+          </a:xfrm>
+          <a:prstGeom prst="line">
+            <a:avLst/>
+          </a:prstGeom>
+          <a:ln w="57150">
+            <a:solidFill>
+              <a:schemeClr val="tx1">
+                <a:lumMod val="65000"/>
+                <a:lumOff val="35000"/>
+              </a:schemeClr>
+            </a:solidFill>
+          </a:ln>
+        </p:spPr>
+        <p:style>
+          <a:lnRef idx="1">
+            <a:schemeClr val="accent1"/>
+          </a:lnRef>
+          <a:fillRef idx="0">
+            <a:schemeClr val="accent1"/>
+          </a:fillRef>
+          <a:effectRef idx="0">
+            <a:schemeClr val="accent1"/>
+          </a:effectRef>
+          <a:fontRef idx="minor">
+            <a:schemeClr val="tx1"/>
+          </a:fontRef>
+        </p:style>
+      </p:cxnSp>
+      <p:cxnSp>
+        <p:nvCxnSpPr>
+          <p:cNvPr id="61" name="Straight Connector 60"/>
+          <p:cNvCxnSpPr/>
+          <p:nvPr/>
+        </p:nvCxnSpPr>
+        <p:spPr>
+          <a:xfrm>
+            <a:off x="9811326" y="732271"/>
+            <a:ext cx="495300" cy="314325"/>
+          </a:xfrm>
+          <a:prstGeom prst="line">
+            <a:avLst/>
+          </a:prstGeom>
+          <a:ln w="127000">
+            <a:solidFill>
+              <a:schemeClr val="tx1">
+                <a:lumMod val="65000"/>
+                <a:lumOff val="35000"/>
+              </a:schemeClr>
+            </a:solidFill>
+          </a:ln>
+        </p:spPr>
+        <p:style>
+          <a:lnRef idx="1">
+            <a:schemeClr val="accent1"/>
+          </a:lnRef>
+          <a:fillRef idx="0">
+            <a:schemeClr val="accent1"/>
+          </a:fillRef>
+          <a:effectRef idx="0">
+            <a:schemeClr val="accent1"/>
+          </a:effectRef>
+          <a:fontRef idx="minor">
+            <a:schemeClr val="tx1"/>
+          </a:fontRef>
+        </p:style>
+      </p:cxnSp>
+      <p:cxnSp>
+        <p:nvCxnSpPr>
+          <p:cNvPr id="62" name="Straight Connector 61"/>
+          <p:cNvCxnSpPr/>
+          <p:nvPr/>
+        </p:nvCxnSpPr>
+        <p:spPr>
+          <a:xfrm>
+            <a:off x="9813059" y="665596"/>
+            <a:ext cx="0" cy="1019175"/>
+          </a:xfrm>
+          <a:prstGeom prst="line">
+            <a:avLst/>
+          </a:prstGeom>
+          <a:ln w="127000">
+            <a:solidFill>
+              <a:schemeClr val="tx1">
+                <a:lumMod val="65000"/>
+                <a:lumOff val="35000"/>
+              </a:schemeClr>
+            </a:solidFill>
+          </a:ln>
+        </p:spPr>
+        <p:style>
+          <a:lnRef idx="1">
+            <a:schemeClr val="accent1"/>
+          </a:lnRef>
+          <a:fillRef idx="0">
+            <a:schemeClr val="accent1"/>
+          </a:fillRef>
+          <a:effectRef idx="0">
+            <a:schemeClr val="accent1"/>
+          </a:effectRef>
+          <a:fontRef idx="minor">
+            <a:schemeClr val="tx1"/>
+          </a:fontRef>
+        </p:style>
+      </p:cxnSp>
+      <p:cxnSp>
+        <p:nvCxnSpPr>
+          <p:cNvPr id="63" name="Straight Connector 62"/>
+          <p:cNvCxnSpPr/>
+          <p:nvPr/>
+        </p:nvCxnSpPr>
+        <p:spPr>
+          <a:xfrm>
+            <a:off x="9799781" y="1625601"/>
+            <a:ext cx="487795" cy="830695"/>
+          </a:xfrm>
+          <a:prstGeom prst="line">
+            <a:avLst/>
+          </a:prstGeom>
+          <a:ln w="127000">
+            <a:solidFill>
+              <a:schemeClr val="tx1">
+                <a:lumMod val="65000"/>
+                <a:lumOff val="35000"/>
+              </a:schemeClr>
+            </a:solidFill>
+          </a:ln>
+        </p:spPr>
+        <p:style>
+          <a:lnRef idx="1">
+            <a:schemeClr val="accent1"/>
+          </a:lnRef>
+          <a:fillRef idx="0">
+            <a:schemeClr val="accent1"/>
+          </a:fillRef>
+          <a:effectRef idx="0">
+            <a:schemeClr val="accent1"/>
+          </a:effectRef>
+          <a:fontRef idx="minor">
+            <a:schemeClr val="tx1"/>
+          </a:fontRef>
+        </p:style>
+      </p:cxnSp>
+      <p:cxnSp>
+        <p:nvCxnSpPr>
+          <p:cNvPr id="64" name="Straight Connector 63"/>
+          <p:cNvCxnSpPr/>
+          <p:nvPr/>
+        </p:nvCxnSpPr>
+        <p:spPr>
+          <a:xfrm flipV="1">
+            <a:off x="9773226" y="714563"/>
+            <a:ext cx="885825" cy="8186"/>
+          </a:xfrm>
+          <a:prstGeom prst="line">
+            <a:avLst/>
+          </a:prstGeom>
+          <a:ln w="127000">
+            <a:solidFill>
+              <a:schemeClr val="tx1">
+                <a:lumMod val="65000"/>
+                <a:lumOff val="35000"/>
+              </a:schemeClr>
+            </a:solidFill>
+          </a:ln>
+        </p:spPr>
+        <p:style>
+          <a:lnRef idx="1">
+            <a:schemeClr val="accent1"/>
+          </a:lnRef>
+          <a:fillRef idx="0">
+            <a:schemeClr val="accent1"/>
+          </a:fillRef>
+          <a:effectRef idx="0">
+            <a:schemeClr val="accent1"/>
+          </a:effectRef>
+          <a:fontRef idx="minor">
+            <a:schemeClr val="tx1"/>
+          </a:fontRef>
+        </p:style>
+      </p:cxnSp>
+      <p:cxnSp>
+        <p:nvCxnSpPr>
+          <p:cNvPr id="65" name="Straight Connector 64"/>
+          <p:cNvCxnSpPr/>
+          <p:nvPr/>
+        </p:nvCxnSpPr>
+        <p:spPr>
+          <a:xfrm>
+            <a:off x="10620951" y="699406"/>
+            <a:ext cx="819150" cy="290040"/>
+          </a:xfrm>
+          <a:prstGeom prst="line">
+            <a:avLst/>
+          </a:prstGeom>
+          <a:ln w="127000">
+            <a:solidFill>
+              <a:schemeClr val="tx1">
+                <a:lumMod val="65000"/>
+                <a:lumOff val="35000"/>
+              </a:schemeClr>
+            </a:solidFill>
+          </a:ln>
+        </p:spPr>
+        <p:style>
+          <a:lnRef idx="1">
+            <a:schemeClr val="accent1"/>
+          </a:lnRef>
+          <a:fillRef idx="0">
+            <a:schemeClr val="accent1"/>
+          </a:fillRef>
+          <a:effectRef idx="0">
+            <a:schemeClr val="accent1"/>
+          </a:effectRef>
+          <a:fontRef idx="minor">
+            <a:schemeClr val="tx1"/>
+          </a:fontRef>
+        </p:style>
+      </p:cxnSp>
+      <p:cxnSp>
+        <p:nvCxnSpPr>
+          <p:cNvPr id="66" name="Straight Connector 65"/>
+          <p:cNvCxnSpPr/>
+          <p:nvPr/>
+        </p:nvCxnSpPr>
+        <p:spPr>
+          <a:xfrm>
+            <a:off x="10026649" y="875146"/>
+            <a:ext cx="0" cy="1092751"/>
+          </a:xfrm>
+          <a:prstGeom prst="line">
+            <a:avLst/>
+          </a:prstGeom>
+          <a:ln w="57150">
+            <a:solidFill>
+              <a:schemeClr val="tx1">
+                <a:lumMod val="65000"/>
+                <a:lumOff val="35000"/>
+              </a:schemeClr>
+            </a:solidFill>
+          </a:ln>
+        </p:spPr>
+        <p:style>
+          <a:lnRef idx="1">
+            <a:schemeClr val="accent1"/>
+          </a:lnRef>
+          <a:fillRef idx="0">
+            <a:schemeClr val="accent1"/>
+          </a:fillRef>
+          <a:effectRef idx="0">
+            <a:schemeClr val="accent1"/>
+          </a:effectRef>
+          <a:fontRef idx="minor">
+            <a:schemeClr val="tx1"/>
+          </a:fontRef>
+        </p:style>
+      </p:cxnSp>
+      <p:cxnSp>
+        <p:nvCxnSpPr>
+          <p:cNvPr id="67" name="Straight Connector 66"/>
+          <p:cNvCxnSpPr/>
+          <p:nvPr/>
+        </p:nvCxnSpPr>
+        <p:spPr>
+          <a:xfrm>
+            <a:off x="9792276" y="1175183"/>
+            <a:ext cx="514350" cy="547688"/>
+          </a:xfrm>
+          <a:prstGeom prst="line">
+            <a:avLst/>
+          </a:prstGeom>
+          <a:ln w="57150">
+            <a:solidFill>
+              <a:schemeClr val="tx1">
+                <a:lumMod val="65000"/>
+                <a:lumOff val="35000"/>
+              </a:schemeClr>
+            </a:solidFill>
+          </a:ln>
+        </p:spPr>
+        <p:style>
+          <a:lnRef idx="1">
+            <a:schemeClr val="accent1"/>
+          </a:lnRef>
+          <a:fillRef idx="0">
+            <a:schemeClr val="accent1"/>
+          </a:fillRef>
+          <a:effectRef idx="0">
+            <a:schemeClr val="accent1"/>
+          </a:effectRef>
+          <a:fontRef idx="minor">
+            <a:schemeClr val="tx1"/>
+          </a:fontRef>
+        </p:style>
+      </p:cxnSp>
+      <p:cxnSp>
+        <p:nvCxnSpPr>
+          <p:cNvPr id="68" name="Straight Connector 67"/>
+          <p:cNvCxnSpPr>
+            <a:endCxn id="58" idx="0"/>
+          </p:cNvCxnSpPr>
+          <p:nvPr/>
+        </p:nvCxnSpPr>
+        <p:spPr>
+          <a:xfrm>
+            <a:off x="10287577" y="722749"/>
+            <a:ext cx="558222" cy="289236"/>
+          </a:xfrm>
+          <a:prstGeom prst="line">
+            <a:avLst/>
+          </a:prstGeom>
+          <a:ln w="57150">
+            <a:solidFill>
+              <a:schemeClr val="tx1">
+                <a:lumMod val="65000"/>
+                <a:lumOff val="35000"/>
+              </a:schemeClr>
+            </a:solidFill>
+          </a:ln>
+        </p:spPr>
+        <p:style>
+          <a:lnRef idx="1">
+            <a:schemeClr val="accent1"/>
+          </a:lnRef>
+          <a:fillRef idx="0">
+            <a:schemeClr val="accent1"/>
+          </a:fillRef>
+          <a:effectRef idx="0">
+            <a:schemeClr val="accent1"/>
+          </a:effectRef>
+          <a:fontRef idx="minor">
+            <a:schemeClr val="tx1"/>
+          </a:fontRef>
+        </p:style>
+      </p:cxnSp>
+      <p:cxnSp>
+        <p:nvCxnSpPr>
+          <p:cNvPr id="69" name="Straight Connector 68"/>
+          <p:cNvCxnSpPr/>
+          <p:nvPr/>
+        </p:nvCxnSpPr>
+        <p:spPr>
+          <a:xfrm>
+            <a:off x="10045698" y="869311"/>
+            <a:ext cx="908628" cy="3691"/>
+          </a:xfrm>
+          <a:prstGeom prst="line">
+            <a:avLst/>
+          </a:prstGeom>
+          <a:ln w="57150">
+            <a:solidFill>
+              <a:schemeClr val="tx1">
+                <a:lumMod val="65000"/>
+                <a:lumOff val="35000"/>
+              </a:schemeClr>
+            </a:solidFill>
+          </a:ln>
+        </p:spPr>
+        <p:style>
+          <a:lnRef idx="1">
+            <a:schemeClr val="accent1"/>
+          </a:lnRef>
+          <a:fillRef idx="0">
+            <a:schemeClr val="accent1"/>
+          </a:fillRef>
+          <a:effectRef idx="0">
+            <a:schemeClr val="accent1"/>
+          </a:effectRef>
+          <a:fontRef idx="minor">
+            <a:schemeClr val="tx1"/>
+          </a:fontRef>
+        </p:style>
+      </p:cxnSp>
+      <p:sp>
+        <p:nvSpPr>
+          <p:cNvPr id="70" name="Rectangle 69"/>
+          <p:cNvSpPr/>
+          <p:nvPr/>
+        </p:nvSpPr>
+        <p:spPr>
+          <a:xfrm>
+            <a:off x="10306050" y="1024948"/>
+            <a:ext cx="523586" cy="651451"/>
+          </a:xfrm>
+          <a:prstGeom prst="rect">
+            <a:avLst/>
+          </a:prstGeom>
+          <a:solidFill>
+            <a:srgbClr val="01FD07"/>
+          </a:solidFill>
+          <a:ln w="123825">
+            <a:solidFill>
+              <a:schemeClr val="tx1"/>
+            </a:solidFill>
+          </a:ln>
+        </p:spPr>
+        <p:style>
+          <a:lnRef idx="2">
+            <a:schemeClr val="accent1">
+              <a:shade val="50000"/>
+            </a:schemeClr>
+          </a:lnRef>
+          <a:fillRef idx="1">
+            <a:schemeClr val="accent1"/>
+          </a:fillRef>
+          <a:effectRef idx="0">
+            <a:schemeClr val="accent1"/>
+          </a:effectRef>
+          <a:fontRef idx="minor">
+            <a:schemeClr val="lt1"/>
+          </a:fontRef>
+        </p:style>
+        <p:txBody>
+          <a:bodyPr rtlCol="0" anchor="ctr"/>
+          <a:lstStyle/>
+          <a:p>
+            <a:pPr algn="ctr"/>
+            <a:endParaRPr lang="es-AR"/>
+          </a:p>
+        </p:txBody>
+      </p:sp>
+      <p:cxnSp>
+        <p:nvCxnSpPr>
+          <p:cNvPr id="71" name="Straight Connector 70"/>
+          <p:cNvCxnSpPr/>
+          <p:nvPr/>
+        </p:nvCxnSpPr>
+        <p:spPr>
+          <a:xfrm>
+            <a:off x="10039927" y="1431636"/>
+            <a:ext cx="242311" cy="275720"/>
+          </a:xfrm>
+          <a:prstGeom prst="line">
+            <a:avLst/>
+          </a:prstGeom>
+          <a:ln w="85725">
+            <a:solidFill>
+              <a:schemeClr val="tx1"/>
+            </a:solidFill>
+          </a:ln>
+        </p:spPr>
+        <p:style>
+          <a:lnRef idx="1">
+            <a:schemeClr val="accent1"/>
+          </a:lnRef>
+          <a:fillRef idx="0">
+            <a:schemeClr val="accent1"/>
+          </a:fillRef>
+          <a:effectRef idx="0">
+            <a:schemeClr val="accent1"/>
+          </a:effectRef>
+          <a:fontRef idx="minor">
+            <a:schemeClr val="tx1"/>
+          </a:fontRef>
+        </p:style>
+      </p:cxnSp>
+      <p:cxnSp>
+        <p:nvCxnSpPr>
+          <p:cNvPr id="74" name="Straight Connector 73"/>
+          <p:cNvCxnSpPr/>
+          <p:nvPr/>
+        </p:nvCxnSpPr>
+        <p:spPr>
+          <a:xfrm>
+            <a:off x="10038772" y="857467"/>
+            <a:ext cx="1155" cy="597477"/>
+          </a:xfrm>
+          <a:prstGeom prst="line">
+            <a:avLst/>
+          </a:prstGeom>
+          <a:ln w="85725">
+            <a:solidFill>
+              <a:schemeClr val="tx1"/>
+            </a:solidFill>
+          </a:ln>
+        </p:spPr>
+        <p:style>
+          <a:lnRef idx="1">
+            <a:schemeClr val="accent1"/>
+          </a:lnRef>
+          <a:fillRef idx="0">
+            <a:schemeClr val="accent1"/>
+          </a:fillRef>
+          <a:effectRef idx="0">
+            <a:schemeClr val="accent1"/>
+          </a:effectRef>
+          <a:fontRef idx="minor">
+            <a:schemeClr val="tx1"/>
+          </a:fontRef>
+        </p:style>
+      </p:cxnSp>
+      <p:cxnSp>
+        <p:nvCxnSpPr>
+          <p:cNvPr id="77" name="Straight Connector 76"/>
+          <p:cNvCxnSpPr/>
+          <p:nvPr/>
+        </p:nvCxnSpPr>
+        <p:spPr>
+          <a:xfrm>
+            <a:off x="10056667" y="878487"/>
+            <a:ext cx="253135" cy="177633"/>
+          </a:xfrm>
+          <a:prstGeom prst="line">
+            <a:avLst/>
+          </a:prstGeom>
+          <a:ln w="123825">
+            <a:solidFill>
+              <a:schemeClr val="tx1"/>
+            </a:solidFill>
+          </a:ln>
+        </p:spPr>
+        <p:style>
+          <a:lnRef idx="1">
+            <a:schemeClr val="accent1"/>
+          </a:lnRef>
+          <a:fillRef idx="0">
+            <a:schemeClr val="accent1"/>
+          </a:fillRef>
+          <a:effectRef idx="0">
+            <a:schemeClr val="accent1"/>
+          </a:effectRef>
+          <a:fontRef idx="minor">
+            <a:schemeClr val="tx1"/>
+          </a:fontRef>
+        </p:style>
+      </p:cxnSp>
+      <p:cxnSp>
+        <p:nvCxnSpPr>
+          <p:cNvPr id="86" name="Straight Connector 85"/>
+          <p:cNvCxnSpPr/>
+          <p:nvPr/>
+        </p:nvCxnSpPr>
+        <p:spPr>
+          <a:xfrm>
+            <a:off x="10000670" y="870535"/>
+            <a:ext cx="574461" cy="1003"/>
+          </a:xfrm>
+          <a:prstGeom prst="line">
+            <a:avLst/>
+          </a:prstGeom>
+          <a:ln w="85725">
+            <a:solidFill>
+              <a:schemeClr val="tx1"/>
+            </a:solidFill>
+          </a:ln>
+        </p:spPr>
+        <p:style>
+          <a:lnRef idx="1">
+            <a:schemeClr val="accent1"/>
+          </a:lnRef>
+          <a:fillRef idx="0">
+            <a:schemeClr val="accent1"/>
+          </a:fillRef>
+          <a:effectRef idx="0">
+            <a:schemeClr val="accent1"/>
+          </a:effectRef>
+          <a:fontRef idx="minor">
+            <a:schemeClr val="tx1"/>
+          </a:fontRef>
+        </p:style>
+      </p:cxnSp>
+      <p:cxnSp>
+        <p:nvCxnSpPr>
+          <p:cNvPr id="89" name="Straight Connector 88"/>
+          <p:cNvCxnSpPr/>
+          <p:nvPr/>
+        </p:nvCxnSpPr>
+        <p:spPr>
+          <a:xfrm>
+            <a:off x="10553700" y="871538"/>
+            <a:ext cx="311944" cy="130968"/>
+          </a:xfrm>
+          <a:prstGeom prst="line">
+            <a:avLst/>
+          </a:prstGeom>
+          <a:ln w="85725">
+            <a:solidFill>
+              <a:schemeClr val="tx1"/>
+            </a:solidFill>
+          </a:ln>
+        </p:spPr>
+        <p:style>
+          <a:lnRef idx="1">
+            <a:schemeClr val="accent1"/>
+          </a:lnRef>
+          <a:fillRef idx="0">
+            <a:schemeClr val="accent1"/>
+          </a:fillRef>
+          <a:effectRef idx="0">
+            <a:schemeClr val="accent1"/>
+          </a:effectRef>
+          <a:fontRef idx="minor">
+            <a:schemeClr val="tx1"/>
+          </a:fontRef>
+        </p:style>
+      </p:cxnSp>
+    </p:spTree>
+    <p:extLst>
+      <p:ext uri="{BB962C8B-B14F-4D97-AF65-F5344CB8AC3E}">
+        <p14:creationId xmlns:p14="http://schemas.microsoft.com/office/powerpoint/2010/main" val="4054270490"/>
       </p:ext>
     </p:extLst>
   </p:cSld>

</xml_diff>

<commit_message>
Added and rearranged CAE Features.
</commit_message>
<xml_diff>
--- a/FluxSol-CAE/Icons/Icons.pptx
+++ b/FluxSol-CAE/Icons/Icons.pptx
@@ -9,6 +9,7 @@
     <p:sldId id="257" r:id="rId3"/>
     <p:sldId id="258" r:id="rId4"/>
     <p:sldId id="259" r:id="rId5"/>
+    <p:sldId id="260" r:id="rId6"/>
   </p:sldIdLst>
   <p:sldSz cx="12192000" cy="6858000"/>
   <p:notesSz cx="6858000" cy="9144000"/>
@@ -246,7 +247,7 @@
           <a:p>
             <a:fld id="{E2FC7F11-C3C3-4E1B-A1FC-A59F8DFB27EA}" type="datetimeFigureOut">
               <a:rPr lang="es-AR" smtClean="0"/>
-              <a:t>26/02/2015</a:t>
+              <a:t>02/03/2015</a:t>
             </a:fld>
             <a:endParaRPr lang="es-AR"/>
           </a:p>
@@ -416,7 +417,7 @@
           <a:p>
             <a:fld id="{E2FC7F11-C3C3-4E1B-A1FC-A59F8DFB27EA}" type="datetimeFigureOut">
               <a:rPr lang="es-AR" smtClean="0"/>
-              <a:t>26/02/2015</a:t>
+              <a:t>02/03/2015</a:t>
             </a:fld>
             <a:endParaRPr lang="es-AR"/>
           </a:p>
@@ -596,7 +597,7 @@
           <a:p>
             <a:fld id="{E2FC7F11-C3C3-4E1B-A1FC-A59F8DFB27EA}" type="datetimeFigureOut">
               <a:rPr lang="es-AR" smtClean="0"/>
-              <a:t>26/02/2015</a:t>
+              <a:t>02/03/2015</a:t>
             </a:fld>
             <a:endParaRPr lang="es-AR"/>
           </a:p>
@@ -766,7 +767,7 @@
           <a:p>
             <a:fld id="{E2FC7F11-C3C3-4E1B-A1FC-A59F8DFB27EA}" type="datetimeFigureOut">
               <a:rPr lang="es-AR" smtClean="0"/>
-              <a:t>26/02/2015</a:t>
+              <a:t>02/03/2015</a:t>
             </a:fld>
             <a:endParaRPr lang="es-AR"/>
           </a:p>
@@ -1012,7 +1013,7 @@
           <a:p>
             <a:fld id="{E2FC7F11-C3C3-4E1B-A1FC-A59F8DFB27EA}" type="datetimeFigureOut">
               <a:rPr lang="es-AR" smtClean="0"/>
-              <a:t>26/02/2015</a:t>
+              <a:t>02/03/2015</a:t>
             </a:fld>
             <a:endParaRPr lang="es-AR"/>
           </a:p>
@@ -1244,7 +1245,7 @@
           <a:p>
             <a:fld id="{E2FC7F11-C3C3-4E1B-A1FC-A59F8DFB27EA}" type="datetimeFigureOut">
               <a:rPr lang="es-AR" smtClean="0"/>
-              <a:t>26/02/2015</a:t>
+              <a:t>02/03/2015</a:t>
             </a:fld>
             <a:endParaRPr lang="es-AR"/>
           </a:p>
@@ -1611,7 +1612,7 @@
           <a:p>
             <a:fld id="{E2FC7F11-C3C3-4E1B-A1FC-A59F8DFB27EA}" type="datetimeFigureOut">
               <a:rPr lang="es-AR" smtClean="0"/>
-              <a:t>26/02/2015</a:t>
+              <a:t>02/03/2015</a:t>
             </a:fld>
             <a:endParaRPr lang="es-AR"/>
           </a:p>
@@ -1729,7 +1730,7 @@
           <a:p>
             <a:fld id="{E2FC7F11-C3C3-4E1B-A1FC-A59F8DFB27EA}" type="datetimeFigureOut">
               <a:rPr lang="es-AR" smtClean="0"/>
-              <a:t>26/02/2015</a:t>
+              <a:t>02/03/2015</a:t>
             </a:fld>
             <a:endParaRPr lang="es-AR"/>
           </a:p>
@@ -1824,7 +1825,7 @@
           <a:p>
             <a:fld id="{E2FC7F11-C3C3-4E1B-A1FC-A59F8DFB27EA}" type="datetimeFigureOut">
               <a:rPr lang="es-AR" smtClean="0"/>
-              <a:t>26/02/2015</a:t>
+              <a:t>02/03/2015</a:t>
             </a:fld>
             <a:endParaRPr lang="es-AR"/>
           </a:p>
@@ -2101,7 +2102,7 @@
           <a:p>
             <a:fld id="{E2FC7F11-C3C3-4E1B-A1FC-A59F8DFB27EA}" type="datetimeFigureOut">
               <a:rPr lang="es-AR" smtClean="0"/>
-              <a:t>26/02/2015</a:t>
+              <a:t>02/03/2015</a:t>
             </a:fld>
             <a:endParaRPr lang="es-AR"/>
           </a:p>
@@ -2354,7 +2355,7 @@
           <a:p>
             <a:fld id="{E2FC7F11-C3C3-4E1B-A1FC-A59F8DFB27EA}" type="datetimeFigureOut">
               <a:rPr lang="es-AR" smtClean="0"/>
-              <a:t>26/02/2015</a:t>
+              <a:t>02/03/2015</a:t>
             </a:fld>
             <a:endParaRPr lang="es-AR"/>
           </a:p>
@@ -2567,7 +2568,7 @@
           <a:p>
             <a:fld id="{E2FC7F11-C3C3-4E1B-A1FC-A59F8DFB27EA}" type="datetimeFigureOut">
               <a:rPr lang="es-AR" smtClean="0"/>
-              <a:t>26/02/2015</a:t>
+              <a:t>02/03/2015</a:t>
             </a:fld>
             <a:endParaRPr lang="es-AR"/>
           </a:p>
@@ -7742,6 +7743,294 @@
           </a:prstGeom>
         </p:spPr>
       </p:pic>
+      <p:grpSp>
+        <p:nvGrpSpPr>
+          <p:cNvPr id="16" name="Group 15"/>
+          <p:cNvGrpSpPr/>
+          <p:nvPr/>
+        </p:nvGrpSpPr>
+        <p:grpSpPr>
+          <a:xfrm>
+            <a:off x="3278908" y="3843959"/>
+            <a:ext cx="1383579" cy="1449579"/>
+            <a:chOff x="3278909" y="3843959"/>
+            <a:chExt cx="1092742" cy="1449579"/>
+          </a:xfrm>
+        </p:grpSpPr>
+        <p:sp>
+          <p:nvSpPr>
+            <p:cNvPr id="32" name="Isosceles Triangle 31"/>
+            <p:cNvSpPr/>
+            <p:nvPr/>
+          </p:nvSpPr>
+          <p:spPr>
+            <a:xfrm rot="10800000">
+              <a:off x="3325985" y="3928714"/>
+              <a:ext cx="985895" cy="732651"/>
+            </a:xfrm>
+            <a:prstGeom prst="triangle">
+              <a:avLst>
+                <a:gd name="adj" fmla="val 100000"/>
+              </a:avLst>
+            </a:prstGeom>
+            <a:solidFill>
+              <a:srgbClr val="2A1AF6"/>
+            </a:solidFill>
+            <a:ln>
+              <a:solidFill>
+                <a:srgbClr val="2A1AF6"/>
+              </a:solidFill>
+            </a:ln>
+          </p:spPr>
+          <p:style>
+            <a:lnRef idx="2">
+              <a:schemeClr val="accent1">
+                <a:shade val="50000"/>
+              </a:schemeClr>
+            </a:lnRef>
+            <a:fillRef idx="1">
+              <a:schemeClr val="accent1"/>
+            </a:fillRef>
+            <a:effectRef idx="0">
+              <a:schemeClr val="accent1"/>
+            </a:effectRef>
+            <a:fontRef idx="minor">
+              <a:schemeClr val="lt1"/>
+            </a:fontRef>
+          </p:style>
+          <p:txBody>
+            <a:bodyPr rtlCol="0" anchor="ctr"/>
+            <a:lstStyle/>
+            <a:p>
+              <a:pPr algn="ctr"/>
+              <a:endParaRPr lang="es-AR"/>
+            </a:p>
+          </p:txBody>
+        </p:sp>
+        <p:sp>
+          <p:nvSpPr>
+            <p:cNvPr id="33" name="Isosceles Triangle 32"/>
+            <p:cNvSpPr/>
+            <p:nvPr/>
+          </p:nvSpPr>
+          <p:spPr>
+            <a:xfrm>
+              <a:off x="3322320" y="4459304"/>
+              <a:ext cx="989559" cy="816559"/>
+            </a:xfrm>
+            <a:prstGeom prst="triangle">
+              <a:avLst>
+                <a:gd name="adj" fmla="val 100000"/>
+              </a:avLst>
+            </a:prstGeom>
+            <a:solidFill>
+              <a:srgbClr val="FF0000"/>
+            </a:solidFill>
+            <a:ln>
+              <a:solidFill>
+                <a:srgbClr val="C00000"/>
+              </a:solidFill>
+            </a:ln>
+          </p:spPr>
+          <p:style>
+            <a:lnRef idx="2">
+              <a:schemeClr val="accent1">
+                <a:shade val="50000"/>
+              </a:schemeClr>
+            </a:lnRef>
+            <a:fillRef idx="1">
+              <a:schemeClr val="accent1"/>
+            </a:fillRef>
+            <a:effectRef idx="0">
+              <a:schemeClr val="accent1"/>
+            </a:effectRef>
+            <a:fontRef idx="minor">
+              <a:schemeClr val="lt1"/>
+            </a:fontRef>
+          </p:style>
+          <p:txBody>
+            <a:bodyPr rtlCol="0" anchor="ctr"/>
+            <a:lstStyle/>
+            <a:p>
+              <a:pPr algn="ctr"/>
+              <a:endParaRPr lang="es-AR"/>
+            </a:p>
+          </p:txBody>
+        </p:sp>
+        <p:sp>
+          <p:nvSpPr>
+            <p:cNvPr id="34" name="Parallelogram 33"/>
+            <p:cNvSpPr/>
+            <p:nvPr/>
+          </p:nvSpPr>
+          <p:spPr>
+            <a:xfrm rot="5400000" flipV="1">
+              <a:off x="3144315" y="4097427"/>
+              <a:ext cx="1356443" cy="1000433"/>
+            </a:xfrm>
+            <a:prstGeom prst="parallelogram">
+              <a:avLst>
+                <a:gd name="adj" fmla="val 54023"/>
+              </a:avLst>
+            </a:prstGeom>
+            <a:solidFill>
+              <a:srgbClr val="92D050"/>
+            </a:solidFill>
+            <a:ln>
+              <a:noFill/>
+            </a:ln>
+          </p:spPr>
+          <p:style>
+            <a:lnRef idx="2">
+              <a:schemeClr val="accent1">
+                <a:shade val="50000"/>
+              </a:schemeClr>
+            </a:lnRef>
+            <a:fillRef idx="1">
+              <a:schemeClr val="accent1"/>
+            </a:fillRef>
+            <a:effectRef idx="0">
+              <a:schemeClr val="accent1"/>
+            </a:effectRef>
+            <a:fontRef idx="minor">
+              <a:schemeClr val="lt1"/>
+            </a:fontRef>
+          </p:style>
+          <p:txBody>
+            <a:bodyPr rtlCol="0" anchor="ctr"/>
+            <a:lstStyle/>
+            <a:p>
+              <a:pPr algn="ctr"/>
+              <a:endParaRPr lang="es-AR"/>
+            </a:p>
+          </p:txBody>
+        </p:sp>
+        <p:sp>
+          <p:nvSpPr>
+            <p:cNvPr id="35" name="Rectangle 34"/>
+            <p:cNvSpPr/>
+            <p:nvPr/>
+          </p:nvSpPr>
+          <p:spPr>
+            <a:xfrm>
+              <a:off x="3278909" y="3861376"/>
+              <a:ext cx="1084033" cy="1432162"/>
+            </a:xfrm>
+            <a:prstGeom prst="rect">
+              <a:avLst/>
+            </a:prstGeom>
+            <a:noFill/>
+            <a:ln w="127000">
+              <a:solidFill>
+                <a:schemeClr val="tx1">
+                  <a:lumMod val="85000"/>
+                  <a:lumOff val="15000"/>
+                </a:schemeClr>
+              </a:solidFill>
+            </a:ln>
+          </p:spPr>
+          <p:style>
+            <a:lnRef idx="2">
+              <a:schemeClr val="accent1">
+                <a:shade val="50000"/>
+              </a:schemeClr>
+            </a:lnRef>
+            <a:fillRef idx="1">
+              <a:schemeClr val="accent1"/>
+            </a:fillRef>
+            <a:effectRef idx="0">
+              <a:schemeClr val="accent1"/>
+            </a:effectRef>
+            <a:fontRef idx="minor">
+              <a:schemeClr val="lt1"/>
+            </a:fontRef>
+          </p:style>
+          <p:txBody>
+            <a:bodyPr rtlCol="0" anchor="ctr"/>
+            <a:lstStyle/>
+            <a:p>
+              <a:pPr algn="ctr"/>
+              <a:endParaRPr lang="es-AR"/>
+            </a:p>
+          </p:txBody>
+        </p:sp>
+        <p:cxnSp>
+          <p:nvCxnSpPr>
+            <p:cNvPr id="36" name="Straight Connector 35"/>
+            <p:cNvCxnSpPr/>
+            <p:nvPr/>
+          </p:nvCxnSpPr>
+          <p:spPr>
+            <a:xfrm>
+              <a:off x="3826706" y="3843959"/>
+              <a:ext cx="0" cy="1432162"/>
+            </a:xfrm>
+            <a:prstGeom prst="line">
+              <a:avLst/>
+            </a:prstGeom>
+            <a:ln w="127000">
+              <a:solidFill>
+                <a:schemeClr val="tx1">
+                  <a:lumMod val="85000"/>
+                  <a:lumOff val="15000"/>
+                </a:schemeClr>
+              </a:solidFill>
+            </a:ln>
+          </p:spPr>
+          <p:style>
+            <a:lnRef idx="1">
+              <a:schemeClr val="accent1"/>
+            </a:lnRef>
+            <a:fillRef idx="0">
+              <a:schemeClr val="accent1"/>
+            </a:fillRef>
+            <a:effectRef idx="0">
+              <a:schemeClr val="accent1"/>
+            </a:effectRef>
+            <a:fontRef idx="minor">
+              <a:schemeClr val="tx1"/>
+            </a:fontRef>
+          </p:style>
+        </p:cxnSp>
+        <p:cxnSp>
+          <p:nvCxnSpPr>
+            <p:cNvPr id="37" name="Straight Connector 36"/>
+            <p:cNvCxnSpPr/>
+            <p:nvPr/>
+          </p:nvCxnSpPr>
+          <p:spPr>
+            <a:xfrm flipH="1">
+              <a:off x="3281760" y="4560040"/>
+              <a:ext cx="1089891" cy="0"/>
+            </a:xfrm>
+            <a:prstGeom prst="line">
+              <a:avLst/>
+            </a:prstGeom>
+            <a:ln w="127000">
+              <a:solidFill>
+                <a:schemeClr val="tx1">
+                  <a:lumMod val="85000"/>
+                  <a:lumOff val="15000"/>
+                </a:schemeClr>
+              </a:solidFill>
+            </a:ln>
+          </p:spPr>
+          <p:style>
+            <a:lnRef idx="1">
+              <a:schemeClr val="accent1"/>
+            </a:lnRef>
+            <a:fillRef idx="0">
+              <a:schemeClr val="accent1"/>
+            </a:fillRef>
+            <a:effectRef idx="0">
+              <a:schemeClr val="accent1"/>
+            </a:effectRef>
+            <a:fontRef idx="minor">
+              <a:schemeClr val="tx1"/>
+            </a:fontRef>
+          </p:style>
+        </p:cxnSp>
+      </p:grpSp>
     </p:spTree>
     <p:extLst>
       <p:ext uri="{BB962C8B-B14F-4D97-AF65-F5344CB8AC3E}">
@@ -10033,6 +10322,169 @@
           <a:chExt cx="0" cy="0"/>
         </a:xfrm>
       </p:grpSpPr>
+      <p:sp>
+        <p:nvSpPr>
+          <p:cNvPr id="5" name="Rectangle 4"/>
+          <p:cNvSpPr/>
+          <p:nvPr/>
+        </p:nvSpPr>
+        <p:spPr>
+          <a:xfrm>
+            <a:off x="5876636" y="808785"/>
+            <a:ext cx="1089891" cy="1432162"/>
+          </a:xfrm>
+          <a:prstGeom prst="rect">
+            <a:avLst/>
+          </a:prstGeom>
+          <a:noFill/>
+          <a:ln w="127000">
+            <a:solidFill>
+              <a:schemeClr val="tx1">
+                <a:lumMod val="65000"/>
+                <a:lumOff val="35000"/>
+              </a:schemeClr>
+            </a:solidFill>
+          </a:ln>
+        </p:spPr>
+        <p:style>
+          <a:lnRef idx="2">
+            <a:schemeClr val="accent1">
+              <a:shade val="50000"/>
+            </a:schemeClr>
+          </a:lnRef>
+          <a:fillRef idx="1">
+            <a:schemeClr val="accent1"/>
+          </a:fillRef>
+          <a:effectRef idx="0">
+            <a:schemeClr val="accent1"/>
+          </a:effectRef>
+          <a:fontRef idx="minor">
+            <a:schemeClr val="lt1"/>
+          </a:fontRef>
+        </p:style>
+        <p:txBody>
+          <a:bodyPr rtlCol="0" anchor="ctr"/>
+          <a:lstStyle/>
+          <a:p>
+            <a:pPr algn="ctr"/>
+            <a:endParaRPr lang="es-AR"/>
+          </a:p>
+        </p:txBody>
+      </p:sp>
+      <p:cxnSp>
+        <p:nvCxnSpPr>
+          <p:cNvPr id="18" name="Straight Connector 17"/>
+          <p:cNvCxnSpPr/>
+          <p:nvPr/>
+        </p:nvCxnSpPr>
+        <p:spPr>
+          <a:xfrm>
+            <a:off x="5381625" y="1438275"/>
+            <a:ext cx="485775" cy="831850"/>
+          </a:xfrm>
+          <a:prstGeom prst="line">
+            <a:avLst/>
+          </a:prstGeom>
+          <a:ln w="127000">
+            <a:solidFill>
+              <a:schemeClr val="tx1">
+                <a:lumMod val="65000"/>
+                <a:lumOff val="35000"/>
+              </a:schemeClr>
+            </a:solidFill>
+          </a:ln>
+        </p:spPr>
+        <p:style>
+          <a:lnRef idx="1">
+            <a:schemeClr val="accent1"/>
+          </a:lnRef>
+          <a:fillRef idx="0">
+            <a:schemeClr val="accent1"/>
+          </a:fillRef>
+          <a:effectRef idx="0">
+            <a:schemeClr val="accent1"/>
+          </a:effectRef>
+          <a:fontRef idx="minor">
+            <a:schemeClr val="tx1"/>
+          </a:fontRef>
+        </p:style>
+      </p:cxnSp>
+      <p:cxnSp>
+        <p:nvCxnSpPr>
+          <p:cNvPr id="31" name="Straight Connector 30"/>
+          <p:cNvCxnSpPr/>
+          <p:nvPr/>
+        </p:nvCxnSpPr>
+        <p:spPr>
+          <a:xfrm>
+            <a:off x="5602432" y="671946"/>
+            <a:ext cx="0" cy="1092751"/>
+          </a:xfrm>
+          <a:prstGeom prst="line">
+            <a:avLst/>
+          </a:prstGeom>
+          <a:ln w="57150">
+            <a:solidFill>
+              <a:schemeClr val="tx1">
+                <a:lumMod val="65000"/>
+                <a:lumOff val="35000"/>
+              </a:schemeClr>
+            </a:solidFill>
+          </a:ln>
+        </p:spPr>
+        <p:style>
+          <a:lnRef idx="1">
+            <a:schemeClr val="accent1"/>
+          </a:lnRef>
+          <a:fillRef idx="0">
+            <a:schemeClr val="accent1"/>
+          </a:fillRef>
+          <a:effectRef idx="0">
+            <a:schemeClr val="accent1"/>
+          </a:effectRef>
+          <a:fontRef idx="minor">
+            <a:schemeClr val="tx1"/>
+          </a:fontRef>
+        </p:style>
+      </p:cxnSp>
+      <p:cxnSp>
+        <p:nvCxnSpPr>
+          <p:cNvPr id="33" name="Straight Connector 32"/>
+          <p:cNvCxnSpPr/>
+          <p:nvPr/>
+        </p:nvCxnSpPr>
+        <p:spPr>
+          <a:xfrm>
+            <a:off x="5368059" y="971983"/>
+            <a:ext cx="514350" cy="547688"/>
+          </a:xfrm>
+          <a:prstGeom prst="line">
+            <a:avLst/>
+          </a:prstGeom>
+          <a:ln w="57150">
+            <a:solidFill>
+              <a:schemeClr val="tx1">
+                <a:lumMod val="65000"/>
+                <a:lumOff val="35000"/>
+              </a:schemeClr>
+            </a:solidFill>
+          </a:ln>
+        </p:spPr>
+        <p:style>
+          <a:lnRef idx="1">
+            <a:schemeClr val="accent1"/>
+          </a:lnRef>
+          <a:fillRef idx="0">
+            <a:schemeClr val="accent1"/>
+          </a:fillRef>
+          <a:effectRef idx="0">
+            <a:schemeClr val="accent1"/>
+          </a:effectRef>
+          <a:fontRef idx="minor">
+            <a:schemeClr val="tx1"/>
+          </a:fontRef>
+        </p:style>
+      </p:cxnSp>
       <p:cxnSp>
         <p:nvCxnSpPr>
           <p:cNvPr id="125" name="Straight Connector 124"/>
@@ -10812,55 +11264,6 @@
           <a:solidFill>
             <a:srgbClr val="01FD07"/>
           </a:solidFill>
-        </p:spPr>
-        <p:style>
-          <a:lnRef idx="2">
-            <a:schemeClr val="accent1">
-              <a:shade val="50000"/>
-            </a:schemeClr>
-          </a:lnRef>
-          <a:fillRef idx="1">
-            <a:schemeClr val="accent1"/>
-          </a:fillRef>
-          <a:effectRef idx="0">
-            <a:schemeClr val="accent1"/>
-          </a:effectRef>
-          <a:fontRef idx="minor">
-            <a:schemeClr val="lt1"/>
-          </a:fontRef>
-        </p:style>
-        <p:txBody>
-          <a:bodyPr rtlCol="0" anchor="ctr"/>
-          <a:lstStyle/>
-          <a:p>
-            <a:pPr algn="ctr"/>
-            <a:endParaRPr lang="es-AR"/>
-          </a:p>
-        </p:txBody>
-      </p:sp>
-      <p:sp>
-        <p:nvSpPr>
-          <p:cNvPr id="5" name="Rectangle 4"/>
-          <p:cNvSpPr/>
-          <p:nvPr/>
-        </p:nvSpPr>
-        <p:spPr>
-          <a:xfrm>
-            <a:off x="5876636" y="808785"/>
-            <a:ext cx="1089891" cy="1432162"/>
-          </a:xfrm>
-          <a:prstGeom prst="rect">
-            <a:avLst/>
-          </a:prstGeom>
-          <a:noFill/>
-          <a:ln w="127000">
-            <a:solidFill>
-              <a:schemeClr val="tx1">
-                <a:lumMod val="65000"/>
-                <a:lumOff val="35000"/>
-              </a:schemeClr>
-            </a:solidFill>
-          </a:ln>
         </p:spPr>
         <p:style>
           <a:lnRef idx="2">
@@ -11178,44 +11581,6 @@
       </p:cxnSp>
       <p:cxnSp>
         <p:nvCxnSpPr>
-          <p:cNvPr id="18" name="Straight Connector 17"/>
-          <p:cNvCxnSpPr/>
-          <p:nvPr/>
-        </p:nvCxnSpPr>
-        <p:spPr>
-          <a:xfrm>
-            <a:off x="5381625" y="1438275"/>
-            <a:ext cx="485775" cy="831850"/>
-          </a:xfrm>
-          <a:prstGeom prst="line">
-            <a:avLst/>
-          </a:prstGeom>
-          <a:ln w="127000">
-            <a:solidFill>
-              <a:schemeClr val="tx1">
-                <a:lumMod val="65000"/>
-                <a:lumOff val="35000"/>
-              </a:schemeClr>
-            </a:solidFill>
-          </a:ln>
-        </p:spPr>
-        <p:style>
-          <a:lnRef idx="1">
-            <a:schemeClr val="accent1"/>
-          </a:lnRef>
-          <a:fillRef idx="0">
-            <a:schemeClr val="accent1"/>
-          </a:fillRef>
-          <a:effectRef idx="0">
-            <a:schemeClr val="accent1"/>
-          </a:effectRef>
-          <a:fontRef idx="minor">
-            <a:schemeClr val="tx1"/>
-          </a:fontRef>
-        </p:style>
-      </p:cxnSp>
-      <p:cxnSp>
-        <p:nvCxnSpPr>
           <p:cNvPr id="23" name="Straight Connector 22"/>
           <p:cNvCxnSpPr/>
           <p:nvPr/>
@@ -11267,82 +11632,6 @@
             <a:avLst/>
           </a:prstGeom>
           <a:ln w="127000">
-            <a:solidFill>
-              <a:schemeClr val="tx1">
-                <a:lumMod val="65000"/>
-                <a:lumOff val="35000"/>
-              </a:schemeClr>
-            </a:solidFill>
-          </a:ln>
-        </p:spPr>
-        <p:style>
-          <a:lnRef idx="1">
-            <a:schemeClr val="accent1"/>
-          </a:lnRef>
-          <a:fillRef idx="0">
-            <a:schemeClr val="accent1"/>
-          </a:fillRef>
-          <a:effectRef idx="0">
-            <a:schemeClr val="accent1"/>
-          </a:effectRef>
-          <a:fontRef idx="minor">
-            <a:schemeClr val="tx1"/>
-          </a:fontRef>
-        </p:style>
-      </p:cxnSp>
-      <p:cxnSp>
-        <p:nvCxnSpPr>
-          <p:cNvPr id="31" name="Straight Connector 30"/>
-          <p:cNvCxnSpPr/>
-          <p:nvPr/>
-        </p:nvCxnSpPr>
-        <p:spPr>
-          <a:xfrm>
-            <a:off x="5602432" y="671946"/>
-            <a:ext cx="0" cy="1092751"/>
-          </a:xfrm>
-          <a:prstGeom prst="line">
-            <a:avLst/>
-          </a:prstGeom>
-          <a:ln w="57150">
-            <a:solidFill>
-              <a:schemeClr val="tx1">
-                <a:lumMod val="65000"/>
-                <a:lumOff val="35000"/>
-              </a:schemeClr>
-            </a:solidFill>
-          </a:ln>
-        </p:spPr>
-        <p:style>
-          <a:lnRef idx="1">
-            <a:schemeClr val="accent1"/>
-          </a:lnRef>
-          <a:fillRef idx="0">
-            <a:schemeClr val="accent1"/>
-          </a:fillRef>
-          <a:effectRef idx="0">
-            <a:schemeClr val="accent1"/>
-          </a:effectRef>
-          <a:fontRef idx="minor">
-            <a:schemeClr val="tx1"/>
-          </a:fontRef>
-        </p:style>
-      </p:cxnSp>
-      <p:cxnSp>
-        <p:nvCxnSpPr>
-          <p:cNvPr id="33" name="Straight Connector 32"/>
-          <p:cNvCxnSpPr/>
-          <p:nvPr/>
-        </p:nvCxnSpPr>
-        <p:spPr>
-          <a:xfrm>
-            <a:off x="5368059" y="971983"/>
-            <a:ext cx="514350" cy="547688"/>
-          </a:xfrm>
-          <a:prstGeom prst="line">
-            <a:avLst/>
-          </a:prstGeom>
-          <a:ln w="57150">
             <a:solidFill>
               <a:schemeClr val="tx1">
                 <a:lumMod val="65000"/>
@@ -13333,10 +13622,2055 @@
           </a:fontRef>
         </p:style>
       </p:cxnSp>
+      <p:grpSp>
+        <p:nvGrpSpPr>
+          <p:cNvPr id="30" name="Group 29"/>
+          <p:cNvGrpSpPr/>
+          <p:nvPr/>
+        </p:nvGrpSpPr>
+        <p:grpSpPr>
+          <a:xfrm rot="18822949">
+            <a:off x="1612156" y="3891826"/>
+            <a:ext cx="1983896" cy="1745475"/>
+            <a:chOff x="5164265" y="1179385"/>
+            <a:chExt cx="1342431" cy="1181100"/>
+          </a:xfrm>
+        </p:grpSpPr>
+        <p:sp>
+          <p:nvSpPr>
+            <p:cNvPr id="29" name="Rectangle 28"/>
+            <p:cNvSpPr/>
+            <p:nvPr/>
+          </p:nvSpPr>
+          <p:spPr>
+            <a:xfrm rot="2378626">
+              <a:off x="5432964" y="1824292"/>
+              <a:ext cx="624851" cy="523386"/>
+            </a:xfrm>
+            <a:prstGeom prst="rect">
+              <a:avLst/>
+            </a:prstGeom>
+            <a:solidFill>
+              <a:schemeClr val="bg1"/>
+            </a:solidFill>
+            <a:ln w="88900">
+              <a:solidFill>
+                <a:schemeClr val="bg1"/>
+              </a:solidFill>
+            </a:ln>
+          </p:spPr>
+          <p:style>
+            <a:lnRef idx="2">
+              <a:schemeClr val="accent1">
+                <a:shade val="50000"/>
+              </a:schemeClr>
+            </a:lnRef>
+            <a:fillRef idx="1">
+              <a:schemeClr val="accent1"/>
+            </a:fillRef>
+            <a:effectRef idx="0">
+              <a:schemeClr val="accent1"/>
+            </a:effectRef>
+            <a:fontRef idx="minor">
+              <a:schemeClr val="lt1"/>
+            </a:fontRef>
+          </p:style>
+          <p:txBody>
+            <a:bodyPr rtlCol="0" anchor="ctr"/>
+            <a:lstStyle/>
+            <a:p>
+              <a:pPr algn="ctr"/>
+              <a:endParaRPr lang="es-AR"/>
+            </a:p>
+          </p:txBody>
+        </p:sp>
+        <p:sp>
+          <p:nvSpPr>
+            <p:cNvPr id="28" name="Rectangle 27"/>
+            <p:cNvSpPr/>
+            <p:nvPr/>
+          </p:nvSpPr>
+          <p:spPr>
+            <a:xfrm rot="19085439">
+              <a:off x="5164265" y="1509067"/>
+              <a:ext cx="1181100" cy="242336"/>
+            </a:xfrm>
+            <a:prstGeom prst="rect">
+              <a:avLst/>
+            </a:prstGeom>
+            <a:solidFill>
+              <a:schemeClr val="bg1"/>
+            </a:solidFill>
+            <a:ln w="88900">
+              <a:solidFill>
+                <a:schemeClr val="bg1"/>
+              </a:solidFill>
+            </a:ln>
+          </p:spPr>
+          <p:style>
+            <a:lnRef idx="2">
+              <a:schemeClr val="accent1">
+                <a:shade val="50000"/>
+              </a:schemeClr>
+            </a:lnRef>
+            <a:fillRef idx="1">
+              <a:schemeClr val="accent1"/>
+            </a:fillRef>
+            <a:effectRef idx="0">
+              <a:schemeClr val="accent1"/>
+            </a:effectRef>
+            <a:fontRef idx="minor">
+              <a:schemeClr val="lt1"/>
+            </a:fontRef>
+          </p:style>
+          <p:txBody>
+            <a:bodyPr rtlCol="0" anchor="ctr"/>
+            <a:lstStyle/>
+            <a:p>
+              <a:pPr algn="ctr"/>
+              <a:endParaRPr lang="es-AR"/>
+            </a:p>
+          </p:txBody>
+        </p:sp>
+        <p:sp>
+          <p:nvSpPr>
+            <p:cNvPr id="111" name="Rectangle 110"/>
+            <p:cNvSpPr/>
+            <p:nvPr/>
+          </p:nvSpPr>
+          <p:spPr>
+            <a:xfrm rot="16390679">
+              <a:off x="5494464" y="1648767"/>
+              <a:ext cx="1181100" cy="242336"/>
+            </a:xfrm>
+            <a:prstGeom prst="rect">
+              <a:avLst/>
+            </a:prstGeom>
+            <a:solidFill>
+              <a:schemeClr val="bg1"/>
+            </a:solidFill>
+            <a:ln w="88900">
+              <a:solidFill>
+                <a:schemeClr val="bg1"/>
+              </a:solidFill>
+            </a:ln>
+          </p:spPr>
+          <p:style>
+            <a:lnRef idx="2">
+              <a:schemeClr val="accent1">
+                <a:shade val="50000"/>
+              </a:schemeClr>
+            </a:lnRef>
+            <a:fillRef idx="1">
+              <a:schemeClr val="accent1"/>
+            </a:fillRef>
+            <a:effectRef idx="0">
+              <a:schemeClr val="accent1"/>
+            </a:effectRef>
+            <a:fontRef idx="minor">
+              <a:schemeClr val="lt1"/>
+            </a:fontRef>
+          </p:style>
+          <p:txBody>
+            <a:bodyPr rtlCol="0" anchor="ctr"/>
+            <a:lstStyle/>
+            <a:p>
+              <a:pPr algn="ctr"/>
+              <a:endParaRPr lang="es-AR"/>
+            </a:p>
+          </p:txBody>
+        </p:sp>
+        <p:grpSp>
+          <p:nvGrpSpPr>
+            <p:cNvPr id="19" name="Group 18"/>
+            <p:cNvGrpSpPr/>
+            <p:nvPr/>
+          </p:nvGrpSpPr>
+          <p:grpSpPr>
+            <a:xfrm>
+              <a:off x="5427924" y="1221042"/>
+              <a:ext cx="1078772" cy="1104931"/>
+              <a:chOff x="1162580" y="1308965"/>
+              <a:chExt cx="1078772" cy="1104931"/>
+            </a:xfrm>
+          </p:grpSpPr>
+          <p:sp>
+            <p:nvSpPr>
+              <p:cNvPr id="17" name="Rectangle 16"/>
+              <p:cNvSpPr/>
+              <p:nvPr/>
+            </p:nvSpPr>
+            <p:spPr>
+              <a:xfrm rot="1416968">
+                <a:off x="1520005" y="1744396"/>
+                <a:ext cx="115358" cy="642139"/>
+              </a:xfrm>
+              <a:prstGeom prst="rect">
+                <a:avLst/>
+              </a:prstGeom>
+              <a:solidFill>
+                <a:schemeClr val="bg1"/>
+              </a:solidFill>
+              <a:ln w="88900">
+                <a:solidFill>
+                  <a:schemeClr val="bg1"/>
+                </a:solidFill>
+              </a:ln>
+            </p:spPr>
+            <p:style>
+              <a:lnRef idx="2">
+                <a:schemeClr val="accent1">
+                  <a:shade val="50000"/>
+                </a:schemeClr>
+              </a:lnRef>
+              <a:fillRef idx="1">
+                <a:schemeClr val="accent1"/>
+              </a:fillRef>
+              <a:effectRef idx="0">
+                <a:schemeClr val="accent1"/>
+              </a:effectRef>
+              <a:fontRef idx="minor">
+                <a:schemeClr val="lt1"/>
+              </a:fontRef>
+            </p:style>
+            <p:txBody>
+              <a:bodyPr rtlCol="0" anchor="ctr"/>
+              <a:lstStyle/>
+              <a:p>
+                <a:pPr algn="ctr"/>
+                <a:endParaRPr lang="es-AR"/>
+              </a:p>
+            </p:txBody>
+          </p:sp>
+          <p:grpSp>
+            <p:nvGrpSpPr>
+              <p:cNvPr id="14" name="Group 13"/>
+              <p:cNvGrpSpPr/>
+              <p:nvPr/>
+            </p:nvGrpSpPr>
+            <p:grpSpPr>
+              <a:xfrm>
+                <a:off x="1162580" y="1308965"/>
+                <a:ext cx="1078772" cy="1104931"/>
+                <a:chOff x="1549442" y="1308965"/>
+                <a:chExt cx="1078772" cy="1104931"/>
+              </a:xfrm>
+            </p:grpSpPr>
+            <p:sp>
+              <p:nvSpPr>
+                <p:cNvPr id="13" name="Isosceles Triangle 12"/>
+                <p:cNvSpPr/>
+                <p:nvPr/>
+              </p:nvSpPr>
+              <p:spPr>
+                <a:xfrm rot="1501557">
+                  <a:off x="1801723" y="1308965"/>
+                  <a:ext cx="649608" cy="769795"/>
+                </a:xfrm>
+                <a:prstGeom prst="triangle">
+                  <a:avLst/>
+                </a:prstGeom>
+                <a:solidFill>
+                  <a:schemeClr val="bg1"/>
+                </a:solidFill>
+                <a:ln w="88900">
+                  <a:solidFill>
+                    <a:schemeClr val="bg1"/>
+                  </a:solidFill>
+                </a:ln>
+              </p:spPr>
+              <p:style>
+                <a:lnRef idx="2">
+                  <a:schemeClr val="accent1">
+                    <a:shade val="50000"/>
+                  </a:schemeClr>
+                </a:lnRef>
+                <a:fillRef idx="1">
+                  <a:schemeClr val="accent1"/>
+                </a:fillRef>
+                <a:effectRef idx="0">
+                  <a:schemeClr val="accent1"/>
+                </a:effectRef>
+                <a:fontRef idx="minor">
+                  <a:schemeClr val="lt1"/>
+                </a:fontRef>
+              </p:style>
+              <p:txBody>
+                <a:bodyPr rtlCol="0" anchor="ctr"/>
+                <a:lstStyle/>
+                <a:p>
+                  <a:pPr algn="ctr"/>
+                  <a:endParaRPr lang="es-AR"/>
+                </a:p>
+              </p:txBody>
+            </p:sp>
+            <p:grpSp>
+              <p:nvGrpSpPr>
+                <p:cNvPr id="90" name="Group 89"/>
+                <p:cNvGrpSpPr/>
+                <p:nvPr/>
+              </p:nvGrpSpPr>
+              <p:grpSpPr>
+                <a:xfrm rot="2838661">
+                  <a:off x="1640095" y="1425777"/>
+                  <a:ext cx="897466" cy="1078772"/>
+                  <a:chOff x="2346299" y="1600200"/>
+                  <a:chExt cx="2333000" cy="2804313"/>
+                </a:xfrm>
+              </p:grpSpPr>
+              <p:cxnSp>
+                <p:nvCxnSpPr>
+                  <p:cNvPr id="98" name="Straight Connector 97"/>
+                  <p:cNvCxnSpPr/>
+                  <p:nvPr/>
+                </p:nvCxnSpPr>
+                <p:spPr>
+                  <a:xfrm rot="18761339">
+                    <a:off x="3683354" y="2960283"/>
+                    <a:ext cx="546119" cy="572453"/>
+                  </a:xfrm>
+                  <a:prstGeom prst="line">
+                    <a:avLst/>
+                  </a:prstGeom>
+                  <a:ln w="88900">
+                    <a:solidFill>
+                      <a:schemeClr val="tx1"/>
+                    </a:solidFill>
+                  </a:ln>
+                </p:spPr>
+                <p:style>
+                  <a:lnRef idx="1">
+                    <a:schemeClr val="accent1"/>
+                  </a:lnRef>
+                  <a:fillRef idx="0">
+                    <a:schemeClr val="accent1"/>
+                  </a:fillRef>
+                  <a:effectRef idx="0">
+                    <a:schemeClr val="accent1"/>
+                  </a:effectRef>
+                  <a:fontRef idx="minor">
+                    <a:schemeClr val="tx1"/>
+                  </a:fontRef>
+                </p:style>
+              </p:cxnSp>
+              <p:grpSp>
+                <p:nvGrpSpPr>
+                  <p:cNvPr id="102" name="Group 101"/>
+                  <p:cNvGrpSpPr/>
+                  <p:nvPr/>
+                </p:nvGrpSpPr>
+                <p:grpSpPr>
+                  <a:xfrm>
+                    <a:off x="2346299" y="1600200"/>
+                    <a:ext cx="2333000" cy="2804313"/>
+                    <a:chOff x="2346299" y="1600200"/>
+                    <a:chExt cx="2333000" cy="2804313"/>
+                  </a:xfrm>
+                </p:grpSpPr>
+                <p:cxnSp>
+                  <p:nvCxnSpPr>
+                    <p:cNvPr id="103" name="Straight Connector 102"/>
+                    <p:cNvCxnSpPr/>
+                    <p:nvPr/>
+                  </p:nvCxnSpPr>
+                  <p:spPr>
+                    <a:xfrm>
+                      <a:off x="2690447" y="1600200"/>
+                      <a:ext cx="0" cy="2365131"/>
+                    </a:xfrm>
+                    <a:prstGeom prst="line">
+                      <a:avLst/>
+                    </a:prstGeom>
+                    <a:ln w="88900">
+                      <a:solidFill>
+                        <a:schemeClr val="tx1"/>
+                      </a:solidFill>
+                    </a:ln>
+                  </p:spPr>
+                  <p:style>
+                    <a:lnRef idx="1">
+                      <a:schemeClr val="accent1"/>
+                    </a:lnRef>
+                    <a:fillRef idx="0">
+                      <a:schemeClr val="accent1"/>
+                    </a:fillRef>
+                    <a:effectRef idx="0">
+                      <a:schemeClr val="accent1"/>
+                    </a:effectRef>
+                    <a:fontRef idx="minor">
+                      <a:schemeClr val="tx1"/>
+                    </a:fontRef>
+                  </p:style>
+                </p:cxnSp>
+                <p:cxnSp>
+                  <p:nvCxnSpPr>
+                    <p:cNvPr id="104" name="Straight Connector 103"/>
+                    <p:cNvCxnSpPr/>
+                    <p:nvPr/>
+                  </p:nvCxnSpPr>
+                  <p:spPr>
+                    <a:xfrm flipV="1">
+                      <a:off x="2693377" y="3338513"/>
+                      <a:ext cx="573698" cy="629751"/>
+                    </a:xfrm>
+                    <a:prstGeom prst="line">
+                      <a:avLst/>
+                    </a:prstGeom>
+                    <a:ln w="88900">
+                      <a:solidFill>
+                        <a:schemeClr val="tx1"/>
+                      </a:solidFill>
+                    </a:ln>
+                  </p:spPr>
+                  <p:style>
+                    <a:lnRef idx="1">
+                      <a:schemeClr val="accent1"/>
+                    </a:lnRef>
+                    <a:fillRef idx="0">
+                      <a:schemeClr val="accent1"/>
+                    </a:fillRef>
+                    <a:effectRef idx="0">
+                      <a:schemeClr val="accent1"/>
+                    </a:effectRef>
+                    <a:fontRef idx="minor">
+                      <a:schemeClr val="tx1"/>
+                    </a:fontRef>
+                  </p:style>
+                </p:cxnSp>
+                <p:cxnSp>
+                  <p:nvCxnSpPr>
+                    <p:cNvPr id="106" name="Straight Connector 105"/>
+                    <p:cNvCxnSpPr/>
+                    <p:nvPr/>
+                  </p:nvCxnSpPr>
+                  <p:spPr>
+                    <a:xfrm rot="18761339" flipH="1">
+                      <a:off x="3461068" y="1262632"/>
+                      <a:ext cx="103462" cy="2333000"/>
+                    </a:xfrm>
+                    <a:prstGeom prst="line">
+                      <a:avLst/>
+                    </a:prstGeom>
+                    <a:ln w="88900">
+                      <a:solidFill>
+                        <a:schemeClr val="tx1"/>
+                      </a:solidFill>
+                    </a:ln>
+                  </p:spPr>
+                  <p:style>
+                    <a:lnRef idx="1">
+                      <a:schemeClr val="accent1"/>
+                    </a:lnRef>
+                    <a:fillRef idx="0">
+                      <a:schemeClr val="accent1"/>
+                    </a:fillRef>
+                    <a:effectRef idx="0">
+                      <a:schemeClr val="accent1"/>
+                    </a:effectRef>
+                    <a:fontRef idx="minor">
+                      <a:schemeClr val="tx1"/>
+                    </a:fontRef>
+                  </p:style>
+                </p:cxnSp>
+                <p:cxnSp>
+                  <p:nvCxnSpPr>
+                    <p:cNvPr id="107" name="Straight Connector 106"/>
+                    <p:cNvCxnSpPr/>
+                    <p:nvPr/>
+                  </p:nvCxnSpPr>
+                  <p:spPr>
+                    <a:xfrm>
+                      <a:off x="3560884" y="3253154"/>
+                      <a:ext cx="386862" cy="852854"/>
+                    </a:xfrm>
+                    <a:prstGeom prst="line">
+                      <a:avLst/>
+                    </a:prstGeom>
+                    <a:ln w="88900">
+                      <a:solidFill>
+                        <a:schemeClr val="tx1"/>
+                      </a:solidFill>
+                    </a:ln>
+                  </p:spPr>
+                  <p:style>
+                    <a:lnRef idx="1">
+                      <a:schemeClr val="accent1"/>
+                    </a:lnRef>
+                    <a:fillRef idx="0">
+                      <a:schemeClr val="accent1"/>
+                    </a:fillRef>
+                    <a:effectRef idx="0">
+                      <a:schemeClr val="accent1"/>
+                    </a:effectRef>
+                    <a:fontRef idx="minor">
+                      <a:schemeClr val="tx1"/>
+                    </a:fontRef>
+                  </p:style>
+                </p:cxnSp>
+                <p:cxnSp>
+                  <p:nvCxnSpPr>
+                    <p:cNvPr id="108" name="Straight Connector 107"/>
+                    <p:cNvCxnSpPr/>
+                    <p:nvPr/>
+                  </p:nvCxnSpPr>
+                  <p:spPr>
+                    <a:xfrm>
+                      <a:off x="3246258" y="3333750"/>
+                      <a:ext cx="411342" cy="939312"/>
+                    </a:xfrm>
+                    <a:prstGeom prst="line">
+                      <a:avLst/>
+                    </a:prstGeom>
+                    <a:ln w="88900">
+                      <a:solidFill>
+                        <a:schemeClr val="tx1"/>
+                      </a:solidFill>
+                    </a:ln>
+                  </p:spPr>
+                  <p:style>
+                    <a:lnRef idx="1">
+                      <a:schemeClr val="accent1"/>
+                    </a:lnRef>
+                    <a:fillRef idx="0">
+                      <a:schemeClr val="accent1"/>
+                    </a:fillRef>
+                    <a:effectRef idx="0">
+                      <a:schemeClr val="accent1"/>
+                    </a:effectRef>
+                    <a:fontRef idx="minor">
+                      <a:schemeClr val="tx1"/>
+                    </a:fontRef>
+                  </p:style>
+                </p:cxnSp>
+                <p:cxnSp>
+                  <p:nvCxnSpPr>
+                    <p:cNvPr id="109" name="Straight Connector 108"/>
+                    <p:cNvCxnSpPr/>
+                    <p:nvPr/>
+                  </p:nvCxnSpPr>
+                  <p:spPr>
+                    <a:xfrm rot="18761339">
+                      <a:off x="3580672" y="4088859"/>
+                      <a:ext cx="445195" cy="186114"/>
+                    </a:xfrm>
+                    <a:prstGeom prst="line">
+                      <a:avLst/>
+                    </a:prstGeom>
+                    <a:ln w="88900">
+                      <a:solidFill>
+                        <a:schemeClr val="tx1"/>
+                      </a:solidFill>
+                    </a:ln>
+                  </p:spPr>
+                  <p:style>
+                    <a:lnRef idx="1">
+                      <a:schemeClr val="accent1"/>
+                    </a:lnRef>
+                    <a:fillRef idx="0">
+                      <a:schemeClr val="accent1"/>
+                    </a:fillRef>
+                    <a:effectRef idx="0">
+                      <a:schemeClr val="accent1"/>
+                    </a:effectRef>
+                    <a:fontRef idx="minor">
+                      <a:schemeClr val="tx1"/>
+                    </a:fontRef>
+                  </p:style>
+                </p:cxnSp>
+              </p:grpSp>
+            </p:grpSp>
+          </p:grpSp>
+        </p:grpSp>
+      </p:grpSp>
+      <p:grpSp>
+        <p:nvGrpSpPr>
+          <p:cNvPr id="113" name="Group 112"/>
+          <p:cNvGrpSpPr/>
+          <p:nvPr/>
+        </p:nvGrpSpPr>
+        <p:grpSpPr>
+          <a:xfrm>
+            <a:off x="6967665" y="5128246"/>
+            <a:ext cx="1342431" cy="1139353"/>
+            <a:chOff x="5164265" y="1221042"/>
+            <a:chExt cx="1342431" cy="1139353"/>
+          </a:xfrm>
+        </p:grpSpPr>
+        <p:sp>
+          <p:nvSpPr>
+            <p:cNvPr id="114" name="Rectangle 113"/>
+            <p:cNvSpPr/>
+            <p:nvPr/>
+          </p:nvSpPr>
+          <p:spPr>
+            <a:xfrm rot="2378626">
+              <a:off x="5432964" y="1824292"/>
+              <a:ext cx="624851" cy="523386"/>
+            </a:xfrm>
+            <a:prstGeom prst="rect">
+              <a:avLst/>
+            </a:prstGeom>
+            <a:solidFill>
+              <a:schemeClr val="bg1"/>
+            </a:solidFill>
+            <a:ln>
+              <a:solidFill>
+                <a:schemeClr val="bg1"/>
+              </a:solidFill>
+            </a:ln>
+          </p:spPr>
+          <p:style>
+            <a:lnRef idx="2">
+              <a:schemeClr val="accent1">
+                <a:shade val="50000"/>
+              </a:schemeClr>
+            </a:lnRef>
+            <a:fillRef idx="1">
+              <a:schemeClr val="accent1"/>
+            </a:fillRef>
+            <a:effectRef idx="0">
+              <a:schemeClr val="accent1"/>
+            </a:effectRef>
+            <a:fontRef idx="minor">
+              <a:schemeClr val="lt1"/>
+            </a:fontRef>
+          </p:style>
+          <p:txBody>
+            <a:bodyPr rtlCol="0" anchor="ctr"/>
+            <a:lstStyle/>
+            <a:p>
+              <a:pPr algn="ctr"/>
+              <a:endParaRPr lang="es-AR"/>
+            </a:p>
+          </p:txBody>
+        </p:sp>
+        <p:sp>
+          <p:nvSpPr>
+            <p:cNvPr id="120" name="Rectangle 119"/>
+            <p:cNvSpPr/>
+            <p:nvPr/>
+          </p:nvSpPr>
+          <p:spPr>
+            <a:xfrm rot="19085439">
+              <a:off x="5164265" y="1509067"/>
+              <a:ext cx="1181100" cy="242336"/>
+            </a:xfrm>
+            <a:prstGeom prst="rect">
+              <a:avLst/>
+            </a:prstGeom>
+            <a:solidFill>
+              <a:schemeClr val="bg1"/>
+            </a:solidFill>
+            <a:ln>
+              <a:solidFill>
+                <a:schemeClr val="bg1"/>
+              </a:solidFill>
+            </a:ln>
+          </p:spPr>
+          <p:style>
+            <a:lnRef idx="2">
+              <a:schemeClr val="accent1">
+                <a:shade val="50000"/>
+              </a:schemeClr>
+            </a:lnRef>
+            <a:fillRef idx="1">
+              <a:schemeClr val="accent1"/>
+            </a:fillRef>
+            <a:effectRef idx="0">
+              <a:schemeClr val="accent1"/>
+            </a:effectRef>
+            <a:fontRef idx="minor">
+              <a:schemeClr val="lt1"/>
+            </a:fontRef>
+          </p:style>
+          <p:txBody>
+            <a:bodyPr rtlCol="0" anchor="ctr"/>
+            <a:lstStyle/>
+            <a:p>
+              <a:pPr algn="ctr"/>
+              <a:endParaRPr lang="es-AR"/>
+            </a:p>
+          </p:txBody>
+        </p:sp>
+        <p:sp>
+          <p:nvSpPr>
+            <p:cNvPr id="121" name="Rectangle 120"/>
+            <p:cNvSpPr/>
+            <p:nvPr/>
+          </p:nvSpPr>
+          <p:spPr>
+            <a:xfrm rot="16390679">
+              <a:off x="5549812" y="1707273"/>
+              <a:ext cx="1063908" cy="242336"/>
+            </a:xfrm>
+            <a:prstGeom prst="rect">
+              <a:avLst/>
+            </a:prstGeom>
+            <a:solidFill>
+              <a:schemeClr val="bg1"/>
+            </a:solidFill>
+            <a:ln>
+              <a:solidFill>
+                <a:schemeClr val="bg1"/>
+              </a:solidFill>
+            </a:ln>
+          </p:spPr>
+          <p:style>
+            <a:lnRef idx="2">
+              <a:schemeClr val="accent1">
+                <a:shade val="50000"/>
+              </a:schemeClr>
+            </a:lnRef>
+            <a:fillRef idx="1">
+              <a:schemeClr val="accent1"/>
+            </a:fillRef>
+            <a:effectRef idx="0">
+              <a:schemeClr val="accent1"/>
+            </a:effectRef>
+            <a:fontRef idx="minor">
+              <a:schemeClr val="lt1"/>
+            </a:fontRef>
+          </p:style>
+          <p:txBody>
+            <a:bodyPr rtlCol="0" anchor="ctr"/>
+            <a:lstStyle/>
+            <a:p>
+              <a:pPr algn="ctr"/>
+              <a:endParaRPr lang="es-AR"/>
+            </a:p>
+          </p:txBody>
+        </p:sp>
+        <p:grpSp>
+          <p:nvGrpSpPr>
+            <p:cNvPr id="122" name="Group 121"/>
+            <p:cNvGrpSpPr/>
+            <p:nvPr/>
+          </p:nvGrpSpPr>
+          <p:grpSpPr>
+            <a:xfrm>
+              <a:off x="5427924" y="1221042"/>
+              <a:ext cx="1078772" cy="1104931"/>
+              <a:chOff x="1162580" y="1308965"/>
+              <a:chExt cx="1078772" cy="1104931"/>
+            </a:xfrm>
+          </p:grpSpPr>
+          <p:sp>
+            <p:nvSpPr>
+              <p:cNvPr id="123" name="Rectangle 122"/>
+              <p:cNvSpPr/>
+              <p:nvPr/>
+            </p:nvSpPr>
+            <p:spPr>
+              <a:xfrm rot="1416968">
+                <a:off x="1520005" y="1744396"/>
+                <a:ext cx="115358" cy="642139"/>
+              </a:xfrm>
+              <a:prstGeom prst="rect">
+                <a:avLst/>
+              </a:prstGeom>
+              <a:solidFill>
+                <a:schemeClr val="bg1"/>
+              </a:solidFill>
+              <a:ln>
+                <a:solidFill>
+                  <a:schemeClr val="bg1"/>
+                </a:solidFill>
+              </a:ln>
+            </p:spPr>
+            <p:style>
+              <a:lnRef idx="2">
+                <a:schemeClr val="accent1">
+                  <a:shade val="50000"/>
+                </a:schemeClr>
+              </a:lnRef>
+              <a:fillRef idx="1">
+                <a:schemeClr val="accent1"/>
+              </a:fillRef>
+              <a:effectRef idx="0">
+                <a:schemeClr val="accent1"/>
+              </a:effectRef>
+              <a:fontRef idx="minor">
+                <a:schemeClr val="lt1"/>
+              </a:fontRef>
+            </p:style>
+            <p:txBody>
+              <a:bodyPr rtlCol="0" anchor="ctr"/>
+              <a:lstStyle/>
+              <a:p>
+                <a:pPr algn="ctr"/>
+                <a:endParaRPr lang="es-AR"/>
+              </a:p>
+            </p:txBody>
+          </p:sp>
+          <p:grpSp>
+            <p:nvGrpSpPr>
+              <p:cNvPr id="128" name="Group 127"/>
+              <p:cNvGrpSpPr/>
+              <p:nvPr/>
+            </p:nvGrpSpPr>
+            <p:grpSpPr>
+              <a:xfrm>
+                <a:off x="1162580" y="1308965"/>
+                <a:ext cx="1078772" cy="1104931"/>
+                <a:chOff x="1549442" y="1308965"/>
+                <a:chExt cx="1078772" cy="1104931"/>
+              </a:xfrm>
+            </p:grpSpPr>
+            <p:sp>
+              <p:nvSpPr>
+                <p:cNvPr id="129" name="Isosceles Triangle 128"/>
+                <p:cNvSpPr/>
+                <p:nvPr/>
+              </p:nvSpPr>
+              <p:spPr>
+                <a:xfrm rot="1501557">
+                  <a:off x="1801723" y="1308965"/>
+                  <a:ext cx="649608" cy="769795"/>
+                </a:xfrm>
+                <a:prstGeom prst="triangle">
+                  <a:avLst/>
+                </a:prstGeom>
+                <a:solidFill>
+                  <a:schemeClr val="bg1"/>
+                </a:solidFill>
+                <a:ln>
+                  <a:solidFill>
+                    <a:schemeClr val="bg1"/>
+                  </a:solidFill>
+                </a:ln>
+              </p:spPr>
+              <p:style>
+                <a:lnRef idx="2">
+                  <a:schemeClr val="accent1">
+                    <a:shade val="50000"/>
+                  </a:schemeClr>
+                </a:lnRef>
+                <a:fillRef idx="1">
+                  <a:schemeClr val="accent1"/>
+                </a:fillRef>
+                <a:effectRef idx="0">
+                  <a:schemeClr val="accent1"/>
+                </a:effectRef>
+                <a:fontRef idx="minor">
+                  <a:schemeClr val="lt1"/>
+                </a:fontRef>
+              </p:style>
+              <p:txBody>
+                <a:bodyPr rtlCol="0" anchor="ctr"/>
+                <a:lstStyle/>
+                <a:p>
+                  <a:pPr algn="ctr"/>
+                  <a:endParaRPr lang="es-AR"/>
+                </a:p>
+              </p:txBody>
+            </p:sp>
+            <p:grpSp>
+              <p:nvGrpSpPr>
+                <p:cNvPr id="130" name="Group 129"/>
+                <p:cNvGrpSpPr/>
+                <p:nvPr/>
+              </p:nvGrpSpPr>
+              <p:grpSpPr>
+                <a:xfrm rot="2838661">
+                  <a:off x="1640095" y="1425777"/>
+                  <a:ext cx="897466" cy="1078772"/>
+                  <a:chOff x="2346299" y="1600200"/>
+                  <a:chExt cx="2333000" cy="2804313"/>
+                </a:xfrm>
+              </p:grpSpPr>
+              <p:cxnSp>
+                <p:nvCxnSpPr>
+                  <p:cNvPr id="131" name="Straight Connector 130"/>
+                  <p:cNvCxnSpPr/>
+                  <p:nvPr/>
+                </p:nvCxnSpPr>
+                <p:spPr>
+                  <a:xfrm rot="18761339">
+                    <a:off x="3683354" y="2960283"/>
+                    <a:ext cx="546119" cy="572453"/>
+                  </a:xfrm>
+                  <a:prstGeom prst="line">
+                    <a:avLst/>
+                  </a:prstGeom>
+                  <a:ln w="76200">
+                    <a:solidFill>
+                      <a:schemeClr val="tx1"/>
+                    </a:solidFill>
+                  </a:ln>
+                </p:spPr>
+                <p:style>
+                  <a:lnRef idx="1">
+                    <a:schemeClr val="accent1"/>
+                  </a:lnRef>
+                  <a:fillRef idx="0">
+                    <a:schemeClr val="accent1"/>
+                  </a:fillRef>
+                  <a:effectRef idx="0">
+                    <a:schemeClr val="accent1"/>
+                  </a:effectRef>
+                  <a:fontRef idx="minor">
+                    <a:schemeClr val="tx1"/>
+                  </a:fontRef>
+                </p:style>
+              </p:cxnSp>
+              <p:grpSp>
+                <p:nvGrpSpPr>
+                  <p:cNvPr id="132" name="Group 131"/>
+                  <p:cNvGrpSpPr/>
+                  <p:nvPr/>
+                </p:nvGrpSpPr>
+                <p:grpSpPr>
+                  <a:xfrm>
+                    <a:off x="2346299" y="1600200"/>
+                    <a:ext cx="2333000" cy="2804313"/>
+                    <a:chOff x="2346299" y="1600200"/>
+                    <a:chExt cx="2333000" cy="2804313"/>
+                  </a:xfrm>
+                </p:grpSpPr>
+                <p:cxnSp>
+                  <p:nvCxnSpPr>
+                    <p:cNvPr id="133" name="Straight Connector 132"/>
+                    <p:cNvCxnSpPr/>
+                    <p:nvPr/>
+                  </p:nvCxnSpPr>
+                  <p:spPr>
+                    <a:xfrm>
+                      <a:off x="2690447" y="1600200"/>
+                      <a:ext cx="0" cy="2365131"/>
+                    </a:xfrm>
+                    <a:prstGeom prst="line">
+                      <a:avLst/>
+                    </a:prstGeom>
+                    <a:ln w="76200">
+                      <a:solidFill>
+                        <a:schemeClr val="tx1"/>
+                      </a:solidFill>
+                    </a:ln>
+                  </p:spPr>
+                  <p:style>
+                    <a:lnRef idx="1">
+                      <a:schemeClr val="accent1"/>
+                    </a:lnRef>
+                    <a:fillRef idx="0">
+                      <a:schemeClr val="accent1"/>
+                    </a:fillRef>
+                    <a:effectRef idx="0">
+                      <a:schemeClr val="accent1"/>
+                    </a:effectRef>
+                    <a:fontRef idx="minor">
+                      <a:schemeClr val="tx1"/>
+                    </a:fontRef>
+                  </p:style>
+                </p:cxnSp>
+                <p:cxnSp>
+                  <p:nvCxnSpPr>
+                    <p:cNvPr id="134" name="Straight Connector 133"/>
+                    <p:cNvCxnSpPr/>
+                    <p:nvPr/>
+                  </p:nvCxnSpPr>
+                  <p:spPr>
+                    <a:xfrm flipV="1">
+                      <a:off x="2693377" y="3338513"/>
+                      <a:ext cx="573698" cy="629751"/>
+                    </a:xfrm>
+                    <a:prstGeom prst="line">
+                      <a:avLst/>
+                    </a:prstGeom>
+                    <a:ln w="76200">
+                      <a:solidFill>
+                        <a:schemeClr val="tx1"/>
+                      </a:solidFill>
+                    </a:ln>
+                  </p:spPr>
+                  <p:style>
+                    <a:lnRef idx="1">
+                      <a:schemeClr val="accent1"/>
+                    </a:lnRef>
+                    <a:fillRef idx="0">
+                      <a:schemeClr val="accent1"/>
+                    </a:fillRef>
+                    <a:effectRef idx="0">
+                      <a:schemeClr val="accent1"/>
+                    </a:effectRef>
+                    <a:fontRef idx="minor">
+                      <a:schemeClr val="tx1"/>
+                    </a:fontRef>
+                  </p:style>
+                </p:cxnSp>
+                <p:cxnSp>
+                  <p:nvCxnSpPr>
+                    <p:cNvPr id="135" name="Straight Connector 134"/>
+                    <p:cNvCxnSpPr/>
+                    <p:nvPr/>
+                  </p:nvCxnSpPr>
+                  <p:spPr>
+                    <a:xfrm rot="18761339" flipH="1">
+                      <a:off x="3461068" y="1262632"/>
+                      <a:ext cx="103462" cy="2333000"/>
+                    </a:xfrm>
+                    <a:prstGeom prst="line">
+                      <a:avLst/>
+                    </a:prstGeom>
+                    <a:ln w="76200">
+                      <a:solidFill>
+                        <a:schemeClr val="tx1"/>
+                      </a:solidFill>
+                    </a:ln>
+                  </p:spPr>
+                  <p:style>
+                    <a:lnRef idx="1">
+                      <a:schemeClr val="accent1"/>
+                    </a:lnRef>
+                    <a:fillRef idx="0">
+                      <a:schemeClr val="accent1"/>
+                    </a:fillRef>
+                    <a:effectRef idx="0">
+                      <a:schemeClr val="accent1"/>
+                    </a:effectRef>
+                    <a:fontRef idx="minor">
+                      <a:schemeClr val="tx1"/>
+                    </a:fontRef>
+                  </p:style>
+                </p:cxnSp>
+                <p:cxnSp>
+                  <p:nvCxnSpPr>
+                    <p:cNvPr id="136" name="Straight Connector 135"/>
+                    <p:cNvCxnSpPr/>
+                    <p:nvPr/>
+                  </p:nvCxnSpPr>
+                  <p:spPr>
+                    <a:xfrm>
+                      <a:off x="3560884" y="3253154"/>
+                      <a:ext cx="386862" cy="852854"/>
+                    </a:xfrm>
+                    <a:prstGeom prst="line">
+                      <a:avLst/>
+                    </a:prstGeom>
+                    <a:ln w="76200">
+                      <a:solidFill>
+                        <a:schemeClr val="tx1"/>
+                      </a:solidFill>
+                    </a:ln>
+                  </p:spPr>
+                  <p:style>
+                    <a:lnRef idx="1">
+                      <a:schemeClr val="accent1"/>
+                    </a:lnRef>
+                    <a:fillRef idx="0">
+                      <a:schemeClr val="accent1"/>
+                    </a:fillRef>
+                    <a:effectRef idx="0">
+                      <a:schemeClr val="accent1"/>
+                    </a:effectRef>
+                    <a:fontRef idx="minor">
+                      <a:schemeClr val="tx1"/>
+                    </a:fontRef>
+                  </p:style>
+                </p:cxnSp>
+                <p:cxnSp>
+                  <p:nvCxnSpPr>
+                    <p:cNvPr id="137" name="Straight Connector 136"/>
+                    <p:cNvCxnSpPr/>
+                    <p:nvPr/>
+                  </p:nvCxnSpPr>
+                  <p:spPr>
+                    <a:xfrm>
+                      <a:off x="3246258" y="3333750"/>
+                      <a:ext cx="411342" cy="939312"/>
+                    </a:xfrm>
+                    <a:prstGeom prst="line">
+                      <a:avLst/>
+                    </a:prstGeom>
+                    <a:ln w="76200">
+                      <a:solidFill>
+                        <a:schemeClr val="tx1"/>
+                      </a:solidFill>
+                    </a:ln>
+                  </p:spPr>
+                  <p:style>
+                    <a:lnRef idx="1">
+                      <a:schemeClr val="accent1"/>
+                    </a:lnRef>
+                    <a:fillRef idx="0">
+                      <a:schemeClr val="accent1"/>
+                    </a:fillRef>
+                    <a:effectRef idx="0">
+                      <a:schemeClr val="accent1"/>
+                    </a:effectRef>
+                    <a:fontRef idx="minor">
+                      <a:schemeClr val="tx1"/>
+                    </a:fontRef>
+                  </p:style>
+                </p:cxnSp>
+                <p:cxnSp>
+                  <p:nvCxnSpPr>
+                    <p:cNvPr id="138" name="Straight Connector 137"/>
+                    <p:cNvCxnSpPr/>
+                    <p:nvPr/>
+                  </p:nvCxnSpPr>
+                  <p:spPr>
+                    <a:xfrm rot="18761339">
+                      <a:off x="3580672" y="4088859"/>
+                      <a:ext cx="445195" cy="186114"/>
+                    </a:xfrm>
+                    <a:prstGeom prst="line">
+                      <a:avLst/>
+                    </a:prstGeom>
+                    <a:ln w="76200">
+                      <a:solidFill>
+                        <a:schemeClr val="tx1"/>
+                      </a:solidFill>
+                    </a:ln>
+                  </p:spPr>
+                  <p:style>
+                    <a:lnRef idx="1">
+                      <a:schemeClr val="accent1"/>
+                    </a:lnRef>
+                    <a:fillRef idx="0">
+                      <a:schemeClr val="accent1"/>
+                    </a:fillRef>
+                    <a:effectRef idx="0">
+                      <a:schemeClr val="accent1"/>
+                    </a:effectRef>
+                    <a:fontRef idx="minor">
+                      <a:schemeClr val="tx1"/>
+                    </a:fontRef>
+                  </p:style>
+                </p:cxnSp>
+              </p:grpSp>
+            </p:grpSp>
+          </p:grpSp>
+        </p:grpSp>
+      </p:grpSp>
+      <p:grpSp>
+        <p:nvGrpSpPr>
+          <p:cNvPr id="139" name="Group 138"/>
+          <p:cNvGrpSpPr/>
+          <p:nvPr/>
+        </p:nvGrpSpPr>
+        <p:grpSpPr>
+          <a:xfrm>
+            <a:off x="9346151" y="5255246"/>
+            <a:ext cx="1338845" cy="1139306"/>
+            <a:chOff x="5167851" y="1221042"/>
+            <a:chExt cx="1338845" cy="1139306"/>
+          </a:xfrm>
+        </p:grpSpPr>
+        <p:sp>
+          <p:nvSpPr>
+            <p:cNvPr id="140" name="Rectangle 139"/>
+            <p:cNvSpPr/>
+            <p:nvPr/>
+          </p:nvSpPr>
+          <p:spPr>
+            <a:xfrm rot="2378626">
+              <a:off x="5432964" y="1824292"/>
+              <a:ext cx="624851" cy="523386"/>
+            </a:xfrm>
+            <a:prstGeom prst="rect">
+              <a:avLst/>
+            </a:prstGeom>
+            <a:solidFill>
+              <a:schemeClr val="bg1"/>
+            </a:solidFill>
+            <a:ln>
+              <a:solidFill>
+                <a:schemeClr val="bg1"/>
+              </a:solidFill>
+            </a:ln>
+          </p:spPr>
+          <p:style>
+            <a:lnRef idx="2">
+              <a:schemeClr val="accent1">
+                <a:shade val="50000"/>
+              </a:schemeClr>
+            </a:lnRef>
+            <a:fillRef idx="1">
+              <a:schemeClr val="accent1"/>
+            </a:fillRef>
+            <a:effectRef idx="0">
+              <a:schemeClr val="accent1"/>
+            </a:effectRef>
+            <a:fontRef idx="minor">
+              <a:schemeClr val="lt1"/>
+            </a:fontRef>
+          </p:style>
+          <p:txBody>
+            <a:bodyPr rtlCol="0" anchor="ctr"/>
+            <a:lstStyle/>
+            <a:p>
+              <a:pPr algn="ctr"/>
+              <a:endParaRPr lang="es-AR"/>
+            </a:p>
+          </p:txBody>
+        </p:sp>
+        <p:sp>
+          <p:nvSpPr>
+            <p:cNvPr id="141" name="Rectangle 140"/>
+            <p:cNvSpPr/>
+            <p:nvPr/>
+          </p:nvSpPr>
+          <p:spPr>
+            <a:xfrm rot="19085439">
+              <a:off x="5167851" y="1518431"/>
+              <a:ext cx="1153061" cy="242336"/>
+            </a:xfrm>
+            <a:prstGeom prst="rect">
+              <a:avLst/>
+            </a:prstGeom>
+            <a:solidFill>
+              <a:schemeClr val="bg1"/>
+            </a:solidFill>
+            <a:ln>
+              <a:solidFill>
+                <a:schemeClr val="bg1"/>
+              </a:solidFill>
+            </a:ln>
+          </p:spPr>
+          <p:style>
+            <a:lnRef idx="2">
+              <a:schemeClr val="accent1">
+                <a:shade val="50000"/>
+              </a:schemeClr>
+            </a:lnRef>
+            <a:fillRef idx="1">
+              <a:schemeClr val="accent1"/>
+            </a:fillRef>
+            <a:effectRef idx="0">
+              <a:schemeClr val="accent1"/>
+            </a:effectRef>
+            <a:fontRef idx="minor">
+              <a:schemeClr val="lt1"/>
+            </a:fontRef>
+          </p:style>
+          <p:txBody>
+            <a:bodyPr rtlCol="0" anchor="ctr"/>
+            <a:lstStyle/>
+            <a:p>
+              <a:pPr algn="ctr"/>
+              <a:endParaRPr lang="es-AR"/>
+            </a:p>
+          </p:txBody>
+        </p:sp>
+        <p:sp>
+          <p:nvSpPr>
+            <p:cNvPr id="142" name="Rectangle 141"/>
+            <p:cNvSpPr/>
+            <p:nvPr/>
+          </p:nvSpPr>
+          <p:spPr>
+            <a:xfrm rot="16390679">
+              <a:off x="5604324" y="1738047"/>
+              <a:ext cx="1002266" cy="242336"/>
+            </a:xfrm>
+            <a:prstGeom prst="rect">
+              <a:avLst/>
+            </a:prstGeom>
+            <a:solidFill>
+              <a:schemeClr val="bg1"/>
+            </a:solidFill>
+            <a:ln>
+              <a:solidFill>
+                <a:schemeClr val="bg1"/>
+              </a:solidFill>
+            </a:ln>
+          </p:spPr>
+          <p:style>
+            <a:lnRef idx="2">
+              <a:schemeClr val="accent1">
+                <a:shade val="50000"/>
+              </a:schemeClr>
+            </a:lnRef>
+            <a:fillRef idx="1">
+              <a:schemeClr val="accent1"/>
+            </a:fillRef>
+            <a:effectRef idx="0">
+              <a:schemeClr val="accent1"/>
+            </a:effectRef>
+            <a:fontRef idx="minor">
+              <a:schemeClr val="lt1"/>
+            </a:fontRef>
+          </p:style>
+          <p:txBody>
+            <a:bodyPr rtlCol="0" anchor="ctr"/>
+            <a:lstStyle/>
+            <a:p>
+              <a:pPr algn="ctr"/>
+              <a:endParaRPr lang="es-AR"/>
+            </a:p>
+          </p:txBody>
+        </p:sp>
+        <p:grpSp>
+          <p:nvGrpSpPr>
+            <p:cNvPr id="143" name="Group 142"/>
+            <p:cNvGrpSpPr/>
+            <p:nvPr/>
+          </p:nvGrpSpPr>
+          <p:grpSpPr>
+            <a:xfrm>
+              <a:off x="5427924" y="1221042"/>
+              <a:ext cx="1078772" cy="1104931"/>
+              <a:chOff x="1162580" y="1308965"/>
+              <a:chExt cx="1078772" cy="1104931"/>
+            </a:xfrm>
+          </p:grpSpPr>
+          <p:sp>
+            <p:nvSpPr>
+              <p:cNvPr id="144" name="Rectangle 143"/>
+              <p:cNvSpPr/>
+              <p:nvPr/>
+            </p:nvSpPr>
+            <p:spPr>
+              <a:xfrm rot="1416968">
+                <a:off x="1520005" y="1744396"/>
+                <a:ext cx="115358" cy="642139"/>
+              </a:xfrm>
+              <a:prstGeom prst="rect">
+                <a:avLst/>
+              </a:prstGeom>
+              <a:solidFill>
+                <a:schemeClr val="bg1"/>
+              </a:solidFill>
+              <a:ln>
+                <a:solidFill>
+                  <a:schemeClr val="bg1"/>
+                </a:solidFill>
+              </a:ln>
+            </p:spPr>
+            <p:style>
+              <a:lnRef idx="2">
+                <a:schemeClr val="accent1">
+                  <a:shade val="50000"/>
+                </a:schemeClr>
+              </a:lnRef>
+              <a:fillRef idx="1">
+                <a:schemeClr val="accent1"/>
+              </a:fillRef>
+              <a:effectRef idx="0">
+                <a:schemeClr val="accent1"/>
+              </a:effectRef>
+              <a:fontRef idx="minor">
+                <a:schemeClr val="lt1"/>
+              </a:fontRef>
+            </p:style>
+            <p:txBody>
+              <a:bodyPr rtlCol="0" anchor="ctr"/>
+              <a:lstStyle/>
+              <a:p>
+                <a:pPr algn="ctr"/>
+                <a:endParaRPr lang="es-AR"/>
+              </a:p>
+            </p:txBody>
+          </p:sp>
+          <p:grpSp>
+            <p:nvGrpSpPr>
+              <p:cNvPr id="145" name="Group 144"/>
+              <p:cNvGrpSpPr/>
+              <p:nvPr/>
+            </p:nvGrpSpPr>
+            <p:grpSpPr>
+              <a:xfrm>
+                <a:off x="1162580" y="1308965"/>
+                <a:ext cx="1078772" cy="1104931"/>
+                <a:chOff x="1549442" y="1308965"/>
+                <a:chExt cx="1078772" cy="1104931"/>
+              </a:xfrm>
+            </p:grpSpPr>
+            <p:sp>
+              <p:nvSpPr>
+                <p:cNvPr id="146" name="Isosceles Triangle 145"/>
+                <p:cNvSpPr/>
+                <p:nvPr/>
+              </p:nvSpPr>
+              <p:spPr>
+                <a:xfrm rot="1501557">
+                  <a:off x="1801723" y="1308965"/>
+                  <a:ext cx="649608" cy="769795"/>
+                </a:xfrm>
+                <a:prstGeom prst="triangle">
+                  <a:avLst/>
+                </a:prstGeom>
+                <a:solidFill>
+                  <a:schemeClr val="bg1"/>
+                </a:solidFill>
+                <a:ln>
+                  <a:solidFill>
+                    <a:schemeClr val="bg1"/>
+                  </a:solidFill>
+                </a:ln>
+              </p:spPr>
+              <p:style>
+                <a:lnRef idx="2">
+                  <a:schemeClr val="accent1">
+                    <a:shade val="50000"/>
+                  </a:schemeClr>
+                </a:lnRef>
+                <a:fillRef idx="1">
+                  <a:schemeClr val="accent1"/>
+                </a:fillRef>
+                <a:effectRef idx="0">
+                  <a:schemeClr val="accent1"/>
+                </a:effectRef>
+                <a:fontRef idx="minor">
+                  <a:schemeClr val="lt1"/>
+                </a:fontRef>
+              </p:style>
+              <p:txBody>
+                <a:bodyPr rtlCol="0" anchor="ctr"/>
+                <a:lstStyle/>
+                <a:p>
+                  <a:pPr algn="ctr"/>
+                  <a:endParaRPr lang="es-AR"/>
+                </a:p>
+              </p:txBody>
+            </p:sp>
+            <p:grpSp>
+              <p:nvGrpSpPr>
+                <p:cNvPr id="147" name="Group 146"/>
+                <p:cNvGrpSpPr/>
+                <p:nvPr/>
+              </p:nvGrpSpPr>
+              <p:grpSpPr>
+                <a:xfrm rot="2838661">
+                  <a:off x="1640095" y="1425777"/>
+                  <a:ext cx="897466" cy="1078772"/>
+                  <a:chOff x="2346300" y="1600200"/>
+                  <a:chExt cx="2333000" cy="2804313"/>
+                </a:xfrm>
+              </p:grpSpPr>
+              <p:cxnSp>
+                <p:nvCxnSpPr>
+                  <p:cNvPr id="148" name="Straight Connector 147"/>
+                  <p:cNvCxnSpPr/>
+                  <p:nvPr/>
+                </p:nvCxnSpPr>
+                <p:spPr>
+                  <a:xfrm rot="18761339">
+                    <a:off x="3683354" y="2960283"/>
+                    <a:ext cx="546119" cy="572453"/>
+                  </a:xfrm>
+                  <a:prstGeom prst="line">
+                    <a:avLst/>
+                  </a:prstGeom>
+                  <a:ln w="76200">
+                    <a:solidFill>
+                      <a:schemeClr val="tx1"/>
+                    </a:solidFill>
+                  </a:ln>
+                </p:spPr>
+                <p:style>
+                  <a:lnRef idx="1">
+                    <a:schemeClr val="accent1"/>
+                  </a:lnRef>
+                  <a:fillRef idx="0">
+                    <a:schemeClr val="accent1"/>
+                  </a:fillRef>
+                  <a:effectRef idx="0">
+                    <a:schemeClr val="accent1"/>
+                  </a:effectRef>
+                  <a:fontRef idx="minor">
+                    <a:schemeClr val="tx1"/>
+                  </a:fontRef>
+                </p:style>
+              </p:cxnSp>
+              <p:grpSp>
+                <p:nvGrpSpPr>
+                  <p:cNvPr id="149" name="Group 148"/>
+                  <p:cNvGrpSpPr/>
+                  <p:nvPr/>
+                </p:nvGrpSpPr>
+                <p:grpSpPr>
+                  <a:xfrm>
+                    <a:off x="2346300" y="1600200"/>
+                    <a:ext cx="2333000" cy="2804313"/>
+                    <a:chOff x="2346300" y="1600200"/>
+                    <a:chExt cx="2333000" cy="2804313"/>
+                  </a:xfrm>
+                </p:grpSpPr>
+                <p:cxnSp>
+                  <p:nvCxnSpPr>
+                    <p:cNvPr id="150" name="Straight Connector 149"/>
+                    <p:cNvCxnSpPr/>
+                    <p:nvPr/>
+                  </p:nvCxnSpPr>
+                  <p:spPr>
+                    <a:xfrm>
+                      <a:off x="2690447" y="1600200"/>
+                      <a:ext cx="0" cy="2365131"/>
+                    </a:xfrm>
+                    <a:prstGeom prst="line">
+                      <a:avLst/>
+                    </a:prstGeom>
+                    <a:ln w="76200">
+                      <a:solidFill>
+                        <a:schemeClr val="tx1"/>
+                      </a:solidFill>
+                    </a:ln>
+                  </p:spPr>
+                  <p:style>
+                    <a:lnRef idx="1">
+                      <a:schemeClr val="accent1"/>
+                    </a:lnRef>
+                    <a:fillRef idx="0">
+                      <a:schemeClr val="accent1"/>
+                    </a:fillRef>
+                    <a:effectRef idx="0">
+                      <a:schemeClr val="accent1"/>
+                    </a:effectRef>
+                    <a:fontRef idx="minor">
+                      <a:schemeClr val="tx1"/>
+                    </a:fontRef>
+                  </p:style>
+                </p:cxnSp>
+                <p:cxnSp>
+                  <p:nvCxnSpPr>
+                    <p:cNvPr id="151" name="Straight Connector 150"/>
+                    <p:cNvCxnSpPr/>
+                    <p:nvPr/>
+                  </p:nvCxnSpPr>
+                  <p:spPr>
+                    <a:xfrm flipV="1">
+                      <a:off x="2693377" y="3338513"/>
+                      <a:ext cx="573698" cy="629751"/>
+                    </a:xfrm>
+                    <a:prstGeom prst="line">
+                      <a:avLst/>
+                    </a:prstGeom>
+                    <a:ln w="76200">
+                      <a:solidFill>
+                        <a:schemeClr val="tx1"/>
+                      </a:solidFill>
+                    </a:ln>
+                  </p:spPr>
+                  <p:style>
+                    <a:lnRef idx="1">
+                      <a:schemeClr val="accent1"/>
+                    </a:lnRef>
+                    <a:fillRef idx="0">
+                      <a:schemeClr val="accent1"/>
+                    </a:fillRef>
+                    <a:effectRef idx="0">
+                      <a:schemeClr val="accent1"/>
+                    </a:effectRef>
+                    <a:fontRef idx="minor">
+                      <a:schemeClr val="tx1"/>
+                    </a:fontRef>
+                  </p:style>
+                </p:cxnSp>
+                <p:cxnSp>
+                  <p:nvCxnSpPr>
+                    <p:cNvPr id="152" name="Straight Connector 151"/>
+                    <p:cNvCxnSpPr/>
+                    <p:nvPr/>
+                  </p:nvCxnSpPr>
+                  <p:spPr>
+                    <a:xfrm rot="18761339" flipH="1">
+                      <a:off x="3461069" y="1262631"/>
+                      <a:ext cx="103462" cy="2333000"/>
+                    </a:xfrm>
+                    <a:prstGeom prst="line">
+                      <a:avLst/>
+                    </a:prstGeom>
+                    <a:ln w="76200">
+                      <a:solidFill>
+                        <a:schemeClr val="tx1"/>
+                      </a:solidFill>
+                    </a:ln>
+                  </p:spPr>
+                  <p:style>
+                    <a:lnRef idx="1">
+                      <a:schemeClr val="accent1"/>
+                    </a:lnRef>
+                    <a:fillRef idx="0">
+                      <a:schemeClr val="accent1"/>
+                    </a:fillRef>
+                    <a:effectRef idx="0">
+                      <a:schemeClr val="accent1"/>
+                    </a:effectRef>
+                    <a:fontRef idx="minor">
+                      <a:schemeClr val="tx1"/>
+                    </a:fontRef>
+                  </p:style>
+                </p:cxnSp>
+                <p:cxnSp>
+                  <p:nvCxnSpPr>
+                    <p:cNvPr id="153" name="Straight Connector 152"/>
+                    <p:cNvCxnSpPr/>
+                    <p:nvPr/>
+                  </p:nvCxnSpPr>
+                  <p:spPr>
+                    <a:xfrm>
+                      <a:off x="3560884" y="3253154"/>
+                      <a:ext cx="386862" cy="852854"/>
+                    </a:xfrm>
+                    <a:prstGeom prst="line">
+                      <a:avLst/>
+                    </a:prstGeom>
+                    <a:ln w="76200">
+                      <a:solidFill>
+                        <a:schemeClr val="tx1"/>
+                      </a:solidFill>
+                    </a:ln>
+                  </p:spPr>
+                  <p:style>
+                    <a:lnRef idx="1">
+                      <a:schemeClr val="accent1"/>
+                    </a:lnRef>
+                    <a:fillRef idx="0">
+                      <a:schemeClr val="accent1"/>
+                    </a:fillRef>
+                    <a:effectRef idx="0">
+                      <a:schemeClr val="accent1"/>
+                    </a:effectRef>
+                    <a:fontRef idx="minor">
+                      <a:schemeClr val="tx1"/>
+                    </a:fontRef>
+                  </p:style>
+                </p:cxnSp>
+                <p:cxnSp>
+                  <p:nvCxnSpPr>
+                    <p:cNvPr id="154" name="Straight Connector 153"/>
+                    <p:cNvCxnSpPr/>
+                    <p:nvPr/>
+                  </p:nvCxnSpPr>
+                  <p:spPr>
+                    <a:xfrm>
+                      <a:off x="3246258" y="3333750"/>
+                      <a:ext cx="411342" cy="939312"/>
+                    </a:xfrm>
+                    <a:prstGeom prst="line">
+                      <a:avLst/>
+                    </a:prstGeom>
+                    <a:ln w="76200">
+                      <a:solidFill>
+                        <a:schemeClr val="tx1"/>
+                      </a:solidFill>
+                    </a:ln>
+                  </p:spPr>
+                  <p:style>
+                    <a:lnRef idx="1">
+                      <a:schemeClr val="accent1"/>
+                    </a:lnRef>
+                    <a:fillRef idx="0">
+                      <a:schemeClr val="accent1"/>
+                    </a:fillRef>
+                    <a:effectRef idx="0">
+                      <a:schemeClr val="accent1"/>
+                    </a:effectRef>
+                    <a:fontRef idx="minor">
+                      <a:schemeClr val="tx1"/>
+                    </a:fontRef>
+                  </p:style>
+                </p:cxnSp>
+                <p:cxnSp>
+                  <p:nvCxnSpPr>
+                    <p:cNvPr id="155" name="Straight Connector 154"/>
+                    <p:cNvCxnSpPr/>
+                    <p:nvPr/>
+                  </p:nvCxnSpPr>
+                  <p:spPr>
+                    <a:xfrm rot="18761339">
+                      <a:off x="3580672" y="4088859"/>
+                      <a:ext cx="445195" cy="186114"/>
+                    </a:xfrm>
+                    <a:prstGeom prst="line">
+                      <a:avLst/>
+                    </a:prstGeom>
+                    <a:ln w="76200">
+                      <a:solidFill>
+                        <a:schemeClr val="tx1"/>
+                      </a:solidFill>
+                    </a:ln>
+                  </p:spPr>
+                  <p:style>
+                    <a:lnRef idx="1">
+                      <a:schemeClr val="accent1"/>
+                    </a:lnRef>
+                    <a:fillRef idx="0">
+                      <a:schemeClr val="accent1"/>
+                    </a:fillRef>
+                    <a:effectRef idx="0">
+                      <a:schemeClr val="accent1"/>
+                    </a:effectRef>
+                    <a:fontRef idx="minor">
+                      <a:schemeClr val="tx1"/>
+                    </a:fontRef>
+                  </p:style>
+                </p:cxnSp>
+              </p:grpSp>
+            </p:grpSp>
+          </p:grpSp>
+        </p:grpSp>
+      </p:grpSp>
     </p:spTree>
     <p:extLst>
       <p:ext uri="{BB962C8B-B14F-4D97-AF65-F5344CB8AC3E}">
         <p14:creationId xmlns:p14="http://schemas.microsoft.com/office/powerpoint/2010/main" val="4054270490"/>
+      </p:ext>
+    </p:extLst>
+  </p:cSld>
+  <p:clrMapOvr>
+    <a:masterClrMapping/>
+  </p:clrMapOvr>
+</p:sld>
+</file>
+
+<file path=ppt/slides/slide5.xml><?xml version="1.0" encoding="utf-8"?>
+<p:sld xmlns:a="http://schemas.openxmlformats.org/drawingml/2006/main" xmlns:r="http://schemas.openxmlformats.org/officeDocument/2006/relationships" xmlns:p="http://schemas.openxmlformats.org/presentationml/2006/main">
+  <p:cSld>
+    <p:spTree>
+      <p:nvGrpSpPr>
+        <p:cNvPr id="1" name=""/>
+        <p:cNvGrpSpPr/>
+        <p:nvPr/>
+      </p:nvGrpSpPr>
+      <p:grpSpPr>
+        <a:xfrm>
+          <a:off x="0" y="0"/>
+          <a:ext cx="0" cy="0"/>
+          <a:chOff x="0" y="0"/>
+          <a:chExt cx="0" cy="0"/>
+        </a:xfrm>
+      </p:grpSpPr>
+      <p:grpSp>
+        <p:nvGrpSpPr>
+          <p:cNvPr id="37" name="Group 36"/>
+          <p:cNvGrpSpPr/>
+          <p:nvPr/>
+        </p:nvGrpSpPr>
+        <p:grpSpPr>
+          <a:xfrm>
+            <a:off x="2690446" y="1600200"/>
+            <a:ext cx="1626577" cy="2672862"/>
+            <a:chOff x="2690446" y="1600200"/>
+            <a:chExt cx="1626577" cy="2672862"/>
+          </a:xfrm>
+        </p:grpSpPr>
+        <p:cxnSp>
+          <p:nvCxnSpPr>
+            <p:cNvPr id="14" name="Straight Connector 13"/>
+            <p:cNvCxnSpPr/>
+            <p:nvPr/>
+          </p:nvCxnSpPr>
+          <p:spPr>
+            <a:xfrm>
+              <a:off x="3560885" y="3253154"/>
+              <a:ext cx="756138" cy="1"/>
+            </a:xfrm>
+            <a:prstGeom prst="line">
+              <a:avLst/>
+            </a:prstGeom>
+            <a:ln w="57150">
+              <a:solidFill>
+                <a:schemeClr val="tx1"/>
+              </a:solidFill>
+            </a:ln>
+          </p:spPr>
+          <p:style>
+            <a:lnRef idx="1">
+              <a:schemeClr val="accent1"/>
+            </a:lnRef>
+            <a:fillRef idx="0">
+              <a:schemeClr val="accent1"/>
+            </a:fillRef>
+            <a:effectRef idx="0">
+              <a:schemeClr val="accent1"/>
+            </a:effectRef>
+            <a:fontRef idx="minor">
+              <a:schemeClr val="tx1"/>
+            </a:fontRef>
+          </p:style>
+        </p:cxnSp>
+        <p:grpSp>
+          <p:nvGrpSpPr>
+            <p:cNvPr id="36" name="Group 35"/>
+            <p:cNvGrpSpPr/>
+            <p:nvPr/>
+          </p:nvGrpSpPr>
+          <p:grpSpPr>
+            <a:xfrm>
+              <a:off x="2690446" y="1600200"/>
+              <a:ext cx="1626577" cy="2672862"/>
+              <a:chOff x="2690446" y="1600200"/>
+              <a:chExt cx="1626577" cy="2672862"/>
+            </a:xfrm>
+          </p:grpSpPr>
+          <p:cxnSp>
+            <p:nvCxnSpPr>
+              <p:cNvPr id="5" name="Straight Connector 4"/>
+              <p:cNvCxnSpPr/>
+              <p:nvPr/>
+            </p:nvCxnSpPr>
+            <p:spPr>
+              <a:xfrm>
+                <a:off x="2690446" y="1600200"/>
+                <a:ext cx="0" cy="2365131"/>
+              </a:xfrm>
+              <a:prstGeom prst="line">
+                <a:avLst/>
+              </a:prstGeom>
+              <a:ln w="57150">
+                <a:solidFill>
+                  <a:schemeClr val="tx1"/>
+                </a:solidFill>
+              </a:ln>
+            </p:spPr>
+            <p:style>
+              <a:lnRef idx="1">
+                <a:schemeClr val="accent1"/>
+              </a:lnRef>
+              <a:fillRef idx="0">
+                <a:schemeClr val="accent1"/>
+              </a:fillRef>
+              <a:effectRef idx="0">
+                <a:schemeClr val="accent1"/>
+              </a:effectRef>
+              <a:fontRef idx="minor">
+                <a:schemeClr val="tx1"/>
+              </a:fontRef>
+            </p:style>
+          </p:cxnSp>
+          <p:cxnSp>
+            <p:nvCxnSpPr>
+              <p:cNvPr id="6" name="Straight Connector 5"/>
+              <p:cNvCxnSpPr/>
+              <p:nvPr/>
+            </p:nvCxnSpPr>
+            <p:spPr>
+              <a:xfrm flipV="1">
+                <a:off x="2693377" y="3338513"/>
+                <a:ext cx="573698" cy="629751"/>
+              </a:xfrm>
+              <a:prstGeom prst="line">
+                <a:avLst/>
+              </a:prstGeom>
+              <a:ln w="57150">
+                <a:solidFill>
+                  <a:schemeClr val="tx1"/>
+                </a:solidFill>
+              </a:ln>
+            </p:spPr>
+            <p:style>
+              <a:lnRef idx="1">
+                <a:schemeClr val="accent1"/>
+              </a:lnRef>
+              <a:fillRef idx="0">
+                <a:schemeClr val="accent1"/>
+              </a:fillRef>
+              <a:effectRef idx="0">
+                <a:schemeClr val="accent1"/>
+              </a:effectRef>
+              <a:fontRef idx="minor">
+                <a:schemeClr val="tx1"/>
+              </a:fontRef>
+            </p:style>
+          </p:cxnSp>
+          <p:cxnSp>
+            <p:nvCxnSpPr>
+              <p:cNvPr id="8" name="Straight Connector 7"/>
+              <p:cNvCxnSpPr/>
+              <p:nvPr/>
+            </p:nvCxnSpPr>
+            <p:spPr>
+              <a:xfrm>
+                <a:off x="2690446" y="1600200"/>
+                <a:ext cx="1626577" cy="1652954"/>
+              </a:xfrm>
+              <a:prstGeom prst="line">
+                <a:avLst/>
+              </a:prstGeom>
+              <a:ln w="57150">
+                <a:solidFill>
+                  <a:schemeClr val="tx1"/>
+                </a:solidFill>
+              </a:ln>
+            </p:spPr>
+            <p:style>
+              <a:lnRef idx="1">
+                <a:schemeClr val="accent1"/>
+              </a:lnRef>
+              <a:fillRef idx="0">
+                <a:schemeClr val="accent1"/>
+              </a:fillRef>
+              <a:effectRef idx="0">
+                <a:schemeClr val="accent1"/>
+              </a:effectRef>
+              <a:fontRef idx="minor">
+                <a:schemeClr val="tx1"/>
+              </a:fontRef>
+            </p:style>
+          </p:cxnSp>
+          <p:cxnSp>
+            <p:nvCxnSpPr>
+              <p:cNvPr id="17" name="Straight Connector 16"/>
+              <p:cNvCxnSpPr/>
+              <p:nvPr/>
+            </p:nvCxnSpPr>
+            <p:spPr>
+              <a:xfrm>
+                <a:off x="3560884" y="3253154"/>
+                <a:ext cx="386862" cy="852854"/>
+              </a:xfrm>
+              <a:prstGeom prst="line">
+                <a:avLst/>
+              </a:prstGeom>
+              <a:ln w="57150">
+                <a:solidFill>
+                  <a:schemeClr val="tx1"/>
+                </a:solidFill>
+              </a:ln>
+            </p:spPr>
+            <p:style>
+              <a:lnRef idx="1">
+                <a:schemeClr val="accent1"/>
+              </a:lnRef>
+              <a:fillRef idx="0">
+                <a:schemeClr val="accent1"/>
+              </a:fillRef>
+              <a:effectRef idx="0">
+                <a:schemeClr val="accent1"/>
+              </a:effectRef>
+              <a:fontRef idx="minor">
+                <a:schemeClr val="tx1"/>
+              </a:fontRef>
+            </p:style>
+          </p:cxnSp>
+          <p:cxnSp>
+            <p:nvCxnSpPr>
+              <p:cNvPr id="21" name="Straight Connector 20"/>
+              <p:cNvCxnSpPr/>
+              <p:nvPr/>
+            </p:nvCxnSpPr>
+            <p:spPr>
+              <a:xfrm>
+                <a:off x="3246258" y="3333750"/>
+                <a:ext cx="411342" cy="939312"/>
+              </a:xfrm>
+              <a:prstGeom prst="line">
+                <a:avLst/>
+              </a:prstGeom>
+              <a:ln w="57150">
+                <a:solidFill>
+                  <a:schemeClr val="tx1"/>
+                </a:solidFill>
+              </a:ln>
+            </p:spPr>
+            <p:style>
+              <a:lnRef idx="1">
+                <a:schemeClr val="accent1"/>
+              </a:lnRef>
+              <a:fillRef idx="0">
+                <a:schemeClr val="accent1"/>
+              </a:fillRef>
+              <a:effectRef idx="0">
+                <a:schemeClr val="accent1"/>
+              </a:effectRef>
+              <a:fontRef idx="minor">
+                <a:schemeClr val="tx1"/>
+              </a:fontRef>
+            </p:style>
+          </p:cxnSp>
+          <p:cxnSp>
+            <p:nvCxnSpPr>
+              <p:cNvPr id="22" name="Straight Connector 21"/>
+              <p:cNvCxnSpPr/>
+              <p:nvPr/>
+            </p:nvCxnSpPr>
+            <p:spPr>
+              <a:xfrm flipV="1">
+                <a:off x="3644900" y="4114801"/>
+                <a:ext cx="304800" cy="139699"/>
+              </a:xfrm>
+              <a:prstGeom prst="line">
+                <a:avLst/>
+              </a:prstGeom>
+              <a:ln w="57150">
+                <a:solidFill>
+                  <a:schemeClr val="tx1"/>
+                </a:solidFill>
+              </a:ln>
+            </p:spPr>
+            <p:style>
+              <a:lnRef idx="1">
+                <a:schemeClr val="accent1"/>
+              </a:lnRef>
+              <a:fillRef idx="0">
+                <a:schemeClr val="accent1"/>
+              </a:fillRef>
+              <a:effectRef idx="0">
+                <a:schemeClr val="accent1"/>
+              </a:effectRef>
+              <a:fontRef idx="minor">
+                <a:schemeClr val="tx1"/>
+              </a:fontRef>
+            </p:style>
+          </p:cxnSp>
+        </p:grpSp>
+      </p:grpSp>
+      <p:cxnSp>
+        <p:nvCxnSpPr>
+          <p:cNvPr id="28" name="Straight Connector 27"/>
+          <p:cNvCxnSpPr/>
+          <p:nvPr/>
+        </p:nvCxnSpPr>
+        <p:spPr>
+          <a:xfrm>
+            <a:off x="3414346" y="3521974"/>
+            <a:ext cx="395654" cy="903488"/>
+          </a:xfrm>
+          <a:prstGeom prst="line">
+            <a:avLst/>
+          </a:prstGeom>
+        </p:spPr>
+        <p:style>
+          <a:lnRef idx="1">
+            <a:schemeClr val="accent1"/>
+          </a:lnRef>
+          <a:fillRef idx="0">
+            <a:schemeClr val="accent1"/>
+          </a:fillRef>
+          <a:effectRef idx="0">
+            <a:schemeClr val="accent1"/>
+          </a:effectRef>
+          <a:fontRef idx="minor">
+            <a:schemeClr val="tx1"/>
+          </a:fontRef>
+        </p:style>
+      </p:cxnSp>
+      <p:cxnSp>
+        <p:nvCxnSpPr>
+          <p:cNvPr id="30" name="Straight Connector 29"/>
+          <p:cNvCxnSpPr/>
+          <p:nvPr/>
+        </p:nvCxnSpPr>
+        <p:spPr>
+          <a:xfrm flipH="1" flipV="1">
+            <a:off x="2687516" y="1600199"/>
+            <a:ext cx="1421422" cy="3314701"/>
+          </a:xfrm>
+          <a:prstGeom prst="line">
+            <a:avLst/>
+          </a:prstGeom>
+        </p:spPr>
+        <p:style>
+          <a:lnRef idx="1">
+            <a:schemeClr val="accent1"/>
+          </a:lnRef>
+          <a:fillRef idx="0">
+            <a:schemeClr val="accent1"/>
+          </a:fillRef>
+          <a:effectRef idx="0">
+            <a:schemeClr val="accent1"/>
+          </a:effectRef>
+          <a:fontRef idx="minor">
+            <a:schemeClr val="tx1"/>
+          </a:fontRef>
+        </p:style>
+      </p:cxnSp>
+    </p:spTree>
+    <p:extLst>
+      <p:ext uri="{BB962C8B-B14F-4D97-AF65-F5344CB8AC3E}">
+        <p14:creationId xmlns:p14="http://schemas.microsoft.com/office/powerpoint/2010/main" val="1323349853"/>
       </p:ext>
     </p:extLst>
   </p:cSld>

</xml_diff>